<commit_message>
Modifications de l'ébauche. Poursuite du diaporama de revue 2.
</commit_message>
<xml_diff>
--- a/Nathan/Compte-rendus/REVUE-R2-GUIGAND-SFL6.pptx
+++ b/Nathan/Compte-rendus/REVUE-R2-GUIGAND-SFL6.pptx
@@ -845,7 +845,7 @@
             <a:fld id="{B61BEF0D-F0BB-DE4B-95CE-6DB70DBA9567}" type="datetimeFigureOut">
               <a:rPr lang="en-US" dirty="0"/>
               <a:pPr/>
-              <a:t>1/22/2020</a:t>
+              <a:t>2/26/2020</a:t>
             </a:fld>
             <a:endParaRPr lang="en-US" dirty="0"/>
           </a:p>
@@ -1093,7 +1093,7 @@
             <a:fld id="{B61BEF0D-F0BB-DE4B-95CE-6DB70DBA9567}" type="datetimeFigureOut">
               <a:rPr lang="en-US" dirty="0"/>
               <a:pPr/>
-              <a:t>1/22/2020</a:t>
+              <a:t>2/26/2020</a:t>
             </a:fld>
             <a:endParaRPr lang="en-US" dirty="0"/>
           </a:p>
@@ -1404,7 +1404,7 @@
             <a:fld id="{B61BEF0D-F0BB-DE4B-95CE-6DB70DBA9567}" type="datetimeFigureOut">
               <a:rPr lang="en-US" dirty="0"/>
               <a:pPr/>
-              <a:t>1/22/2020</a:t>
+              <a:t>2/26/2020</a:t>
             </a:fld>
             <a:endParaRPr lang="en-US" dirty="0"/>
           </a:p>
@@ -1742,7 +1742,7 @@
             <a:fld id="{B61BEF0D-F0BB-DE4B-95CE-6DB70DBA9567}" type="datetimeFigureOut">
               <a:rPr lang="en-US" dirty="0"/>
               <a:pPr/>
-              <a:t>1/22/2020</a:t>
+              <a:t>2/26/2020</a:t>
             </a:fld>
             <a:endParaRPr lang="en-US" dirty="0"/>
           </a:p>
@@ -2053,7 +2053,7 @@
             <a:fld id="{B61BEF0D-F0BB-DE4B-95CE-6DB70DBA9567}" type="datetimeFigureOut">
               <a:rPr lang="en-US" dirty="0"/>
               <a:pPr/>
-              <a:t>1/22/2020</a:t>
+              <a:t>2/26/2020</a:t>
             </a:fld>
             <a:endParaRPr lang="en-US" dirty="0"/>
           </a:p>
@@ -2443,7 +2443,7 @@
             <a:fld id="{B61BEF0D-F0BB-DE4B-95CE-6DB70DBA9567}" type="datetimeFigureOut">
               <a:rPr lang="en-US" dirty="0"/>
               <a:pPr/>
-              <a:t>1/22/2020</a:t>
+              <a:t>2/26/2020</a:t>
             </a:fld>
             <a:endParaRPr lang="en-US" dirty="0"/>
           </a:p>
@@ -2609,7 +2609,7 @@
           <a:p>
             <a:fld id="{55C6B4A9-1611-4792-9094-5F34BCA07E0B}" type="datetimeFigureOut">
               <a:rPr lang="en-US" dirty="0"/>
-              <a:t>1/22/2020</a:t>
+              <a:t>2/26/2020</a:t>
             </a:fld>
             <a:endParaRPr lang="en-US" dirty="0"/>
           </a:p>
@@ -2785,7 +2785,7 @@
             <a:fld id="{B61BEF0D-F0BB-DE4B-95CE-6DB70DBA9567}" type="datetimeFigureOut">
               <a:rPr lang="en-US" dirty="0"/>
               <a:pPr/>
-              <a:t>1/22/2020</a:t>
+              <a:t>2/26/2020</a:t>
             </a:fld>
             <a:endParaRPr lang="en-US" dirty="0"/>
           </a:p>
@@ -2958,7 +2958,7 @@
             <a:fld id="{B61BEF0D-F0BB-DE4B-95CE-6DB70DBA9567}" type="datetimeFigureOut">
               <a:rPr lang="en-US" dirty="0"/>
               <a:pPr/>
-              <a:t>1/22/2020</a:t>
+              <a:t>2/26/2020</a:t>
             </a:fld>
             <a:endParaRPr lang="en-US" dirty="0"/>
           </a:p>
@@ -3202,7 +3202,7 @@
             <a:fld id="{B61BEF0D-F0BB-DE4B-95CE-6DB70DBA9567}" type="datetimeFigureOut">
               <a:rPr lang="en-US" dirty="0"/>
               <a:pPr/>
-              <a:t>1/22/2020</a:t>
+              <a:t>2/26/2020</a:t>
             </a:fld>
             <a:endParaRPr lang="en-US" dirty="0"/>
           </a:p>
@@ -3430,7 +3430,7 @@
           <a:p>
             <a:fld id="{EB712588-04B1-427B-82EE-E8DB90309F08}" type="datetimeFigureOut">
               <a:rPr lang="en-US" dirty="0"/>
-              <a:t>1/22/2020</a:t>
+              <a:t>2/26/2020</a:t>
             </a:fld>
             <a:endParaRPr lang="en-US" dirty="0"/>
           </a:p>
@@ -3800,7 +3800,7 @@
             <a:fld id="{B61BEF0D-F0BB-DE4B-95CE-6DB70DBA9567}" type="datetimeFigureOut">
               <a:rPr lang="en-US" dirty="0"/>
               <a:pPr/>
-              <a:t>1/22/2020</a:t>
+              <a:t>2/26/2020</a:t>
             </a:fld>
             <a:endParaRPr lang="en-US" dirty="0"/>
           </a:p>
@@ -3920,7 +3920,7 @@
             <a:fld id="{B61BEF0D-F0BB-DE4B-95CE-6DB70DBA9567}" type="datetimeFigureOut">
               <a:rPr lang="en-US" dirty="0"/>
               <a:pPr/>
-              <a:t>1/22/2020</a:t>
+              <a:t>2/26/2020</a:t>
             </a:fld>
             <a:endParaRPr lang="en-US" dirty="0"/>
           </a:p>
@@ -4012,7 +4012,7 @@
             <a:fld id="{B61BEF0D-F0BB-DE4B-95CE-6DB70DBA9567}" type="datetimeFigureOut">
               <a:rPr lang="en-US" dirty="0"/>
               <a:pPr/>
-              <a:t>1/22/2020</a:t>
+              <a:t>2/26/2020</a:t>
             </a:fld>
             <a:endParaRPr lang="en-US" dirty="0"/>
           </a:p>
@@ -4263,7 +4263,7 @@
           <a:p>
             <a:fld id="{42A54C80-263E-416B-A8E0-580EDEADCBDC}" type="datetimeFigureOut">
               <a:rPr lang="en-US" dirty="0"/>
-              <a:t>1/22/2020</a:t>
+              <a:t>2/26/2020</a:t>
             </a:fld>
             <a:endParaRPr lang="en-US" dirty="0"/>
           </a:p>
@@ -4522,7 +4522,7 @@
             <a:fld id="{B61BEF0D-F0BB-DE4B-95CE-6DB70DBA9567}" type="datetimeFigureOut">
               <a:rPr lang="en-US" dirty="0"/>
               <a:pPr/>
-              <a:t>1/22/2020</a:t>
+              <a:t>2/26/2020</a:t>
             </a:fld>
             <a:endParaRPr lang="en-US" dirty="0"/>
           </a:p>
@@ -5262,7 +5262,7 @@
             <a:fld id="{B61BEF0D-F0BB-DE4B-95CE-6DB70DBA9567}" type="datetimeFigureOut">
               <a:rPr lang="en-US" dirty="0"/>
               <a:pPr/>
-              <a:t>1/22/2020</a:t>
+              <a:t>2/26/2020</a:t>
             </a:fld>
             <a:endParaRPr lang="en-US" dirty="0"/>
           </a:p>
@@ -7326,7 +7326,7 @@
         <p:spPr>
           <a:xfrm>
             <a:off x="1051560" y="1307592"/>
-            <a:ext cx="4754880" cy="2308324"/>
+            <a:ext cx="4754880" cy="2585323"/>
           </a:xfrm>
           <a:prstGeom prst="rect">
             <a:avLst/>
@@ -7385,7 +7385,15 @@
             </a:pPr>
             <a:r>
               <a:rPr lang="fr-FR" dirty="0"/>
-              <a:t>Diagramme de séquence</a:t>
+              <a:t>Diagrammes de séquences : </a:t>
+            </a:r>
+            <a:r>
+              <a:rPr lang="fr-FR" dirty="0" err="1"/>
+              <a:t>a</a:t>
+            </a:r>
+            <a:r>
+              <a:rPr lang="fr-FR" dirty="0"/>
+              <a:t> compléter…</a:t>
             </a:r>
           </a:p>
           <a:p>
@@ -7395,13 +7403,8 @@
             </a:pPr>
             <a:r>
               <a:rPr lang="fr-FR" dirty="0"/>
-              <a:t>Schéma </a:t>
-            </a:r>
-            <a:r>
-              <a:rPr lang="fr-FR"/>
-              <a:t>du réseau</a:t>
-            </a:r>
-            <a:endParaRPr lang="fr-FR" dirty="0"/>
+              <a:t>Schéma du réseau</a:t>
+            </a:r>
           </a:p>
           <a:p>
             <a:pPr marL="285750" indent="-285750">
@@ -8109,10 +8112,10 @@
       </p:sp>
       <p:pic>
         <p:nvPicPr>
-          <p:cNvPr id="2" name="Image 1">
+          <p:cNvPr id="5" name="Image 4">
             <a:extLst>
               <a:ext uri="{FF2B5EF4-FFF2-40B4-BE49-F238E27FC236}">
-                <a16:creationId xmlns:a16="http://schemas.microsoft.com/office/drawing/2014/main" id="{90A51D8C-DBCC-4AC6-9EC6-E9B6237A0F66}"/>
+                <a16:creationId xmlns:a16="http://schemas.microsoft.com/office/drawing/2014/main" id="{8CB2815D-F72A-42DB-A46B-C73868FF90D7}"/>
               </a:ext>
             </a:extLst>
           </p:cNvPr>
@@ -8129,7 +8132,7 @@
         </p:blipFill>
         <p:spPr>
           <a:xfrm>
-            <a:off x="2103443" y="1115122"/>
+            <a:off x="2263920" y="1115122"/>
             <a:ext cx="5238849" cy="5742878"/>
           </a:xfrm>
           <a:prstGeom prst="rect">
@@ -8307,36 +8310,6 @@
           </a:p>
         </p:txBody>
       </p:sp>
-      <p:pic>
-        <p:nvPicPr>
-          <p:cNvPr id="2" name="Image 1">
-            <a:extLst>
-              <a:ext uri="{FF2B5EF4-FFF2-40B4-BE49-F238E27FC236}">
-                <a16:creationId xmlns:a16="http://schemas.microsoft.com/office/drawing/2014/main" id="{99A0B900-94D3-44A9-A462-A4EE245E8216}"/>
-              </a:ext>
-            </a:extLst>
-          </p:cNvPr>
-          <p:cNvPicPr>
-            <a:picLocks noChangeAspect="1"/>
-          </p:cNvPicPr>
-          <p:nvPr/>
-        </p:nvPicPr>
-        <p:blipFill>
-          <a:blip r:embed="rId3"/>
-          <a:stretch>
-            <a:fillRect/>
-          </a:stretch>
-        </p:blipFill>
-        <p:spPr>
-          <a:xfrm>
-            <a:off x="410147" y="1220653"/>
-            <a:ext cx="8624126" cy="5547092"/>
-          </a:xfrm>
-          <a:prstGeom prst="rect">
-            <a:avLst/>
-          </a:prstGeom>
-        </p:spPr>
-      </p:pic>
     </p:spTree>
     <p:extLst>
       <p:ext uri="{BB962C8B-B14F-4D97-AF65-F5344CB8AC3E}">
@@ -8496,7 +8469,7 @@
                 </a:solidFill>
                 <a:latin typeface="Eras Medium ITC" panose="020B0602030504020804" pitchFamily="34" charset="0"/>
               </a:rPr>
-              <a:t>Envoie d’un message</a:t>
+              <a:t>Envoi d’un message</a:t>
             </a:r>
             <a:endParaRPr lang="fr-FR" sz="3200" b="1" dirty="0">
               <a:solidFill>
@@ -8507,36 +8480,6 @@
           </a:p>
         </p:txBody>
       </p:sp>
-      <p:pic>
-        <p:nvPicPr>
-          <p:cNvPr id="4" name="Image 3">
-            <a:extLst>
-              <a:ext uri="{FF2B5EF4-FFF2-40B4-BE49-F238E27FC236}">
-                <a16:creationId xmlns:a16="http://schemas.microsoft.com/office/drawing/2014/main" id="{F4043A68-49AD-4B17-A66C-CEDE708FEBF0}"/>
-              </a:ext>
-            </a:extLst>
-          </p:cNvPr>
-          <p:cNvPicPr>
-            <a:picLocks noChangeAspect="1"/>
-          </p:cNvPicPr>
-          <p:nvPr/>
-        </p:nvPicPr>
-        <p:blipFill>
-          <a:blip r:embed="rId3"/>
-          <a:stretch>
-            <a:fillRect/>
-          </a:stretch>
-        </p:blipFill>
-        <p:spPr>
-          <a:xfrm>
-            <a:off x="314886" y="1220653"/>
-            <a:ext cx="8570796" cy="5600718"/>
-          </a:xfrm>
-          <a:prstGeom prst="rect">
-            <a:avLst/>
-          </a:prstGeom>
-        </p:spPr>
-      </p:pic>
     </p:spTree>
     <p:extLst>
       <p:ext uri="{BB962C8B-B14F-4D97-AF65-F5344CB8AC3E}">
@@ -8707,36 +8650,6 @@
           </a:p>
         </p:txBody>
       </p:sp>
-      <p:pic>
-        <p:nvPicPr>
-          <p:cNvPr id="4" name="Image 3">
-            <a:extLst>
-              <a:ext uri="{FF2B5EF4-FFF2-40B4-BE49-F238E27FC236}">
-                <a16:creationId xmlns:a16="http://schemas.microsoft.com/office/drawing/2014/main" id="{EB08F633-2131-4DF7-99CF-8F105CAF1306}"/>
-              </a:ext>
-            </a:extLst>
-          </p:cNvPr>
-          <p:cNvPicPr>
-            <a:picLocks noChangeAspect="1"/>
-          </p:cNvPicPr>
-          <p:nvPr/>
-        </p:nvPicPr>
-        <p:blipFill>
-          <a:blip r:embed="rId3"/>
-          <a:stretch>
-            <a:fillRect/>
-          </a:stretch>
-        </p:blipFill>
-        <p:spPr>
-          <a:xfrm>
-            <a:off x="219075" y="1666875"/>
-            <a:ext cx="9196607" cy="4610099"/>
-          </a:xfrm>
-          <a:prstGeom prst="rect">
-            <a:avLst/>
-          </a:prstGeom>
-        </p:spPr>
-      </p:pic>
     </p:spTree>
     <p:extLst>
       <p:ext uri="{BB962C8B-B14F-4D97-AF65-F5344CB8AC3E}">

</xml_diff>

<commit_message>
MAJ GANTT - MAJ REVUE 2
</commit_message>
<xml_diff>
--- a/Nathan/Compte-rendus/REVUE-R2-GUIGAND-SFL6.pptx
+++ b/Nathan/Compte-rendus/REVUE-R2-GUIGAND-SFL6.pptx
@@ -13,9 +13,10 @@
     <p:sldId id="266" r:id="rId7"/>
     <p:sldId id="261" r:id="rId8"/>
     <p:sldId id="264" r:id="rId9"/>
-    <p:sldId id="265" r:id="rId10"/>
-    <p:sldId id="262" r:id="rId11"/>
-    <p:sldId id="263" r:id="rId12"/>
+    <p:sldId id="267" r:id="rId10"/>
+    <p:sldId id="265" r:id="rId11"/>
+    <p:sldId id="262" r:id="rId12"/>
+    <p:sldId id="263" r:id="rId13"/>
   </p:sldIdLst>
   <p:sldSz cx="12192000" cy="6858000"/>
   <p:notesSz cx="6858000" cy="9144000"/>
@@ -845,7 +846,7 @@
             <a:fld id="{B61BEF0D-F0BB-DE4B-95CE-6DB70DBA9567}" type="datetimeFigureOut">
               <a:rPr lang="en-US" dirty="0"/>
               <a:pPr/>
-              <a:t>2/26/2020</a:t>
+              <a:t>3/3/2020</a:t>
             </a:fld>
             <a:endParaRPr lang="en-US" dirty="0"/>
           </a:p>
@@ -1093,7 +1094,7 @@
             <a:fld id="{B61BEF0D-F0BB-DE4B-95CE-6DB70DBA9567}" type="datetimeFigureOut">
               <a:rPr lang="en-US" dirty="0"/>
               <a:pPr/>
-              <a:t>2/26/2020</a:t>
+              <a:t>3/3/2020</a:t>
             </a:fld>
             <a:endParaRPr lang="en-US" dirty="0"/>
           </a:p>
@@ -1404,7 +1405,7 @@
             <a:fld id="{B61BEF0D-F0BB-DE4B-95CE-6DB70DBA9567}" type="datetimeFigureOut">
               <a:rPr lang="en-US" dirty="0"/>
               <a:pPr/>
-              <a:t>2/26/2020</a:t>
+              <a:t>3/3/2020</a:t>
             </a:fld>
             <a:endParaRPr lang="en-US" dirty="0"/>
           </a:p>
@@ -1742,7 +1743,7 @@
             <a:fld id="{B61BEF0D-F0BB-DE4B-95CE-6DB70DBA9567}" type="datetimeFigureOut">
               <a:rPr lang="en-US" dirty="0"/>
               <a:pPr/>
-              <a:t>2/26/2020</a:t>
+              <a:t>3/3/2020</a:t>
             </a:fld>
             <a:endParaRPr lang="en-US" dirty="0"/>
           </a:p>
@@ -2053,7 +2054,7 @@
             <a:fld id="{B61BEF0D-F0BB-DE4B-95CE-6DB70DBA9567}" type="datetimeFigureOut">
               <a:rPr lang="en-US" dirty="0"/>
               <a:pPr/>
-              <a:t>2/26/2020</a:t>
+              <a:t>3/3/2020</a:t>
             </a:fld>
             <a:endParaRPr lang="en-US" dirty="0"/>
           </a:p>
@@ -2443,7 +2444,7 @@
             <a:fld id="{B61BEF0D-F0BB-DE4B-95CE-6DB70DBA9567}" type="datetimeFigureOut">
               <a:rPr lang="en-US" dirty="0"/>
               <a:pPr/>
-              <a:t>2/26/2020</a:t>
+              <a:t>3/3/2020</a:t>
             </a:fld>
             <a:endParaRPr lang="en-US" dirty="0"/>
           </a:p>
@@ -2609,7 +2610,7 @@
           <a:p>
             <a:fld id="{55C6B4A9-1611-4792-9094-5F34BCA07E0B}" type="datetimeFigureOut">
               <a:rPr lang="en-US" dirty="0"/>
-              <a:t>2/26/2020</a:t>
+              <a:t>3/3/2020</a:t>
             </a:fld>
             <a:endParaRPr lang="en-US" dirty="0"/>
           </a:p>
@@ -2785,7 +2786,7 @@
             <a:fld id="{B61BEF0D-F0BB-DE4B-95CE-6DB70DBA9567}" type="datetimeFigureOut">
               <a:rPr lang="en-US" dirty="0"/>
               <a:pPr/>
-              <a:t>2/26/2020</a:t>
+              <a:t>3/3/2020</a:t>
             </a:fld>
             <a:endParaRPr lang="en-US" dirty="0"/>
           </a:p>
@@ -2958,7 +2959,7 @@
             <a:fld id="{B61BEF0D-F0BB-DE4B-95CE-6DB70DBA9567}" type="datetimeFigureOut">
               <a:rPr lang="en-US" dirty="0"/>
               <a:pPr/>
-              <a:t>2/26/2020</a:t>
+              <a:t>3/3/2020</a:t>
             </a:fld>
             <a:endParaRPr lang="en-US" dirty="0"/>
           </a:p>
@@ -3202,7 +3203,7 @@
             <a:fld id="{B61BEF0D-F0BB-DE4B-95CE-6DB70DBA9567}" type="datetimeFigureOut">
               <a:rPr lang="en-US" dirty="0"/>
               <a:pPr/>
-              <a:t>2/26/2020</a:t>
+              <a:t>3/3/2020</a:t>
             </a:fld>
             <a:endParaRPr lang="en-US" dirty="0"/>
           </a:p>
@@ -3430,7 +3431,7 @@
           <a:p>
             <a:fld id="{EB712588-04B1-427B-82EE-E8DB90309F08}" type="datetimeFigureOut">
               <a:rPr lang="en-US" dirty="0"/>
-              <a:t>2/26/2020</a:t>
+              <a:t>3/3/2020</a:t>
             </a:fld>
             <a:endParaRPr lang="en-US" dirty="0"/>
           </a:p>
@@ -3800,7 +3801,7 @@
             <a:fld id="{B61BEF0D-F0BB-DE4B-95CE-6DB70DBA9567}" type="datetimeFigureOut">
               <a:rPr lang="en-US" dirty="0"/>
               <a:pPr/>
-              <a:t>2/26/2020</a:t>
+              <a:t>3/3/2020</a:t>
             </a:fld>
             <a:endParaRPr lang="en-US" dirty="0"/>
           </a:p>
@@ -3920,7 +3921,7 @@
             <a:fld id="{B61BEF0D-F0BB-DE4B-95CE-6DB70DBA9567}" type="datetimeFigureOut">
               <a:rPr lang="en-US" dirty="0"/>
               <a:pPr/>
-              <a:t>2/26/2020</a:t>
+              <a:t>3/3/2020</a:t>
             </a:fld>
             <a:endParaRPr lang="en-US" dirty="0"/>
           </a:p>
@@ -4012,7 +4013,7 @@
             <a:fld id="{B61BEF0D-F0BB-DE4B-95CE-6DB70DBA9567}" type="datetimeFigureOut">
               <a:rPr lang="en-US" dirty="0"/>
               <a:pPr/>
-              <a:t>2/26/2020</a:t>
+              <a:t>3/3/2020</a:t>
             </a:fld>
             <a:endParaRPr lang="en-US" dirty="0"/>
           </a:p>
@@ -4263,7 +4264,7 @@
           <a:p>
             <a:fld id="{42A54C80-263E-416B-A8E0-580EDEADCBDC}" type="datetimeFigureOut">
               <a:rPr lang="en-US" dirty="0"/>
-              <a:t>2/26/2020</a:t>
+              <a:t>3/3/2020</a:t>
             </a:fld>
             <a:endParaRPr lang="en-US" dirty="0"/>
           </a:p>
@@ -4522,7 +4523,7 @@
             <a:fld id="{B61BEF0D-F0BB-DE4B-95CE-6DB70DBA9567}" type="datetimeFigureOut">
               <a:rPr lang="en-US" dirty="0"/>
               <a:pPr/>
-              <a:t>2/26/2020</a:t>
+              <a:t>3/3/2020</a:t>
             </a:fld>
             <a:endParaRPr lang="en-US" dirty="0"/>
           </a:p>
@@ -5262,7 +5263,7 @@
             <a:fld id="{B61BEF0D-F0BB-DE4B-95CE-6DB70DBA9567}" type="datetimeFigureOut">
               <a:rPr lang="en-US" dirty="0"/>
               <a:pPr/>
-              <a:t>2/26/2020</a:t>
+              <a:t>3/3/2020</a:t>
             </a:fld>
             <a:endParaRPr lang="en-US" dirty="0"/>
           </a:p>
@@ -6955,6 +6956,176 @@
           <p:cNvPr id="3" name="ZoneTexte 2">
             <a:extLst>
               <a:ext uri="{FF2B5EF4-FFF2-40B4-BE49-F238E27FC236}">
+                <a16:creationId xmlns:a16="http://schemas.microsoft.com/office/drawing/2014/main" id="{16637F4C-A45D-4A64-84F7-746FFFD316BB}"/>
+              </a:ext>
+            </a:extLst>
+          </p:cNvPr>
+          <p:cNvSpPr txBox="1"/>
+          <p:nvPr/>
+        </p:nvSpPr>
+        <p:spPr>
+          <a:xfrm>
+            <a:off x="2816352" y="143435"/>
+            <a:ext cx="5897880" cy="1077218"/>
+          </a:xfrm>
+          <a:prstGeom prst="rect">
+            <a:avLst/>
+          </a:prstGeom>
+          <a:noFill/>
+          <a:ln>
+            <a:noFill/>
+          </a:ln>
+          <a:effectLst>
+            <a:glow rad="63500">
+              <a:schemeClr val="accent4">
+                <a:satMod val="175000"/>
+                <a:alpha val="40000"/>
+              </a:schemeClr>
+            </a:glow>
+            <a:outerShdw blurRad="50800" dist="38100" dir="5400000" algn="t" rotWithShape="0">
+              <a:prstClr val="black">
+                <a:alpha val="40000"/>
+              </a:prstClr>
+            </a:outerShdw>
+          </a:effectLst>
+          <a:scene3d>
+            <a:camera prst="orthographicFront">
+              <a:rot lat="0" lon="0" rev="0"/>
+            </a:camera>
+            <a:lightRig rig="soft" dir="t">
+              <a:rot lat="0" lon="0" rev="0"/>
+            </a:lightRig>
+          </a:scene3d>
+          <a:sp3d contourW="44450" prstMaterial="matte">
+            <a:bevelT w="63500" h="63500" prst="artDeco"/>
+            <a:contourClr>
+              <a:srgbClr val="FFFFFF"/>
+            </a:contourClr>
+          </a:sp3d>
+        </p:spPr>
+        <p:txBody>
+          <a:bodyPr wrap="square" rtlCol="0">
+            <a:spAutoFit/>
+          </a:bodyPr>
+          <a:lstStyle/>
+          <a:p>
+            <a:pPr algn="ctr"/>
+            <a:r>
+              <a:rPr lang="fr-FR" sz="3600" b="1" dirty="0">
+                <a:latin typeface="Eras Medium ITC" panose="020B0602030504020804" pitchFamily="34" charset="0"/>
+              </a:rPr>
+              <a:t>Diagramme de séquence : </a:t>
+            </a:r>
+            <a:r>
+              <a:rPr lang="fr-FR" sz="2800" b="1" dirty="0">
+                <a:solidFill>
+                  <a:srgbClr val="A41258"/>
+                </a:solidFill>
+                <a:latin typeface="Eras Medium ITC" panose="020B0602030504020804" pitchFamily="34" charset="0"/>
+              </a:rPr>
+              <a:t>Fin de la partie</a:t>
+            </a:r>
+            <a:endParaRPr lang="fr-FR" sz="3200" b="1" dirty="0">
+              <a:solidFill>
+                <a:srgbClr val="A41258"/>
+              </a:solidFill>
+              <a:latin typeface="Eras Medium ITC" panose="020B0602030504020804" pitchFamily="34" charset="0"/>
+            </a:endParaRPr>
+          </a:p>
+        </p:txBody>
+      </p:sp>
+    </p:spTree>
+    <p:extLst>
+      <p:ext uri="{BB962C8B-B14F-4D97-AF65-F5344CB8AC3E}">
+        <p14:creationId xmlns:p14="http://schemas.microsoft.com/office/powerpoint/2010/main" val="296410980"/>
+      </p:ext>
+    </p:extLst>
+  </p:cSld>
+  <p:clrMapOvr>
+    <a:masterClrMapping/>
+  </p:clrMapOvr>
+  <mc:AlternateContent xmlns:mc="http://schemas.openxmlformats.org/markup-compatibility/2006" xmlns:p159="http://schemas.microsoft.com/office/powerpoint/2015/09/main">
+    <mc:Choice Requires="p159">
+      <p:transition xmlns:p14="http://schemas.microsoft.com/office/powerpoint/2010/main" spd="slow" p14:dur="2000">
+        <p159:morph option="byObject"/>
+      </p:transition>
+    </mc:Choice>
+    <mc:Fallback xmlns="">
+      <p:transition spd="slow">
+        <p:fade/>
+      </p:transition>
+    </mc:Fallback>
+  </mc:AlternateContent>
+</p:sld>
+</file>
+
+<file path=ppt/slides/slide11.xml><?xml version="1.0" encoding="utf-8"?>
+<p:sld xmlns:a="http://schemas.openxmlformats.org/drawingml/2006/main" xmlns:r="http://schemas.openxmlformats.org/officeDocument/2006/relationships" xmlns:p="http://schemas.openxmlformats.org/presentationml/2006/main">
+  <p:cSld>
+    <p:spTree>
+      <p:nvGrpSpPr>
+        <p:cNvPr id="1" name=""/>
+        <p:cNvGrpSpPr/>
+        <p:nvPr/>
+      </p:nvGrpSpPr>
+      <p:grpSpPr>
+        <a:xfrm>
+          <a:off x="0" y="0"/>
+          <a:ext cx="0" cy="0"/>
+          <a:chOff x="0" y="0"/>
+          <a:chExt cx="0" cy="0"/>
+        </a:xfrm>
+      </p:grpSpPr>
+      <p:pic>
+        <p:nvPicPr>
+          <p:cNvPr id="1026" name="Picture 2" descr="Image associée">
+            <a:extLst>
+              <a:ext uri="{FF2B5EF4-FFF2-40B4-BE49-F238E27FC236}">
+                <a16:creationId xmlns:a16="http://schemas.microsoft.com/office/drawing/2014/main" id="{C816F3D8-CC4C-46B3-A21E-58AE9AD30454}"/>
+              </a:ext>
+            </a:extLst>
+          </p:cNvPr>
+          <p:cNvPicPr>
+            <a:picLocks noChangeAspect="1" noChangeArrowheads="1"/>
+          </p:cNvPicPr>
+          <p:nvPr/>
+        </p:nvPicPr>
+        <p:blipFill rotWithShape="1">
+          <a:blip r:embed="rId2">
+            <a:extLst>
+              <a:ext uri="{28A0092B-C50C-407E-A947-70E740481C1C}">
+                <a14:useLocalDpi xmlns:a14="http://schemas.microsoft.com/office/drawing/2010/main" val="0"/>
+              </a:ext>
+            </a:extLst>
+          </a:blip>
+          <a:srcRect l="18677" r="15441"/>
+          <a:stretch/>
+        </p:blipFill>
+        <p:spPr bwMode="auto">
+          <a:xfrm>
+            <a:off x="143436" y="143435"/>
+            <a:ext cx="2269635" cy="609600"/>
+          </a:xfrm>
+          <a:prstGeom prst="rect">
+            <a:avLst/>
+          </a:prstGeom>
+          <a:noFill/>
+          <a:extLst>
+            <a:ext uri="{909E8E84-426E-40DD-AFC4-6F175D3DCCD1}">
+              <a14:hiddenFill xmlns:a14="http://schemas.microsoft.com/office/drawing/2010/main">
+                <a:solidFill>
+                  <a:srgbClr val="FFFFFF"/>
+                </a:solidFill>
+              </a14:hiddenFill>
+            </a:ext>
+          </a:extLst>
+        </p:spPr>
+      </p:pic>
+      <p:sp>
+        <p:nvSpPr>
+          <p:cNvPr id="3" name="ZoneTexte 2">
+            <a:extLst>
+              <a:ext uri="{FF2B5EF4-FFF2-40B4-BE49-F238E27FC236}">
                 <a16:creationId xmlns:a16="http://schemas.microsoft.com/office/drawing/2014/main" id="{B5DA24B5-6993-45AE-B83E-5BA1E69FACD0}"/>
               </a:ext>
             </a:extLst>
@@ -7091,7 +7262,7 @@
 </p:sld>
 </file>
 
-<file path=ppt/slides/slide11.xml><?xml version="1.0" encoding="utf-8"?>
+<file path=ppt/slides/slide12.xml><?xml version="1.0" encoding="utf-8"?>
 <p:sld xmlns:a="http://schemas.openxmlformats.org/drawingml/2006/main" xmlns:r="http://schemas.openxmlformats.org/officeDocument/2006/relationships" xmlns:p="http://schemas.openxmlformats.org/presentationml/2006/main">
   <p:cSld>
     <p:spTree>
@@ -8241,7 +8412,7 @@
         </p:nvSpPr>
         <p:spPr>
           <a:xfrm>
-            <a:off x="2816352" y="143435"/>
+            <a:off x="2556644" y="-90374"/>
             <a:ext cx="5897880" cy="1077218"/>
           </a:xfrm>
           <a:prstGeom prst="rect">
@@ -8310,6 +8481,36 @@
           </a:p>
         </p:txBody>
       </p:sp>
+      <p:pic>
+        <p:nvPicPr>
+          <p:cNvPr id="4" name="Image 3" descr="Une image contenant texte, carte, gâteau, table&#10;&#10;Description générée automatiquement">
+            <a:extLst>
+              <a:ext uri="{FF2B5EF4-FFF2-40B4-BE49-F238E27FC236}">
+                <a16:creationId xmlns:a16="http://schemas.microsoft.com/office/drawing/2014/main" id="{4EE797FD-FCAD-4A4C-8AB7-9F79822D2D4D}"/>
+              </a:ext>
+            </a:extLst>
+          </p:cNvPr>
+          <p:cNvPicPr>
+            <a:picLocks noChangeAspect="1"/>
+          </p:cNvPicPr>
+          <p:nvPr/>
+        </p:nvPicPr>
+        <p:blipFill>
+          <a:blip r:embed="rId3"/>
+          <a:stretch>
+            <a:fillRect/>
+          </a:stretch>
+        </p:blipFill>
+        <p:spPr>
+          <a:xfrm>
+            <a:off x="2556644" y="905672"/>
+            <a:ext cx="5703667" cy="5952328"/>
+          </a:xfrm>
+          <a:prstGeom prst="rect">
+            <a:avLst/>
+          </a:prstGeom>
+        </p:spPr>
+      </p:pic>
     </p:spTree>
     <p:extLst>
       <p:ext uri="{BB962C8B-B14F-4D97-AF65-F5344CB8AC3E}">
@@ -8480,6 +8681,36 @@
           </a:p>
         </p:txBody>
       </p:sp>
+      <p:pic>
+        <p:nvPicPr>
+          <p:cNvPr id="2" name="Image 1">
+            <a:extLst>
+              <a:ext uri="{FF2B5EF4-FFF2-40B4-BE49-F238E27FC236}">
+                <a16:creationId xmlns:a16="http://schemas.microsoft.com/office/drawing/2014/main" id="{BE6E4815-E682-4D4C-8B5A-FE22800EA057}"/>
+              </a:ext>
+            </a:extLst>
+          </p:cNvPr>
+          <p:cNvPicPr>
+            <a:picLocks noChangeAspect="1"/>
+          </p:cNvPicPr>
+          <p:nvPr/>
+        </p:nvPicPr>
+        <p:blipFill>
+          <a:blip r:embed="rId3"/>
+          <a:stretch>
+            <a:fillRect/>
+          </a:stretch>
+        </p:blipFill>
+        <p:spPr>
+          <a:xfrm>
+            <a:off x="223209" y="1142202"/>
+            <a:ext cx="9002381" cy="5715798"/>
+          </a:xfrm>
+          <a:prstGeom prst="rect">
+            <a:avLst/>
+          </a:prstGeom>
+        </p:spPr>
+      </p:pic>
     </p:spTree>
     <p:extLst>
       <p:ext uri="{BB962C8B-B14F-4D97-AF65-F5344CB8AC3E}">
@@ -8524,154 +8755,47 @@
       </p:grpSpPr>
       <p:pic>
         <p:nvPicPr>
-          <p:cNvPr id="1026" name="Picture 2" descr="Image associée">
+          <p:cNvPr id="4" name="Image 3">
             <a:extLst>
               <a:ext uri="{FF2B5EF4-FFF2-40B4-BE49-F238E27FC236}">
-                <a16:creationId xmlns:a16="http://schemas.microsoft.com/office/drawing/2014/main" id="{C816F3D8-CC4C-46B3-A21E-58AE9AD30454}"/>
+                <a16:creationId xmlns:a16="http://schemas.microsoft.com/office/drawing/2014/main" id="{BE4AC4FA-FF20-4090-A93F-4F73AC65A491}"/>
               </a:ext>
             </a:extLst>
           </p:cNvPr>
           <p:cNvPicPr>
-            <a:picLocks noChangeAspect="1" noChangeArrowheads="1"/>
+            <a:picLocks noChangeAspect="1"/>
           </p:cNvPicPr>
           <p:nvPr/>
         </p:nvPicPr>
-        <p:blipFill rotWithShape="1">
-          <a:blip r:embed="rId2">
-            <a:extLst>
-              <a:ext uri="{28A0092B-C50C-407E-A947-70E740481C1C}">
-                <a14:useLocalDpi xmlns:a14="http://schemas.microsoft.com/office/drawing/2010/main" val="0"/>
-              </a:ext>
-            </a:extLst>
-          </a:blip>
-          <a:srcRect l="18677" r="15441"/>
-          <a:stretch/>
+        <p:blipFill>
+          <a:blip r:embed="rId2"/>
+          <a:stretch>
+            <a:fillRect/>
+          </a:stretch>
         </p:blipFill>
-        <p:spPr bwMode="auto">
+        <p:spPr>
           <a:xfrm>
-            <a:off x="143436" y="143435"/>
-            <a:ext cx="2269635" cy="609600"/>
+            <a:off x="288825" y="0"/>
+            <a:ext cx="8921850" cy="7038975"/>
           </a:xfrm>
           <a:prstGeom prst="rect">
             <a:avLst/>
           </a:prstGeom>
-          <a:noFill/>
-          <a:extLst>
-            <a:ext uri="{909E8E84-426E-40DD-AFC4-6F175D3DCCD1}">
-              <a14:hiddenFill xmlns:a14="http://schemas.microsoft.com/office/drawing/2010/main">
-                <a:solidFill>
-                  <a:srgbClr val="FFFFFF"/>
-                </a:solidFill>
-              </a14:hiddenFill>
-            </a:ext>
-          </a:extLst>
         </p:spPr>
       </p:pic>
-      <p:sp>
-        <p:nvSpPr>
-          <p:cNvPr id="3" name="ZoneTexte 2">
-            <a:extLst>
-              <a:ext uri="{FF2B5EF4-FFF2-40B4-BE49-F238E27FC236}">
-                <a16:creationId xmlns:a16="http://schemas.microsoft.com/office/drawing/2014/main" id="{16637F4C-A45D-4A64-84F7-746FFFD316BB}"/>
-              </a:ext>
-            </a:extLst>
-          </p:cNvPr>
-          <p:cNvSpPr txBox="1"/>
-          <p:nvPr/>
-        </p:nvSpPr>
-        <p:spPr>
-          <a:xfrm>
-            <a:off x="2816352" y="143435"/>
-            <a:ext cx="5897880" cy="1077218"/>
-          </a:xfrm>
-          <a:prstGeom prst="rect">
-            <a:avLst/>
-          </a:prstGeom>
-          <a:noFill/>
-          <a:ln>
-            <a:noFill/>
-          </a:ln>
-          <a:effectLst>
-            <a:glow rad="63500">
-              <a:schemeClr val="accent4">
-                <a:satMod val="175000"/>
-                <a:alpha val="40000"/>
-              </a:schemeClr>
-            </a:glow>
-            <a:outerShdw blurRad="50800" dist="38100" dir="5400000" algn="t" rotWithShape="0">
-              <a:prstClr val="black">
-                <a:alpha val="40000"/>
-              </a:prstClr>
-            </a:outerShdw>
-          </a:effectLst>
-          <a:scene3d>
-            <a:camera prst="orthographicFront">
-              <a:rot lat="0" lon="0" rev="0"/>
-            </a:camera>
-            <a:lightRig rig="soft" dir="t">
-              <a:rot lat="0" lon="0" rev="0"/>
-            </a:lightRig>
-          </a:scene3d>
-          <a:sp3d contourW="44450" prstMaterial="matte">
-            <a:bevelT w="63500" h="63500" prst="artDeco"/>
-            <a:contourClr>
-              <a:srgbClr val="FFFFFF"/>
-            </a:contourClr>
-          </a:sp3d>
-        </p:spPr>
-        <p:txBody>
-          <a:bodyPr wrap="square" rtlCol="0">
-            <a:spAutoFit/>
-          </a:bodyPr>
-          <a:lstStyle/>
-          <a:p>
-            <a:pPr algn="ctr"/>
-            <a:r>
-              <a:rPr lang="fr-FR" sz="3600" b="1" dirty="0">
-                <a:latin typeface="Eras Medium ITC" panose="020B0602030504020804" pitchFamily="34" charset="0"/>
-              </a:rPr>
-              <a:t>Diagramme de séquence : </a:t>
-            </a:r>
-            <a:r>
-              <a:rPr lang="fr-FR" sz="2800" b="1" dirty="0">
-                <a:solidFill>
-                  <a:srgbClr val="A41258"/>
-                </a:solidFill>
-                <a:latin typeface="Eras Medium ITC" panose="020B0602030504020804" pitchFamily="34" charset="0"/>
-              </a:rPr>
-              <a:t>Fin de la partie</a:t>
-            </a:r>
-            <a:endParaRPr lang="fr-FR" sz="3200" b="1" dirty="0">
-              <a:solidFill>
-                <a:srgbClr val="A41258"/>
-              </a:solidFill>
-              <a:latin typeface="Eras Medium ITC" panose="020B0602030504020804" pitchFamily="34" charset="0"/>
-            </a:endParaRPr>
-          </a:p>
-        </p:txBody>
-      </p:sp>
     </p:spTree>
     <p:extLst>
       <p:ext uri="{BB962C8B-B14F-4D97-AF65-F5344CB8AC3E}">
-        <p14:creationId xmlns:p14="http://schemas.microsoft.com/office/powerpoint/2010/main" val="296410980"/>
+        <p14:creationId xmlns:p14="http://schemas.microsoft.com/office/powerpoint/2010/main" val="2119402248"/>
       </p:ext>
     </p:extLst>
   </p:cSld>
   <p:clrMapOvr>
     <a:masterClrMapping/>
   </p:clrMapOvr>
-  <mc:AlternateContent xmlns:mc="http://schemas.openxmlformats.org/markup-compatibility/2006" xmlns:p159="http://schemas.microsoft.com/office/powerpoint/2015/09/main">
-    <mc:Choice Requires="p159">
-      <p:transition xmlns:p14="http://schemas.microsoft.com/office/powerpoint/2010/main" spd="slow" p14:dur="2000">
-        <p159:morph option="byObject"/>
-      </p:transition>
-    </mc:Choice>
-    <mc:Fallback xmlns="">
-      <p:transition spd="slow">
-        <p:fade/>
-      </p:transition>
-    </mc:Fallback>
-  </mc:AlternateContent>
+  <p:transition spd="slow">
+    <p:push dir="u"/>
+  </p:transition>
 </p:sld>
 </file>
 

</xml_diff>

<commit_message>
MAJ des diagrammes de séquences et corrections des erreurs. Poursuite et intégration des diagrammes dans le diaporama de revue 2. Apport de quelques modifications sur l'ébauche de l'application de supervision.
</commit_message>
<xml_diff>
--- a/Nathan/Compte-rendus/REVUE-R2-GUIGAND-SFL6.pptx
+++ b/Nathan/Compte-rendus/REVUE-R2-GUIGAND-SFL6.pptx
@@ -10048,10 +10048,10 @@
       </p:grpSpPr>
       <p:pic>
         <p:nvPicPr>
-          <p:cNvPr id="4" name="Image 3">
+          <p:cNvPr id="2" name="Image 1">
             <a:extLst>
               <a:ext uri="{FF2B5EF4-FFF2-40B4-BE49-F238E27FC236}">
-                <a16:creationId xmlns:a16="http://schemas.microsoft.com/office/drawing/2014/main" id="{BE4AC4FA-FF20-4090-A93F-4F73AC65A491}"/>
+                <a16:creationId xmlns:a16="http://schemas.microsoft.com/office/drawing/2014/main" id="{C59FFCD1-E399-4C08-B4EB-D9717532E202}"/>
               </a:ext>
             </a:extLst>
           </p:cNvPr>
@@ -10068,8 +10068,8 @@
         </p:blipFill>
         <p:spPr>
           <a:xfrm>
-            <a:off x="288825" y="0"/>
-            <a:ext cx="8921850" cy="7038975"/>
+            <a:off x="154247" y="0"/>
+            <a:ext cx="9631378" cy="5943600"/>
           </a:xfrm>
           <a:prstGeom prst="rect">
             <a:avLst/>
@@ -10156,10 +10156,10 @@
       </p:pic>
       <p:sp>
         <p:nvSpPr>
-          <p:cNvPr id="3" name="ZoneTexte 2">
+          <p:cNvPr id="4" name="ZoneTexte 3">
             <a:extLst>
               <a:ext uri="{FF2B5EF4-FFF2-40B4-BE49-F238E27FC236}">
-                <a16:creationId xmlns:a16="http://schemas.microsoft.com/office/drawing/2014/main" id="{16637F4C-A45D-4A64-84F7-746FFFD316BB}"/>
+                <a16:creationId xmlns:a16="http://schemas.microsoft.com/office/drawing/2014/main" id="{AFEFDC9A-F213-46F7-BBEE-B6AD1F72BF47}"/>
               </a:ext>
             </a:extLst>
           </p:cNvPr>
@@ -10168,8 +10168,8 @@
         </p:nvSpPr>
         <p:spPr>
           <a:xfrm>
-            <a:off x="2816352" y="143435"/>
-            <a:ext cx="5897880" cy="1077218"/>
+            <a:off x="0" y="2693239"/>
+            <a:ext cx="3242435" cy="646331"/>
           </a:xfrm>
           <a:prstGeom prst="rect">
             <a:avLst/>
@@ -10214,13 +10214,13 @@
           <a:p>
             <a:pPr algn="ctr"/>
             <a:r>
-              <a:rPr lang="fr-FR" sz="3600" b="1" dirty="0">
+              <a:rPr lang="fr-FR" sz="2000" b="1" dirty="0">
                 <a:latin typeface="Eras Medium ITC" panose="020B0602030504020804" pitchFamily="34" charset="0"/>
               </a:rPr>
               <a:t>Diagramme de séquence : </a:t>
             </a:r>
             <a:r>
-              <a:rPr lang="fr-FR" sz="2800" b="1" dirty="0">
+              <a:rPr lang="fr-FR" sz="1600" b="1" dirty="0">
                 <a:solidFill>
                   <a:srgbClr val="A41258"/>
                 </a:solidFill>
@@ -10228,7 +10228,7 @@
               </a:rPr>
               <a:t>Fin de la partie</a:t>
             </a:r>
-            <a:endParaRPr lang="fr-FR" sz="3200" b="1" dirty="0">
+            <a:endParaRPr lang="fr-FR" b="1" dirty="0">
               <a:solidFill>
                 <a:srgbClr val="A41258"/>
               </a:solidFill>
@@ -10237,6 +10237,36 @@
           </a:p>
         </p:txBody>
       </p:sp>
+      <p:pic>
+        <p:nvPicPr>
+          <p:cNvPr id="2" name="Image 1">
+            <a:extLst>
+              <a:ext uri="{FF2B5EF4-FFF2-40B4-BE49-F238E27FC236}">
+                <a16:creationId xmlns:a16="http://schemas.microsoft.com/office/drawing/2014/main" id="{C333449A-FDA8-4476-8BB6-3C164B35991D}"/>
+              </a:ext>
+            </a:extLst>
+          </p:cNvPr>
+          <p:cNvPicPr>
+            <a:picLocks noChangeAspect="1"/>
+          </p:cNvPicPr>
+          <p:nvPr/>
+        </p:nvPicPr>
+        <p:blipFill>
+          <a:blip r:embed="rId3"/>
+          <a:stretch>
+            <a:fillRect/>
+          </a:stretch>
+        </p:blipFill>
+        <p:spPr>
+          <a:xfrm>
+            <a:off x="2413071" y="71717"/>
+            <a:ext cx="8536272" cy="6714565"/>
+          </a:xfrm>
+          <a:prstGeom prst="rect">
+            <a:avLst/>
+          </a:prstGeom>
+        </p:spPr>
+      </p:pic>
     </p:spTree>
     <p:extLst>
       <p:ext uri="{BB962C8B-B14F-4D97-AF65-F5344CB8AC3E}">
@@ -11891,8 +11921,8 @@
         </p:nvSpPr>
         <p:spPr>
           <a:xfrm>
-            <a:off x="2556644" y="-90374"/>
-            <a:ext cx="5897880" cy="1077218"/>
+            <a:off x="-106043" y="2836021"/>
+            <a:ext cx="3242435" cy="646331"/>
           </a:xfrm>
           <a:prstGeom prst="rect">
             <a:avLst/>
@@ -11937,13 +11967,13 @@
           <a:p>
             <a:pPr algn="ctr"/>
             <a:r>
-              <a:rPr lang="fr-FR" sz="3600" b="1" dirty="0">
+              <a:rPr lang="fr-FR" sz="2000" b="1" dirty="0">
                 <a:latin typeface="Eras Medium ITC" panose="020B0602030504020804" pitchFamily="34" charset="0"/>
               </a:rPr>
               <a:t>Diagramme de séquence : </a:t>
             </a:r>
             <a:r>
-              <a:rPr lang="fr-FR" sz="2800" b="1" dirty="0">
+              <a:rPr lang="fr-FR" sz="1600" b="1" dirty="0">
                 <a:solidFill>
                   <a:srgbClr val="A41258"/>
                 </a:solidFill>
@@ -11951,7 +11981,7 @@
               </a:rPr>
               <a:t>Lancement d’une partie</a:t>
             </a:r>
-            <a:endParaRPr lang="fr-FR" sz="3200" b="1" dirty="0">
+            <a:endParaRPr lang="fr-FR" b="1" dirty="0">
               <a:solidFill>
                 <a:srgbClr val="A41258"/>
               </a:solidFill>
@@ -11962,10 +11992,10 @@
       </p:sp>
       <p:pic>
         <p:nvPicPr>
-          <p:cNvPr id="4" name="Image 3" descr="Une image contenant texte, carte, gâteau, table&#10;&#10;Description générée automatiquement">
+          <p:cNvPr id="2" name="Image 1">
             <a:extLst>
               <a:ext uri="{FF2B5EF4-FFF2-40B4-BE49-F238E27FC236}">
-                <a16:creationId xmlns:a16="http://schemas.microsoft.com/office/drawing/2014/main" id="{4EE797FD-FCAD-4A4C-8AB7-9F79822D2D4D}"/>
+                <a16:creationId xmlns:a16="http://schemas.microsoft.com/office/drawing/2014/main" id="{EB85B4BA-1247-4132-A680-7202937A7093}"/>
               </a:ext>
             </a:extLst>
           </p:cNvPr>
@@ -11982,8 +12012,8 @@
         </p:blipFill>
         <p:spPr>
           <a:xfrm>
-            <a:off x="2556644" y="905672"/>
-            <a:ext cx="5703667" cy="5952328"/>
+            <a:off x="2412013" y="-119099"/>
+            <a:ext cx="7367973" cy="6977099"/>
           </a:xfrm>
           <a:prstGeom prst="rect">
             <a:avLst/>
@@ -12079,10 +12109,10 @@
       </p:pic>
       <p:sp>
         <p:nvSpPr>
-          <p:cNvPr id="3" name="ZoneTexte 2">
+          <p:cNvPr id="5" name="ZoneTexte 4">
             <a:extLst>
               <a:ext uri="{FF2B5EF4-FFF2-40B4-BE49-F238E27FC236}">
-                <a16:creationId xmlns:a16="http://schemas.microsoft.com/office/drawing/2014/main" id="{16637F4C-A45D-4A64-84F7-746FFFD316BB}"/>
+                <a16:creationId xmlns:a16="http://schemas.microsoft.com/office/drawing/2014/main" id="{DE4D560C-9537-428C-82EA-D1E94E276955}"/>
               </a:ext>
             </a:extLst>
           </p:cNvPr>
@@ -12091,8 +12121,8 @@
         </p:nvSpPr>
         <p:spPr>
           <a:xfrm>
-            <a:off x="2816352" y="143435"/>
-            <a:ext cx="5897880" cy="1077218"/>
+            <a:off x="3560382" y="125069"/>
+            <a:ext cx="3242435" cy="646331"/>
           </a:xfrm>
           <a:prstGeom prst="rect">
             <a:avLst/>
@@ -12137,13 +12167,13 @@
           <a:p>
             <a:pPr algn="ctr"/>
             <a:r>
-              <a:rPr lang="fr-FR" sz="3600" b="1" dirty="0">
+              <a:rPr lang="fr-FR" sz="2000" b="1" dirty="0">
                 <a:latin typeface="Eras Medium ITC" panose="020B0602030504020804" pitchFamily="34" charset="0"/>
               </a:rPr>
               <a:t>Diagramme de séquence : </a:t>
             </a:r>
             <a:r>
-              <a:rPr lang="fr-FR" sz="2800" b="1" dirty="0">
+              <a:rPr lang="fr-FR" sz="1600" b="1" dirty="0">
                 <a:solidFill>
                   <a:srgbClr val="A41258"/>
                 </a:solidFill>
@@ -12151,7 +12181,7 @@
               </a:rPr>
               <a:t>Envoi d’un message</a:t>
             </a:r>
-            <a:endParaRPr lang="fr-FR" sz="3200" b="1" dirty="0">
+            <a:endParaRPr lang="fr-FR" b="1" dirty="0">
               <a:solidFill>
                 <a:srgbClr val="A41258"/>
               </a:solidFill>
@@ -12162,10 +12192,10 @@
       </p:sp>
       <p:pic>
         <p:nvPicPr>
-          <p:cNvPr id="2" name="Image 1">
+          <p:cNvPr id="4" name="Image 3">
             <a:extLst>
               <a:ext uri="{FF2B5EF4-FFF2-40B4-BE49-F238E27FC236}">
-                <a16:creationId xmlns:a16="http://schemas.microsoft.com/office/drawing/2014/main" id="{BE6E4815-E682-4D4C-8B5A-FE22800EA057}"/>
+                <a16:creationId xmlns:a16="http://schemas.microsoft.com/office/drawing/2014/main" id="{23D5BB14-85E0-47B6-9674-A8E0DB36C8AC}"/>
               </a:ext>
             </a:extLst>
           </p:cNvPr>
@@ -12174,16 +12204,15 @@
           </p:cNvPicPr>
           <p:nvPr/>
         </p:nvPicPr>
-        <p:blipFill>
+        <p:blipFill rotWithShape="1">
           <a:blip r:embed="rId3"/>
-          <a:stretch>
-            <a:fillRect/>
-          </a:stretch>
+          <a:srcRect t="4014"/>
+          <a:stretch/>
         </p:blipFill>
         <p:spPr>
           <a:xfrm>
-            <a:off x="223209" y="1142202"/>
-            <a:ext cx="9002381" cy="5715798"/>
+            <a:off x="143436" y="753035"/>
+            <a:ext cx="9576636" cy="6112494"/>
           </a:xfrm>
           <a:prstGeom prst="rect">
             <a:avLst/>

</xml_diff>

<commit_message>
Maj de l'ébauche de l'application de supervision. Maj du modèle relationnel et intégration dans le diaporama de revue 2.
</commit_message>
<xml_diff>
--- a/Nathan/Compte-rendus/REVUE-R2-GUIGAND-SFL6.pptx
+++ b/Nathan/Compte-rendus/REVUE-R2-GUIGAND-SFL6.pptx
@@ -12,12 +12,17 @@
     <p:sldId id="271" r:id="rId6"/>
     <p:sldId id="269" r:id="rId7"/>
     <p:sldId id="266" r:id="rId8"/>
-    <p:sldId id="261" r:id="rId9"/>
-    <p:sldId id="264" r:id="rId10"/>
-    <p:sldId id="267" r:id="rId11"/>
-    <p:sldId id="265" r:id="rId12"/>
-    <p:sldId id="262" r:id="rId13"/>
-    <p:sldId id="263" r:id="rId14"/>
+    <p:sldId id="274" r:id="rId9"/>
+    <p:sldId id="275" r:id="rId10"/>
+    <p:sldId id="276" r:id="rId11"/>
+    <p:sldId id="261" r:id="rId12"/>
+    <p:sldId id="264" r:id="rId13"/>
+    <p:sldId id="267" r:id="rId14"/>
+    <p:sldId id="265" r:id="rId15"/>
+    <p:sldId id="273" r:id="rId16"/>
+    <p:sldId id="262" r:id="rId17"/>
+    <p:sldId id="263" r:id="rId18"/>
+    <p:sldId id="272" r:id="rId19"/>
   </p:sldIdLst>
   <p:sldSz cx="12192000" cy="6858000"/>
   <p:notesSz cx="6858000" cy="9144000"/>
@@ -10046,6 +10051,643 @@
           <a:chExt cx="0" cy="0"/>
         </a:xfrm>
       </p:grpSpPr>
+      <p:sp>
+        <p:nvSpPr>
+          <p:cNvPr id="4" name="ZoneTexte 3">
+            <a:extLst>
+              <a:ext uri="{FF2B5EF4-FFF2-40B4-BE49-F238E27FC236}">
+                <a16:creationId xmlns:a16="http://schemas.microsoft.com/office/drawing/2014/main" id="{B996E070-5299-461D-9259-6BD38B8072A0}"/>
+              </a:ext>
+            </a:extLst>
+          </p:cNvPr>
+          <p:cNvSpPr txBox="1"/>
+          <p:nvPr/>
+        </p:nvSpPr>
+        <p:spPr>
+          <a:xfrm>
+            <a:off x="3323065" y="103221"/>
+            <a:ext cx="5698272" cy="1138773"/>
+          </a:xfrm>
+          <a:prstGeom prst="rect">
+            <a:avLst/>
+          </a:prstGeom>
+          <a:noFill/>
+          <a:ln>
+            <a:noFill/>
+          </a:ln>
+          <a:effectLst>
+            <a:glow rad="63500">
+              <a:schemeClr val="accent4">
+                <a:satMod val="175000"/>
+                <a:alpha val="40000"/>
+              </a:schemeClr>
+            </a:glow>
+            <a:outerShdw blurRad="50800" dist="38100" dir="5400000" algn="t" rotWithShape="0">
+              <a:prstClr val="black">
+                <a:alpha val="40000"/>
+              </a:prstClr>
+            </a:outerShdw>
+          </a:effectLst>
+          <a:scene3d>
+            <a:camera prst="orthographicFront">
+              <a:rot lat="0" lon="0" rev="0"/>
+            </a:camera>
+            <a:lightRig rig="soft" dir="t">
+              <a:rot lat="0" lon="0" rev="0"/>
+            </a:lightRig>
+          </a:scene3d>
+          <a:sp3d contourW="44450" prstMaterial="matte">
+            <a:bevelT w="63500" h="63500" prst="artDeco"/>
+            <a:contourClr>
+              <a:srgbClr val="FFFFFF"/>
+            </a:contourClr>
+          </a:sp3d>
+        </p:spPr>
+        <p:txBody>
+          <a:bodyPr wrap="square" rtlCol="0">
+            <a:spAutoFit/>
+          </a:bodyPr>
+          <a:lstStyle/>
+          <a:p>
+            <a:pPr algn="ctr"/>
+            <a:r>
+              <a:rPr lang="fr-FR" sz="3600" b="1" dirty="0">
+                <a:latin typeface="Eras Medium ITC" panose="020B0602030504020804" pitchFamily="34" charset="0"/>
+              </a:rPr>
+              <a:t>Application de supervision </a:t>
+            </a:r>
+            <a:r>
+              <a:rPr lang="fr-FR" sz="2800" b="1" dirty="0">
+                <a:solidFill>
+                  <a:srgbClr val="A41258"/>
+                </a:solidFill>
+                <a:latin typeface="Eras Medium ITC" panose="020B0602030504020804" pitchFamily="34" charset="0"/>
+              </a:rPr>
+              <a:t>Envoi d’indice &amp; Fin de partie </a:t>
+            </a:r>
+            <a:r>
+              <a:rPr lang="fr-FR" sz="3200" b="1" dirty="0">
+                <a:latin typeface="Eras Medium ITC" panose="020B0602030504020804" pitchFamily="34" charset="0"/>
+              </a:rPr>
+              <a:t>:</a:t>
+            </a:r>
+          </a:p>
+        </p:txBody>
+      </p:sp>
+      <p:pic>
+        <p:nvPicPr>
+          <p:cNvPr id="5" name="Picture 2" descr="Image associée">
+            <a:extLst>
+              <a:ext uri="{FF2B5EF4-FFF2-40B4-BE49-F238E27FC236}">
+                <a16:creationId xmlns:a16="http://schemas.microsoft.com/office/drawing/2014/main" id="{42980D13-27EB-407A-A911-1179305F49FC}"/>
+              </a:ext>
+            </a:extLst>
+          </p:cNvPr>
+          <p:cNvPicPr>
+            <a:picLocks noChangeAspect="1" noChangeArrowheads="1"/>
+          </p:cNvPicPr>
+          <p:nvPr/>
+        </p:nvPicPr>
+        <p:blipFill rotWithShape="1">
+          <a:blip r:embed="rId2">
+            <a:extLst>
+              <a:ext uri="{28A0092B-C50C-407E-A947-70E740481C1C}">
+                <a14:useLocalDpi xmlns:a14="http://schemas.microsoft.com/office/drawing/2010/main" val="0"/>
+              </a:ext>
+            </a:extLst>
+          </a:blip>
+          <a:srcRect l="18677" r="15441"/>
+          <a:stretch/>
+        </p:blipFill>
+        <p:spPr bwMode="auto">
+          <a:xfrm>
+            <a:off x="143436" y="143435"/>
+            <a:ext cx="2269635" cy="609600"/>
+          </a:xfrm>
+          <a:prstGeom prst="rect">
+            <a:avLst/>
+          </a:prstGeom>
+          <a:noFill/>
+          <a:extLst>
+            <a:ext uri="{909E8E84-426E-40DD-AFC4-6F175D3DCCD1}">
+              <a14:hiddenFill xmlns:a14="http://schemas.microsoft.com/office/drawing/2010/main">
+                <a:solidFill>
+                  <a:srgbClr val="FFFFFF"/>
+                </a:solidFill>
+              </a14:hiddenFill>
+            </a:ext>
+          </a:extLst>
+        </p:spPr>
+      </p:pic>
+      <p:pic>
+        <p:nvPicPr>
+          <p:cNvPr id="3" name="Image 2">
+            <a:extLst>
+              <a:ext uri="{FF2B5EF4-FFF2-40B4-BE49-F238E27FC236}">
+                <a16:creationId xmlns:a16="http://schemas.microsoft.com/office/drawing/2014/main" id="{B737A292-C500-4F9E-B374-C549D6966BDC}"/>
+              </a:ext>
+            </a:extLst>
+          </p:cNvPr>
+          <p:cNvPicPr>
+            <a:picLocks noChangeAspect="1"/>
+          </p:cNvPicPr>
+          <p:nvPr/>
+        </p:nvPicPr>
+        <p:blipFill>
+          <a:blip r:embed="rId3"/>
+          <a:stretch>
+            <a:fillRect/>
+          </a:stretch>
+        </p:blipFill>
+        <p:spPr>
+          <a:xfrm>
+            <a:off x="1037026" y="1817649"/>
+            <a:ext cx="3834770" cy="3958683"/>
+          </a:xfrm>
+          <a:prstGeom prst="rect">
+            <a:avLst/>
+          </a:prstGeom>
+          <a:ln>
+            <a:noFill/>
+          </a:ln>
+          <a:effectLst>
+            <a:outerShdw blurRad="292100" dist="139700" dir="2700000" algn="tl" rotWithShape="0">
+              <a:srgbClr val="333333">
+                <a:alpha val="65000"/>
+              </a:srgbClr>
+            </a:outerShdw>
+          </a:effectLst>
+        </p:spPr>
+      </p:pic>
+      <p:pic>
+        <p:nvPicPr>
+          <p:cNvPr id="7" name="Image 6">
+            <a:extLst>
+              <a:ext uri="{FF2B5EF4-FFF2-40B4-BE49-F238E27FC236}">
+                <a16:creationId xmlns:a16="http://schemas.microsoft.com/office/drawing/2014/main" id="{63D11CDC-1242-4135-8684-B6ABFEBB6BC8}"/>
+              </a:ext>
+            </a:extLst>
+          </p:cNvPr>
+          <p:cNvPicPr>
+            <a:picLocks noChangeAspect="1"/>
+          </p:cNvPicPr>
+          <p:nvPr/>
+        </p:nvPicPr>
+        <p:blipFill>
+          <a:blip r:embed="rId4"/>
+          <a:stretch>
+            <a:fillRect/>
+          </a:stretch>
+        </p:blipFill>
+        <p:spPr>
+          <a:xfrm>
+            <a:off x="5260140" y="1279530"/>
+            <a:ext cx="3761197" cy="5475249"/>
+          </a:xfrm>
+          <a:prstGeom prst="rect">
+            <a:avLst/>
+          </a:prstGeom>
+          <a:ln>
+            <a:noFill/>
+          </a:ln>
+          <a:effectLst>
+            <a:outerShdw blurRad="292100" dist="139700" dir="2700000" algn="tl" rotWithShape="0">
+              <a:srgbClr val="333333">
+                <a:alpha val="65000"/>
+              </a:srgbClr>
+            </a:outerShdw>
+          </a:effectLst>
+        </p:spPr>
+      </p:pic>
+    </p:spTree>
+    <p:extLst>
+      <p:ext uri="{BB962C8B-B14F-4D97-AF65-F5344CB8AC3E}">
+        <p14:creationId xmlns:p14="http://schemas.microsoft.com/office/powerpoint/2010/main" val="2716515491"/>
+      </p:ext>
+    </p:extLst>
+  </p:cSld>
+  <p:clrMapOvr>
+    <a:masterClrMapping/>
+  </p:clrMapOvr>
+</p:sld>
+</file>
+
+<file path=ppt/slides/slide11.xml><?xml version="1.0" encoding="utf-8"?>
+<p:sld xmlns:a="http://schemas.openxmlformats.org/drawingml/2006/main" xmlns:r="http://schemas.openxmlformats.org/officeDocument/2006/relationships" xmlns:p="http://schemas.openxmlformats.org/presentationml/2006/main">
+  <p:cSld>
+    <p:spTree>
+      <p:nvGrpSpPr>
+        <p:cNvPr id="1" name=""/>
+        <p:cNvGrpSpPr/>
+        <p:nvPr/>
+      </p:nvGrpSpPr>
+      <p:grpSpPr>
+        <a:xfrm>
+          <a:off x="0" y="0"/>
+          <a:ext cx="0" cy="0"/>
+          <a:chOff x="0" y="0"/>
+          <a:chExt cx="0" cy="0"/>
+        </a:xfrm>
+      </p:grpSpPr>
+      <p:pic>
+        <p:nvPicPr>
+          <p:cNvPr id="1026" name="Picture 2" descr="Image associée">
+            <a:extLst>
+              <a:ext uri="{FF2B5EF4-FFF2-40B4-BE49-F238E27FC236}">
+                <a16:creationId xmlns:a16="http://schemas.microsoft.com/office/drawing/2014/main" id="{C816F3D8-CC4C-46B3-A21E-58AE9AD30454}"/>
+              </a:ext>
+            </a:extLst>
+          </p:cNvPr>
+          <p:cNvPicPr>
+            <a:picLocks noChangeAspect="1" noChangeArrowheads="1"/>
+          </p:cNvPicPr>
+          <p:nvPr/>
+        </p:nvPicPr>
+        <p:blipFill rotWithShape="1">
+          <a:blip r:embed="rId2">
+            <a:extLst>
+              <a:ext uri="{28A0092B-C50C-407E-A947-70E740481C1C}">
+                <a14:useLocalDpi xmlns:a14="http://schemas.microsoft.com/office/drawing/2010/main" val="0"/>
+              </a:ext>
+            </a:extLst>
+          </a:blip>
+          <a:srcRect l="18677" r="15441"/>
+          <a:stretch/>
+        </p:blipFill>
+        <p:spPr bwMode="auto">
+          <a:xfrm>
+            <a:off x="143436" y="143435"/>
+            <a:ext cx="2269635" cy="609600"/>
+          </a:xfrm>
+          <a:prstGeom prst="rect">
+            <a:avLst/>
+          </a:prstGeom>
+          <a:noFill/>
+          <a:extLst>
+            <a:ext uri="{909E8E84-426E-40DD-AFC4-6F175D3DCCD1}">
+              <a14:hiddenFill xmlns:a14="http://schemas.microsoft.com/office/drawing/2010/main">
+                <a:solidFill>
+                  <a:srgbClr val="FFFFFF"/>
+                </a:solidFill>
+              </a14:hiddenFill>
+            </a:ext>
+          </a:extLst>
+        </p:spPr>
+      </p:pic>
+      <p:sp>
+        <p:nvSpPr>
+          <p:cNvPr id="3" name="ZoneTexte 2">
+            <a:extLst>
+              <a:ext uri="{FF2B5EF4-FFF2-40B4-BE49-F238E27FC236}">
+                <a16:creationId xmlns:a16="http://schemas.microsoft.com/office/drawing/2014/main" id="{16637F4C-A45D-4A64-84F7-746FFFD316BB}"/>
+              </a:ext>
+            </a:extLst>
+          </p:cNvPr>
+          <p:cNvSpPr txBox="1"/>
+          <p:nvPr/>
+        </p:nvSpPr>
+        <p:spPr>
+          <a:xfrm>
+            <a:off x="-106043" y="2836021"/>
+            <a:ext cx="3242435" cy="646331"/>
+          </a:xfrm>
+          <a:prstGeom prst="rect">
+            <a:avLst/>
+          </a:prstGeom>
+          <a:noFill/>
+          <a:ln>
+            <a:noFill/>
+          </a:ln>
+          <a:effectLst>
+            <a:glow rad="63500">
+              <a:schemeClr val="accent4">
+                <a:satMod val="175000"/>
+                <a:alpha val="40000"/>
+              </a:schemeClr>
+            </a:glow>
+            <a:outerShdw blurRad="50800" dist="38100" dir="5400000" algn="t" rotWithShape="0">
+              <a:prstClr val="black">
+                <a:alpha val="40000"/>
+              </a:prstClr>
+            </a:outerShdw>
+          </a:effectLst>
+          <a:scene3d>
+            <a:camera prst="orthographicFront">
+              <a:rot lat="0" lon="0" rev="0"/>
+            </a:camera>
+            <a:lightRig rig="soft" dir="t">
+              <a:rot lat="0" lon="0" rev="0"/>
+            </a:lightRig>
+          </a:scene3d>
+          <a:sp3d contourW="44450" prstMaterial="matte">
+            <a:bevelT w="63500" h="63500" prst="artDeco"/>
+            <a:contourClr>
+              <a:srgbClr val="FFFFFF"/>
+            </a:contourClr>
+          </a:sp3d>
+        </p:spPr>
+        <p:txBody>
+          <a:bodyPr wrap="square" rtlCol="0">
+            <a:spAutoFit/>
+          </a:bodyPr>
+          <a:lstStyle/>
+          <a:p>
+            <a:pPr algn="ctr"/>
+            <a:r>
+              <a:rPr lang="fr-FR" sz="2000" b="1" dirty="0">
+                <a:latin typeface="Eras Medium ITC" panose="020B0602030504020804" pitchFamily="34" charset="0"/>
+              </a:rPr>
+              <a:t>Diagramme de séquence : </a:t>
+            </a:r>
+            <a:r>
+              <a:rPr lang="fr-FR" sz="1600" b="1" dirty="0">
+                <a:solidFill>
+                  <a:srgbClr val="A41258"/>
+                </a:solidFill>
+                <a:latin typeface="Eras Medium ITC" panose="020B0602030504020804" pitchFamily="34" charset="0"/>
+              </a:rPr>
+              <a:t>Lancement d’une partie</a:t>
+            </a:r>
+            <a:endParaRPr lang="fr-FR" b="1" dirty="0">
+              <a:solidFill>
+                <a:srgbClr val="A41258"/>
+              </a:solidFill>
+              <a:latin typeface="Eras Medium ITC" panose="020B0602030504020804" pitchFamily="34" charset="0"/>
+            </a:endParaRPr>
+          </a:p>
+        </p:txBody>
+      </p:sp>
+      <p:pic>
+        <p:nvPicPr>
+          <p:cNvPr id="2" name="Image 1">
+            <a:extLst>
+              <a:ext uri="{FF2B5EF4-FFF2-40B4-BE49-F238E27FC236}">
+                <a16:creationId xmlns:a16="http://schemas.microsoft.com/office/drawing/2014/main" id="{EB85B4BA-1247-4132-A680-7202937A7093}"/>
+              </a:ext>
+            </a:extLst>
+          </p:cNvPr>
+          <p:cNvPicPr>
+            <a:picLocks noChangeAspect="1"/>
+          </p:cNvPicPr>
+          <p:nvPr/>
+        </p:nvPicPr>
+        <p:blipFill>
+          <a:blip r:embed="rId3"/>
+          <a:stretch>
+            <a:fillRect/>
+          </a:stretch>
+        </p:blipFill>
+        <p:spPr>
+          <a:xfrm>
+            <a:off x="2412013" y="-119099"/>
+            <a:ext cx="7367973" cy="6977099"/>
+          </a:xfrm>
+          <a:prstGeom prst="rect">
+            <a:avLst/>
+          </a:prstGeom>
+        </p:spPr>
+      </p:pic>
+    </p:spTree>
+    <p:extLst>
+      <p:ext uri="{BB962C8B-B14F-4D97-AF65-F5344CB8AC3E}">
+        <p14:creationId xmlns:p14="http://schemas.microsoft.com/office/powerpoint/2010/main" val="1236978261"/>
+      </p:ext>
+    </p:extLst>
+  </p:cSld>
+  <p:clrMapOvr>
+    <a:masterClrMapping/>
+  </p:clrMapOvr>
+  <mc:AlternateContent xmlns:mc="http://schemas.openxmlformats.org/markup-compatibility/2006" xmlns:p159="http://schemas.microsoft.com/office/powerpoint/2015/09/main">
+    <mc:Choice Requires="p159">
+      <p:transition xmlns:p14="http://schemas.microsoft.com/office/powerpoint/2010/main" spd="slow" p14:dur="2000">
+        <p159:morph option="byObject"/>
+      </p:transition>
+    </mc:Choice>
+    <mc:Fallback xmlns="">
+      <p:transition spd="slow">
+        <p:fade/>
+      </p:transition>
+    </mc:Fallback>
+  </mc:AlternateContent>
+</p:sld>
+</file>
+
+<file path=ppt/slides/slide12.xml><?xml version="1.0" encoding="utf-8"?>
+<p:sld xmlns:a="http://schemas.openxmlformats.org/drawingml/2006/main" xmlns:r="http://schemas.openxmlformats.org/officeDocument/2006/relationships" xmlns:p="http://schemas.openxmlformats.org/presentationml/2006/main">
+  <p:cSld>
+    <p:spTree>
+      <p:nvGrpSpPr>
+        <p:cNvPr id="1" name=""/>
+        <p:cNvGrpSpPr/>
+        <p:nvPr/>
+      </p:nvGrpSpPr>
+      <p:grpSpPr>
+        <a:xfrm>
+          <a:off x="0" y="0"/>
+          <a:ext cx="0" cy="0"/>
+          <a:chOff x="0" y="0"/>
+          <a:chExt cx="0" cy="0"/>
+        </a:xfrm>
+      </p:grpSpPr>
+      <p:pic>
+        <p:nvPicPr>
+          <p:cNvPr id="1026" name="Picture 2" descr="Image associée">
+            <a:extLst>
+              <a:ext uri="{FF2B5EF4-FFF2-40B4-BE49-F238E27FC236}">
+                <a16:creationId xmlns:a16="http://schemas.microsoft.com/office/drawing/2014/main" id="{C816F3D8-CC4C-46B3-A21E-58AE9AD30454}"/>
+              </a:ext>
+            </a:extLst>
+          </p:cNvPr>
+          <p:cNvPicPr>
+            <a:picLocks noChangeAspect="1" noChangeArrowheads="1"/>
+          </p:cNvPicPr>
+          <p:nvPr/>
+        </p:nvPicPr>
+        <p:blipFill rotWithShape="1">
+          <a:blip r:embed="rId2">
+            <a:extLst>
+              <a:ext uri="{28A0092B-C50C-407E-A947-70E740481C1C}">
+                <a14:useLocalDpi xmlns:a14="http://schemas.microsoft.com/office/drawing/2010/main" val="0"/>
+              </a:ext>
+            </a:extLst>
+          </a:blip>
+          <a:srcRect l="18677" r="15441"/>
+          <a:stretch/>
+        </p:blipFill>
+        <p:spPr bwMode="auto">
+          <a:xfrm>
+            <a:off x="143436" y="143435"/>
+            <a:ext cx="2269635" cy="609600"/>
+          </a:xfrm>
+          <a:prstGeom prst="rect">
+            <a:avLst/>
+          </a:prstGeom>
+          <a:noFill/>
+          <a:extLst>
+            <a:ext uri="{909E8E84-426E-40DD-AFC4-6F175D3DCCD1}">
+              <a14:hiddenFill xmlns:a14="http://schemas.microsoft.com/office/drawing/2010/main">
+                <a:solidFill>
+                  <a:srgbClr val="FFFFFF"/>
+                </a:solidFill>
+              </a14:hiddenFill>
+            </a:ext>
+          </a:extLst>
+        </p:spPr>
+      </p:pic>
+      <p:sp>
+        <p:nvSpPr>
+          <p:cNvPr id="5" name="ZoneTexte 4">
+            <a:extLst>
+              <a:ext uri="{FF2B5EF4-FFF2-40B4-BE49-F238E27FC236}">
+                <a16:creationId xmlns:a16="http://schemas.microsoft.com/office/drawing/2014/main" id="{DE4D560C-9537-428C-82EA-D1E94E276955}"/>
+              </a:ext>
+            </a:extLst>
+          </p:cNvPr>
+          <p:cNvSpPr txBox="1"/>
+          <p:nvPr/>
+        </p:nvSpPr>
+        <p:spPr>
+          <a:xfrm>
+            <a:off x="3560382" y="125069"/>
+            <a:ext cx="3242435" cy="646331"/>
+          </a:xfrm>
+          <a:prstGeom prst="rect">
+            <a:avLst/>
+          </a:prstGeom>
+          <a:noFill/>
+          <a:ln>
+            <a:noFill/>
+          </a:ln>
+          <a:effectLst>
+            <a:glow rad="63500">
+              <a:schemeClr val="accent4">
+                <a:satMod val="175000"/>
+                <a:alpha val="40000"/>
+              </a:schemeClr>
+            </a:glow>
+            <a:outerShdw blurRad="50800" dist="38100" dir="5400000" algn="t" rotWithShape="0">
+              <a:prstClr val="black">
+                <a:alpha val="40000"/>
+              </a:prstClr>
+            </a:outerShdw>
+          </a:effectLst>
+          <a:scene3d>
+            <a:camera prst="orthographicFront">
+              <a:rot lat="0" lon="0" rev="0"/>
+            </a:camera>
+            <a:lightRig rig="soft" dir="t">
+              <a:rot lat="0" lon="0" rev="0"/>
+            </a:lightRig>
+          </a:scene3d>
+          <a:sp3d contourW="44450" prstMaterial="matte">
+            <a:bevelT w="63500" h="63500" prst="artDeco"/>
+            <a:contourClr>
+              <a:srgbClr val="FFFFFF"/>
+            </a:contourClr>
+          </a:sp3d>
+        </p:spPr>
+        <p:txBody>
+          <a:bodyPr wrap="square" rtlCol="0">
+            <a:spAutoFit/>
+          </a:bodyPr>
+          <a:lstStyle/>
+          <a:p>
+            <a:pPr algn="ctr"/>
+            <a:r>
+              <a:rPr lang="fr-FR" sz="2000" b="1" dirty="0">
+                <a:latin typeface="Eras Medium ITC" panose="020B0602030504020804" pitchFamily="34" charset="0"/>
+              </a:rPr>
+              <a:t>Diagramme de séquence : </a:t>
+            </a:r>
+            <a:r>
+              <a:rPr lang="fr-FR" sz="1600" b="1" dirty="0">
+                <a:solidFill>
+                  <a:srgbClr val="A41258"/>
+                </a:solidFill>
+                <a:latin typeface="Eras Medium ITC" panose="020B0602030504020804" pitchFamily="34" charset="0"/>
+              </a:rPr>
+              <a:t>Envoi d’un message</a:t>
+            </a:r>
+            <a:endParaRPr lang="fr-FR" b="1" dirty="0">
+              <a:solidFill>
+                <a:srgbClr val="A41258"/>
+              </a:solidFill>
+              <a:latin typeface="Eras Medium ITC" panose="020B0602030504020804" pitchFamily="34" charset="0"/>
+            </a:endParaRPr>
+          </a:p>
+        </p:txBody>
+      </p:sp>
+      <p:pic>
+        <p:nvPicPr>
+          <p:cNvPr id="4" name="Image 3">
+            <a:extLst>
+              <a:ext uri="{FF2B5EF4-FFF2-40B4-BE49-F238E27FC236}">
+                <a16:creationId xmlns:a16="http://schemas.microsoft.com/office/drawing/2014/main" id="{23D5BB14-85E0-47B6-9674-A8E0DB36C8AC}"/>
+              </a:ext>
+            </a:extLst>
+          </p:cNvPr>
+          <p:cNvPicPr>
+            <a:picLocks noChangeAspect="1"/>
+          </p:cNvPicPr>
+          <p:nvPr/>
+        </p:nvPicPr>
+        <p:blipFill rotWithShape="1">
+          <a:blip r:embed="rId3"/>
+          <a:srcRect t="4014"/>
+          <a:stretch/>
+        </p:blipFill>
+        <p:spPr>
+          <a:xfrm>
+            <a:off x="143436" y="753035"/>
+            <a:ext cx="9576636" cy="6112494"/>
+          </a:xfrm>
+          <a:prstGeom prst="rect">
+            <a:avLst/>
+          </a:prstGeom>
+        </p:spPr>
+      </p:pic>
+    </p:spTree>
+    <p:extLst>
+      <p:ext uri="{BB962C8B-B14F-4D97-AF65-F5344CB8AC3E}">
+        <p14:creationId xmlns:p14="http://schemas.microsoft.com/office/powerpoint/2010/main" val="2695738063"/>
+      </p:ext>
+    </p:extLst>
+  </p:cSld>
+  <p:clrMapOvr>
+    <a:masterClrMapping/>
+  </p:clrMapOvr>
+  <mc:AlternateContent xmlns:mc="http://schemas.openxmlformats.org/markup-compatibility/2006" xmlns:p159="http://schemas.microsoft.com/office/powerpoint/2015/09/main">
+    <mc:Choice Requires="p159">
+      <p:transition xmlns:p14="http://schemas.microsoft.com/office/powerpoint/2010/main" spd="slow" p14:dur="2000">
+        <p159:morph option="byObject"/>
+      </p:transition>
+    </mc:Choice>
+    <mc:Fallback xmlns="">
+      <p:transition spd="slow">
+        <p:fade/>
+      </p:transition>
+    </mc:Fallback>
+  </mc:AlternateContent>
+</p:sld>
+</file>
+
+<file path=ppt/slides/slide13.xml><?xml version="1.0" encoding="utf-8"?>
+<p:sld xmlns:a="http://schemas.openxmlformats.org/drawingml/2006/main" xmlns:r="http://schemas.openxmlformats.org/officeDocument/2006/relationships" xmlns:p="http://schemas.openxmlformats.org/presentationml/2006/main">
+  <p:cSld>
+    <p:spTree>
+      <p:nvGrpSpPr>
+        <p:cNvPr id="1" name=""/>
+        <p:cNvGrpSpPr/>
+        <p:nvPr/>
+      </p:nvGrpSpPr>
+      <p:grpSpPr>
+        <a:xfrm>
+          <a:off x="0" y="0"/>
+          <a:ext cx="0" cy="0"/>
+          <a:chOff x="0" y="0"/>
+          <a:chExt cx="0" cy="0"/>
+        </a:xfrm>
+      </p:grpSpPr>
       <p:pic>
         <p:nvPicPr>
           <p:cNvPr id="2" name="Image 1">
@@ -10092,7 +10734,7 @@
 </p:sld>
 </file>
 
-<file path=ppt/slides/slide11.xml><?xml version="1.0" encoding="utf-8"?>
+<file path=ppt/slides/slide14.xml><?xml version="1.0" encoding="utf-8"?>
 <p:sld xmlns:a="http://schemas.openxmlformats.org/drawingml/2006/main" xmlns:r="http://schemas.openxmlformats.org/officeDocument/2006/relationships" xmlns:p="http://schemas.openxmlformats.org/presentationml/2006/main">
   <p:cSld>
     <p:spTree>
@@ -10292,7 +10934,195 @@
 </p:sld>
 </file>
 
-<file path=ppt/slides/slide12.xml><?xml version="1.0" encoding="utf-8"?>
+<file path=ppt/slides/slide15.xml><?xml version="1.0" encoding="utf-8"?>
+<p:sld xmlns:a="http://schemas.openxmlformats.org/drawingml/2006/main" xmlns:r="http://schemas.openxmlformats.org/officeDocument/2006/relationships" xmlns:p="http://schemas.openxmlformats.org/presentationml/2006/main">
+  <p:cSld>
+    <p:spTree>
+      <p:nvGrpSpPr>
+        <p:cNvPr id="1" name=""/>
+        <p:cNvGrpSpPr/>
+        <p:nvPr/>
+      </p:nvGrpSpPr>
+      <p:grpSpPr>
+        <a:xfrm>
+          <a:off x="0" y="0"/>
+          <a:ext cx="0" cy="0"/>
+          <a:chOff x="0" y="0"/>
+          <a:chExt cx="0" cy="0"/>
+        </a:xfrm>
+      </p:grpSpPr>
+      <p:pic>
+        <p:nvPicPr>
+          <p:cNvPr id="4" name="Picture 2" descr="Image associée">
+            <a:extLst>
+              <a:ext uri="{FF2B5EF4-FFF2-40B4-BE49-F238E27FC236}">
+                <a16:creationId xmlns:a16="http://schemas.microsoft.com/office/drawing/2014/main" id="{A70E6249-9E28-4317-9272-AA9A2BCD50B5}"/>
+              </a:ext>
+            </a:extLst>
+          </p:cNvPr>
+          <p:cNvPicPr>
+            <a:picLocks noChangeAspect="1" noChangeArrowheads="1"/>
+          </p:cNvPicPr>
+          <p:nvPr/>
+        </p:nvPicPr>
+        <p:blipFill rotWithShape="1">
+          <a:blip r:embed="rId2">
+            <a:extLst>
+              <a:ext uri="{28A0092B-C50C-407E-A947-70E740481C1C}">
+                <a14:useLocalDpi xmlns:a14="http://schemas.microsoft.com/office/drawing/2010/main" val="0"/>
+              </a:ext>
+            </a:extLst>
+          </a:blip>
+          <a:srcRect l="18677" r="15441"/>
+          <a:stretch/>
+        </p:blipFill>
+        <p:spPr bwMode="auto">
+          <a:xfrm>
+            <a:off x="143436" y="143435"/>
+            <a:ext cx="2269635" cy="609600"/>
+          </a:xfrm>
+          <a:prstGeom prst="rect">
+            <a:avLst/>
+          </a:prstGeom>
+          <a:noFill/>
+          <a:extLst>
+            <a:ext uri="{909E8E84-426E-40DD-AFC4-6F175D3DCCD1}">
+              <a14:hiddenFill xmlns:a14="http://schemas.microsoft.com/office/drawing/2010/main">
+                <a:solidFill>
+                  <a:srgbClr val="FFFFFF"/>
+                </a:solidFill>
+              </a14:hiddenFill>
+            </a:ext>
+          </a:extLst>
+        </p:spPr>
+      </p:pic>
+      <p:sp>
+        <p:nvSpPr>
+          <p:cNvPr id="5" name="ZoneTexte 4">
+            <a:extLst>
+              <a:ext uri="{FF2B5EF4-FFF2-40B4-BE49-F238E27FC236}">
+                <a16:creationId xmlns:a16="http://schemas.microsoft.com/office/drawing/2014/main" id="{D0691E71-6B55-487E-9C91-F2C906CE33A4}"/>
+              </a:ext>
+            </a:extLst>
+          </p:cNvPr>
+          <p:cNvSpPr txBox="1"/>
+          <p:nvPr/>
+        </p:nvSpPr>
+        <p:spPr>
+          <a:xfrm>
+            <a:off x="3323065" y="103221"/>
+            <a:ext cx="4627756" cy="1138773"/>
+          </a:xfrm>
+          <a:prstGeom prst="rect">
+            <a:avLst/>
+          </a:prstGeom>
+          <a:noFill/>
+          <a:ln>
+            <a:noFill/>
+          </a:ln>
+          <a:effectLst>
+            <a:glow rad="63500">
+              <a:schemeClr val="accent4">
+                <a:satMod val="175000"/>
+                <a:alpha val="40000"/>
+              </a:schemeClr>
+            </a:glow>
+            <a:outerShdw blurRad="50800" dist="38100" dir="5400000" algn="t" rotWithShape="0">
+              <a:prstClr val="black">
+                <a:alpha val="40000"/>
+              </a:prstClr>
+            </a:outerShdw>
+          </a:effectLst>
+          <a:scene3d>
+            <a:camera prst="orthographicFront">
+              <a:rot lat="0" lon="0" rev="0"/>
+            </a:camera>
+            <a:lightRig rig="soft" dir="t">
+              <a:rot lat="0" lon="0" rev="0"/>
+            </a:lightRig>
+          </a:scene3d>
+          <a:sp3d contourW="44450" prstMaterial="matte">
+            <a:bevelT w="63500" h="63500" prst="artDeco"/>
+            <a:contourClr>
+              <a:srgbClr val="FFFFFF"/>
+            </a:contourClr>
+          </a:sp3d>
+        </p:spPr>
+        <p:txBody>
+          <a:bodyPr wrap="square" rtlCol="0">
+            <a:spAutoFit/>
+          </a:bodyPr>
+          <a:lstStyle/>
+          <a:p>
+            <a:pPr algn="ctr"/>
+            <a:r>
+              <a:rPr lang="fr-FR" sz="3600" b="1" dirty="0">
+                <a:latin typeface="Eras Medium ITC" panose="020B0602030504020804" pitchFamily="34" charset="0"/>
+              </a:rPr>
+              <a:t>Base de données </a:t>
+            </a:r>
+            <a:r>
+              <a:rPr lang="fr-FR" sz="2800" b="1" dirty="0">
+                <a:solidFill>
+                  <a:srgbClr val="A41258"/>
+                </a:solidFill>
+                <a:latin typeface="Eras Medium ITC" panose="020B0602030504020804" pitchFamily="34" charset="0"/>
+              </a:rPr>
+              <a:t>Modèle relationnel </a:t>
+            </a:r>
+            <a:r>
+              <a:rPr lang="fr-FR" sz="3200" b="1" dirty="0">
+                <a:latin typeface="Eras Medium ITC" panose="020B0602030504020804" pitchFamily="34" charset="0"/>
+              </a:rPr>
+              <a:t>:</a:t>
+            </a:r>
+          </a:p>
+        </p:txBody>
+      </p:sp>
+      <p:pic>
+        <p:nvPicPr>
+          <p:cNvPr id="7" name="Image 6" descr="Une image contenant capture d’écran&#10;&#10;Description générée automatiquement">
+            <a:extLst>
+              <a:ext uri="{FF2B5EF4-FFF2-40B4-BE49-F238E27FC236}">
+                <a16:creationId xmlns:a16="http://schemas.microsoft.com/office/drawing/2014/main" id="{9350F9C8-9CA6-402F-9C47-C6CF7F7570DB}"/>
+              </a:ext>
+            </a:extLst>
+          </p:cNvPr>
+          <p:cNvPicPr>
+            <a:picLocks noChangeAspect="1"/>
+          </p:cNvPicPr>
+          <p:nvPr/>
+        </p:nvPicPr>
+        <p:blipFill>
+          <a:blip r:embed="rId3"/>
+          <a:stretch>
+            <a:fillRect/>
+          </a:stretch>
+        </p:blipFill>
+        <p:spPr>
+          <a:xfrm>
+            <a:off x="1601639" y="2097783"/>
+            <a:ext cx="6916065" cy="2886812"/>
+          </a:xfrm>
+          <a:prstGeom prst="rect">
+            <a:avLst/>
+          </a:prstGeom>
+        </p:spPr>
+      </p:pic>
+    </p:spTree>
+    <p:extLst>
+      <p:ext uri="{BB962C8B-B14F-4D97-AF65-F5344CB8AC3E}">
+        <p14:creationId xmlns:p14="http://schemas.microsoft.com/office/powerpoint/2010/main" val="726819232"/>
+      </p:ext>
+    </p:extLst>
+  </p:cSld>
+  <p:clrMapOvr>
+    <a:masterClrMapping/>
+  </p:clrMapOvr>
+</p:sld>
+</file>
+
+<file path=ppt/slides/slide16.xml><?xml version="1.0" encoding="utf-8"?>
 <p:sld xmlns:a="http://schemas.openxmlformats.org/drawingml/2006/main" xmlns:r="http://schemas.openxmlformats.org/officeDocument/2006/relationships" xmlns:p="http://schemas.openxmlformats.org/presentationml/2006/main">
   <p:cSld>
     <p:spTree>
@@ -10495,7 +11325,7 @@
 </p:sld>
 </file>
 
-<file path=ppt/slides/slide13.xml><?xml version="1.0" encoding="utf-8"?>
+<file path=ppt/slides/slide17.xml><?xml version="1.0" encoding="utf-8"?>
 <p:sld xmlns:a="http://schemas.openxmlformats.org/drawingml/2006/main" xmlns:r="http://schemas.openxmlformats.org/officeDocument/2006/relationships" xmlns:p="http://schemas.openxmlformats.org/presentationml/2006/main">
   <p:cSld>
     <p:spTree>
@@ -10557,10 +11387,383 @@
           </a:extLst>
         </p:spPr>
       </p:pic>
+      <p:sp>
+        <p:nvSpPr>
+          <p:cNvPr id="3" name="ZoneTexte 2">
+            <a:extLst>
+              <a:ext uri="{FF2B5EF4-FFF2-40B4-BE49-F238E27FC236}">
+                <a16:creationId xmlns:a16="http://schemas.microsoft.com/office/drawing/2014/main" id="{1582123C-25BF-42F1-97F8-35FFB48DFFAA}"/>
+              </a:ext>
+            </a:extLst>
+          </p:cNvPr>
+          <p:cNvSpPr txBox="1"/>
+          <p:nvPr/>
+        </p:nvSpPr>
+        <p:spPr>
+          <a:xfrm>
+            <a:off x="2497873" y="143435"/>
+            <a:ext cx="6188927" cy="1138773"/>
+          </a:xfrm>
+          <a:prstGeom prst="rect">
+            <a:avLst/>
+          </a:prstGeom>
+          <a:noFill/>
+          <a:ln>
+            <a:noFill/>
+          </a:ln>
+          <a:effectLst>
+            <a:glow rad="63500">
+              <a:schemeClr val="accent4">
+                <a:satMod val="175000"/>
+                <a:alpha val="40000"/>
+              </a:schemeClr>
+            </a:glow>
+            <a:outerShdw blurRad="50800" dist="38100" dir="5400000" algn="t" rotWithShape="0">
+              <a:prstClr val="black">
+                <a:alpha val="40000"/>
+              </a:prstClr>
+            </a:outerShdw>
+          </a:effectLst>
+          <a:scene3d>
+            <a:camera prst="orthographicFront">
+              <a:rot lat="0" lon="0" rev="0"/>
+            </a:camera>
+            <a:lightRig rig="soft" dir="t">
+              <a:rot lat="0" lon="0" rev="0"/>
+            </a:lightRig>
+          </a:scene3d>
+          <a:sp3d contourW="44450" prstMaterial="matte">
+            <a:bevelT w="63500" h="63500" prst="artDeco"/>
+            <a:contourClr>
+              <a:srgbClr val="FFFFFF"/>
+            </a:contourClr>
+          </a:sp3d>
+        </p:spPr>
+        <p:txBody>
+          <a:bodyPr wrap="square" rtlCol="0">
+            <a:spAutoFit/>
+          </a:bodyPr>
+          <a:lstStyle/>
+          <a:p>
+            <a:pPr algn="ctr"/>
+            <a:r>
+              <a:rPr lang="fr-FR" sz="3600" b="1" dirty="0">
+                <a:latin typeface="Eras Medium ITC" panose="020B0602030504020804" pitchFamily="34" charset="0"/>
+              </a:rPr>
+              <a:t>Planification Gantt           </a:t>
+            </a:r>
+            <a:r>
+              <a:rPr lang="fr-FR" sz="3200" b="1" dirty="0">
+                <a:solidFill>
+                  <a:srgbClr val="A41258"/>
+                </a:solidFill>
+                <a:latin typeface="Eras Medium ITC" panose="020B0602030504020804" pitchFamily="34" charset="0"/>
+              </a:rPr>
+              <a:t>Partie commune </a:t>
+            </a:r>
+            <a:r>
+              <a:rPr lang="fr-FR" sz="3200" b="1" dirty="0">
+                <a:latin typeface="Eras Medium ITC" panose="020B0602030504020804" pitchFamily="34" charset="0"/>
+              </a:rPr>
+              <a:t>:</a:t>
+            </a:r>
+          </a:p>
+        </p:txBody>
+      </p:sp>
+      <p:pic>
+        <p:nvPicPr>
+          <p:cNvPr id="6" name="Image 5" descr="Une image contenant capture d’écran&#10;&#10;Description générée automatiquement">
+            <a:extLst>
+              <a:ext uri="{FF2B5EF4-FFF2-40B4-BE49-F238E27FC236}">
+                <a16:creationId xmlns:a16="http://schemas.microsoft.com/office/drawing/2014/main" id="{612B15C4-79FA-4966-8D88-BD60FB5BE23E}"/>
+              </a:ext>
+            </a:extLst>
+          </p:cNvPr>
+          <p:cNvPicPr>
+            <a:picLocks noChangeAspect="1"/>
+          </p:cNvPicPr>
+          <p:nvPr/>
+        </p:nvPicPr>
+        <p:blipFill>
+          <a:blip r:embed="rId3"/>
+          <a:stretch>
+            <a:fillRect/>
+          </a:stretch>
+        </p:blipFill>
+        <p:spPr>
+          <a:xfrm>
+            <a:off x="0" y="4248029"/>
+            <a:ext cx="10426390" cy="2013259"/>
+          </a:xfrm>
+          <a:prstGeom prst="rect">
+            <a:avLst/>
+          </a:prstGeom>
+          <a:ln>
+            <a:noFill/>
+          </a:ln>
+          <a:effectLst>
+            <a:outerShdw blurRad="292100" dist="139700" dir="2700000" algn="tl" rotWithShape="0">
+              <a:srgbClr val="333333">
+                <a:alpha val="65000"/>
+              </a:srgbClr>
+            </a:outerShdw>
+          </a:effectLst>
+        </p:spPr>
+      </p:pic>
+      <p:pic>
+        <p:nvPicPr>
+          <p:cNvPr id="9" name="Image 8" descr="Une image contenant capture d’écran, ordinateur&#10;&#10;Description générée automatiquement">
+            <a:extLst>
+              <a:ext uri="{FF2B5EF4-FFF2-40B4-BE49-F238E27FC236}">
+                <a16:creationId xmlns:a16="http://schemas.microsoft.com/office/drawing/2014/main" id="{FA1C4999-4C72-456A-BFF1-A458813D70F4}"/>
+              </a:ext>
+            </a:extLst>
+          </p:cNvPr>
+          <p:cNvPicPr>
+            <a:picLocks noChangeAspect="1"/>
+          </p:cNvPicPr>
+          <p:nvPr/>
+        </p:nvPicPr>
+        <p:blipFill>
+          <a:blip r:embed="rId4"/>
+          <a:stretch>
+            <a:fillRect/>
+          </a:stretch>
+        </p:blipFill>
+        <p:spPr>
+          <a:xfrm>
+            <a:off x="0" y="1442053"/>
+            <a:ext cx="10426390" cy="2335835"/>
+          </a:xfrm>
+          <a:prstGeom prst="rect">
+            <a:avLst/>
+          </a:prstGeom>
+          <a:ln>
+            <a:noFill/>
+          </a:ln>
+          <a:effectLst>
+            <a:outerShdw blurRad="292100" dist="139700" dir="2700000" algn="tl" rotWithShape="0">
+              <a:srgbClr val="333333">
+                <a:alpha val="65000"/>
+              </a:srgbClr>
+            </a:outerShdw>
+          </a:effectLst>
+        </p:spPr>
+      </p:pic>
     </p:spTree>
     <p:extLst>
       <p:ext uri="{BB962C8B-B14F-4D97-AF65-F5344CB8AC3E}">
         <p14:creationId xmlns:p14="http://schemas.microsoft.com/office/powerpoint/2010/main" val="779748466"/>
+      </p:ext>
+    </p:extLst>
+  </p:cSld>
+  <p:clrMapOvr>
+    <a:masterClrMapping/>
+  </p:clrMapOvr>
+  <mc:AlternateContent xmlns:mc="http://schemas.openxmlformats.org/markup-compatibility/2006" xmlns:p159="http://schemas.microsoft.com/office/powerpoint/2015/09/main">
+    <mc:Choice Requires="p159">
+      <p:transition xmlns:p14="http://schemas.microsoft.com/office/powerpoint/2010/main" spd="slow" p14:dur="2000">
+        <p159:morph option="byObject"/>
+      </p:transition>
+    </mc:Choice>
+    <mc:Fallback xmlns="">
+      <p:transition spd="slow">
+        <p:fade/>
+      </p:transition>
+    </mc:Fallback>
+  </mc:AlternateContent>
+</p:sld>
+</file>
+
+<file path=ppt/slides/slide18.xml><?xml version="1.0" encoding="utf-8"?>
+<p:sld xmlns:a="http://schemas.openxmlformats.org/drawingml/2006/main" xmlns:r="http://schemas.openxmlformats.org/officeDocument/2006/relationships" xmlns:p="http://schemas.openxmlformats.org/presentationml/2006/main">
+  <p:cSld>
+    <p:spTree>
+      <p:nvGrpSpPr>
+        <p:cNvPr id="1" name=""/>
+        <p:cNvGrpSpPr/>
+        <p:nvPr/>
+      </p:nvGrpSpPr>
+      <p:grpSpPr>
+        <a:xfrm>
+          <a:off x="0" y="0"/>
+          <a:ext cx="0" cy="0"/>
+          <a:chOff x="0" y="0"/>
+          <a:chExt cx="0" cy="0"/>
+        </a:xfrm>
+      </p:grpSpPr>
+      <p:pic>
+        <p:nvPicPr>
+          <p:cNvPr id="1026" name="Picture 2" descr="Image associée">
+            <a:extLst>
+              <a:ext uri="{FF2B5EF4-FFF2-40B4-BE49-F238E27FC236}">
+                <a16:creationId xmlns:a16="http://schemas.microsoft.com/office/drawing/2014/main" id="{C816F3D8-CC4C-46B3-A21E-58AE9AD30454}"/>
+              </a:ext>
+            </a:extLst>
+          </p:cNvPr>
+          <p:cNvPicPr>
+            <a:picLocks noChangeAspect="1" noChangeArrowheads="1"/>
+          </p:cNvPicPr>
+          <p:nvPr/>
+        </p:nvPicPr>
+        <p:blipFill rotWithShape="1">
+          <a:blip r:embed="rId2">
+            <a:extLst>
+              <a:ext uri="{28A0092B-C50C-407E-A947-70E740481C1C}">
+                <a14:useLocalDpi xmlns:a14="http://schemas.microsoft.com/office/drawing/2010/main" val="0"/>
+              </a:ext>
+            </a:extLst>
+          </a:blip>
+          <a:srcRect l="18677" r="15441"/>
+          <a:stretch/>
+        </p:blipFill>
+        <p:spPr bwMode="auto">
+          <a:xfrm>
+            <a:off x="143436" y="143435"/>
+            <a:ext cx="2269635" cy="609600"/>
+          </a:xfrm>
+          <a:prstGeom prst="rect">
+            <a:avLst/>
+          </a:prstGeom>
+          <a:noFill/>
+          <a:extLst>
+            <a:ext uri="{909E8E84-426E-40DD-AFC4-6F175D3DCCD1}">
+              <a14:hiddenFill xmlns:a14="http://schemas.microsoft.com/office/drawing/2010/main">
+                <a:solidFill>
+                  <a:srgbClr val="FFFFFF"/>
+                </a:solidFill>
+              </a14:hiddenFill>
+            </a:ext>
+          </a:extLst>
+        </p:spPr>
+      </p:pic>
+      <p:sp>
+        <p:nvSpPr>
+          <p:cNvPr id="3" name="ZoneTexte 2">
+            <a:extLst>
+              <a:ext uri="{FF2B5EF4-FFF2-40B4-BE49-F238E27FC236}">
+                <a16:creationId xmlns:a16="http://schemas.microsoft.com/office/drawing/2014/main" id="{1582123C-25BF-42F1-97F8-35FFB48DFFAA}"/>
+              </a:ext>
+            </a:extLst>
+          </p:cNvPr>
+          <p:cNvSpPr txBox="1"/>
+          <p:nvPr/>
+        </p:nvSpPr>
+        <p:spPr>
+          <a:xfrm>
+            <a:off x="2477079" y="168260"/>
+            <a:ext cx="6848856" cy="584775"/>
+          </a:xfrm>
+          <a:prstGeom prst="rect">
+            <a:avLst/>
+          </a:prstGeom>
+          <a:noFill/>
+          <a:ln>
+            <a:noFill/>
+          </a:ln>
+          <a:effectLst>
+            <a:glow rad="63500">
+              <a:schemeClr val="accent4">
+                <a:satMod val="175000"/>
+                <a:alpha val="40000"/>
+              </a:schemeClr>
+            </a:glow>
+            <a:outerShdw blurRad="50800" dist="38100" dir="5400000" algn="t" rotWithShape="0">
+              <a:prstClr val="black">
+                <a:alpha val="40000"/>
+              </a:prstClr>
+            </a:outerShdw>
+          </a:effectLst>
+          <a:scene3d>
+            <a:camera prst="orthographicFront">
+              <a:rot lat="0" lon="0" rev="0"/>
+            </a:camera>
+            <a:lightRig rig="soft" dir="t">
+              <a:rot lat="0" lon="0" rev="0"/>
+            </a:lightRig>
+          </a:scene3d>
+          <a:sp3d contourW="44450" prstMaterial="matte">
+            <a:bevelT w="63500" h="63500" prst="artDeco"/>
+            <a:contourClr>
+              <a:srgbClr val="FFFFFF"/>
+            </a:contourClr>
+          </a:sp3d>
+        </p:spPr>
+        <p:txBody>
+          <a:bodyPr wrap="square" rtlCol="0">
+            <a:spAutoFit/>
+          </a:bodyPr>
+          <a:lstStyle/>
+          <a:p>
+            <a:pPr algn="ctr"/>
+            <a:r>
+              <a:rPr lang="fr-FR" sz="3200" b="1" dirty="0">
+                <a:latin typeface="Eras Medium ITC" panose="020B0602030504020804" pitchFamily="34" charset="0"/>
+              </a:rPr>
+              <a:t>Planification Gantt - </a:t>
+            </a:r>
+            <a:r>
+              <a:rPr lang="fr-FR" sz="2800" b="1" dirty="0">
+                <a:solidFill>
+                  <a:srgbClr val="A41258"/>
+                </a:solidFill>
+                <a:latin typeface="Eras Medium ITC" panose="020B0602030504020804" pitchFamily="34" charset="0"/>
+              </a:rPr>
+              <a:t>Partie personnelle </a:t>
+            </a:r>
+            <a:r>
+              <a:rPr lang="fr-FR" sz="2800" b="1" dirty="0">
+                <a:latin typeface="Eras Medium ITC" panose="020B0602030504020804" pitchFamily="34" charset="0"/>
+              </a:rPr>
+              <a:t>:</a:t>
+            </a:r>
+          </a:p>
+        </p:txBody>
+      </p:sp>
+      <p:pic>
+        <p:nvPicPr>
+          <p:cNvPr id="4" name="Image 3">
+            <a:extLst>
+              <a:ext uri="{FF2B5EF4-FFF2-40B4-BE49-F238E27FC236}">
+                <a16:creationId xmlns:a16="http://schemas.microsoft.com/office/drawing/2014/main" id="{62B69717-E633-4EC8-B3A1-6EC9DF2156A9}"/>
+              </a:ext>
+            </a:extLst>
+          </p:cNvPr>
+          <p:cNvPicPr>
+            <a:picLocks noChangeAspect="1"/>
+          </p:cNvPicPr>
+          <p:nvPr/>
+        </p:nvPicPr>
+        <p:blipFill>
+          <a:blip r:embed="rId3"/>
+          <a:stretch>
+            <a:fillRect/>
+          </a:stretch>
+        </p:blipFill>
+        <p:spPr>
+          <a:xfrm>
+            <a:off x="107048" y="802102"/>
+            <a:ext cx="9539303" cy="5912463"/>
+          </a:xfrm>
+          <a:prstGeom prst="rect">
+            <a:avLst/>
+          </a:prstGeom>
+          <a:ln>
+            <a:noFill/>
+          </a:ln>
+          <a:effectLst>
+            <a:outerShdw blurRad="292100" dist="139700" dir="2700000" algn="tl" rotWithShape="0">
+              <a:srgbClr val="333333">
+                <a:alpha val="65000"/>
+              </a:srgbClr>
+            </a:outerShdw>
+          </a:effectLst>
+        </p:spPr>
+      </p:pic>
+    </p:spTree>
+    <p:extLst>
+      <p:ext uri="{BB962C8B-B14F-4D97-AF65-F5344CB8AC3E}">
+        <p14:creationId xmlns:p14="http://schemas.microsoft.com/office/powerpoint/2010/main" val="1042172690"/>
       </p:ext>
     </p:extLst>
   </p:cSld>
@@ -13256,57 +14459,12 @@
           <a:chExt cx="0" cy="0"/>
         </a:xfrm>
       </p:grpSpPr>
-      <p:pic>
-        <p:nvPicPr>
-          <p:cNvPr id="1026" name="Picture 2" descr="Image associée">
+      <p:sp>
+        <p:nvSpPr>
+          <p:cNvPr id="4" name="ZoneTexte 3">
             <a:extLst>
               <a:ext uri="{FF2B5EF4-FFF2-40B4-BE49-F238E27FC236}">
-                <a16:creationId xmlns:a16="http://schemas.microsoft.com/office/drawing/2014/main" id="{C816F3D8-CC4C-46B3-A21E-58AE9AD30454}"/>
-              </a:ext>
-            </a:extLst>
-          </p:cNvPr>
-          <p:cNvPicPr>
-            <a:picLocks noChangeAspect="1" noChangeArrowheads="1"/>
-          </p:cNvPicPr>
-          <p:nvPr/>
-        </p:nvPicPr>
-        <p:blipFill rotWithShape="1">
-          <a:blip r:embed="rId2">
-            <a:extLst>
-              <a:ext uri="{28A0092B-C50C-407E-A947-70E740481C1C}">
-                <a14:useLocalDpi xmlns:a14="http://schemas.microsoft.com/office/drawing/2010/main" val="0"/>
-              </a:ext>
-            </a:extLst>
-          </a:blip>
-          <a:srcRect l="18677" r="15441"/>
-          <a:stretch/>
-        </p:blipFill>
-        <p:spPr bwMode="auto">
-          <a:xfrm>
-            <a:off x="143436" y="143435"/>
-            <a:ext cx="2269635" cy="609600"/>
-          </a:xfrm>
-          <a:prstGeom prst="rect">
-            <a:avLst/>
-          </a:prstGeom>
-          <a:noFill/>
-          <a:extLst>
-            <a:ext uri="{909E8E84-426E-40DD-AFC4-6F175D3DCCD1}">
-              <a14:hiddenFill xmlns:a14="http://schemas.microsoft.com/office/drawing/2010/main">
-                <a:solidFill>
-                  <a:srgbClr val="FFFFFF"/>
-                </a:solidFill>
-              </a14:hiddenFill>
-            </a:ext>
-          </a:extLst>
-        </p:spPr>
-      </p:pic>
-      <p:sp>
-        <p:nvSpPr>
-          <p:cNvPr id="3" name="ZoneTexte 2">
-            <a:extLst>
-              <a:ext uri="{FF2B5EF4-FFF2-40B4-BE49-F238E27FC236}">
-                <a16:creationId xmlns:a16="http://schemas.microsoft.com/office/drawing/2014/main" id="{16637F4C-A45D-4A64-84F7-746FFFD316BB}"/>
+                <a16:creationId xmlns:a16="http://schemas.microsoft.com/office/drawing/2014/main" id="{B996E070-5299-461D-9259-6BD38B8072A0}"/>
               </a:ext>
             </a:extLst>
           </p:cNvPr>
@@ -13315,8 +14473,8 @@
         </p:nvSpPr>
         <p:spPr>
           <a:xfrm>
-            <a:off x="-106043" y="2836021"/>
-            <a:ext cx="3242435" cy="646331"/>
+            <a:off x="3323065" y="103221"/>
+            <a:ext cx="5698272" cy="1138773"/>
           </a:xfrm>
           <a:prstGeom prst="rect">
             <a:avLst/>
@@ -13361,107 +14519,35 @@
           <a:p>
             <a:pPr algn="ctr"/>
             <a:r>
-              <a:rPr lang="fr-FR" sz="2000" b="1" dirty="0">
+              <a:rPr lang="fr-FR" sz="3600" b="1" dirty="0">
                 <a:latin typeface="Eras Medium ITC" panose="020B0602030504020804" pitchFamily="34" charset="0"/>
               </a:rPr>
-              <a:t>Diagramme de séquence : </a:t>
-            </a:r>
-            <a:r>
-              <a:rPr lang="fr-FR" sz="1600" b="1" dirty="0">
+              <a:t>Application de supervision </a:t>
+            </a:r>
+            <a:r>
+              <a:rPr lang="fr-FR" sz="2800" b="1" dirty="0">
                 <a:solidFill>
                   <a:srgbClr val="A41258"/>
                 </a:solidFill>
                 <a:latin typeface="Eras Medium ITC" panose="020B0602030504020804" pitchFamily="34" charset="0"/>
               </a:rPr>
-              <a:t>Lancement d’une partie</a:t>
-            </a:r>
-            <a:endParaRPr lang="fr-FR" b="1" dirty="0">
-              <a:solidFill>
-                <a:srgbClr val="A41258"/>
-              </a:solidFill>
-              <a:latin typeface="Eras Medium ITC" panose="020B0602030504020804" pitchFamily="34" charset="0"/>
-            </a:endParaRPr>
+              <a:t>Lancer une partie </a:t>
+            </a:r>
+            <a:r>
+              <a:rPr lang="fr-FR" sz="3200" b="1" dirty="0">
+                <a:latin typeface="Eras Medium ITC" panose="020B0602030504020804" pitchFamily="34" charset="0"/>
+              </a:rPr>
+              <a:t>:</a:t>
+            </a:r>
           </a:p>
         </p:txBody>
       </p:sp>
       <p:pic>
         <p:nvPicPr>
-          <p:cNvPr id="2" name="Image 1">
+          <p:cNvPr id="5" name="Picture 2" descr="Image associée">
             <a:extLst>
               <a:ext uri="{FF2B5EF4-FFF2-40B4-BE49-F238E27FC236}">
-                <a16:creationId xmlns:a16="http://schemas.microsoft.com/office/drawing/2014/main" id="{EB85B4BA-1247-4132-A680-7202937A7093}"/>
-              </a:ext>
-            </a:extLst>
-          </p:cNvPr>
-          <p:cNvPicPr>
-            <a:picLocks noChangeAspect="1"/>
-          </p:cNvPicPr>
-          <p:nvPr/>
-        </p:nvPicPr>
-        <p:blipFill>
-          <a:blip r:embed="rId3"/>
-          <a:stretch>
-            <a:fillRect/>
-          </a:stretch>
-        </p:blipFill>
-        <p:spPr>
-          <a:xfrm>
-            <a:off x="2412013" y="-119099"/>
-            <a:ext cx="7367973" cy="6977099"/>
-          </a:xfrm>
-          <a:prstGeom prst="rect">
-            <a:avLst/>
-          </a:prstGeom>
-        </p:spPr>
-      </p:pic>
-    </p:spTree>
-    <p:extLst>
-      <p:ext uri="{BB962C8B-B14F-4D97-AF65-F5344CB8AC3E}">
-        <p14:creationId xmlns:p14="http://schemas.microsoft.com/office/powerpoint/2010/main" val="1236978261"/>
-      </p:ext>
-    </p:extLst>
-  </p:cSld>
-  <p:clrMapOvr>
-    <a:masterClrMapping/>
-  </p:clrMapOvr>
-  <mc:AlternateContent xmlns:mc="http://schemas.openxmlformats.org/markup-compatibility/2006" xmlns:p159="http://schemas.microsoft.com/office/powerpoint/2015/09/main">
-    <mc:Choice Requires="p159">
-      <p:transition xmlns:p14="http://schemas.microsoft.com/office/powerpoint/2010/main" spd="slow" p14:dur="2000">
-        <p159:morph option="byObject"/>
-      </p:transition>
-    </mc:Choice>
-    <mc:Fallback xmlns="">
-      <p:transition spd="slow">
-        <p:fade/>
-      </p:transition>
-    </mc:Fallback>
-  </mc:AlternateContent>
-</p:sld>
-</file>
-
-<file path=ppt/slides/slide9.xml><?xml version="1.0" encoding="utf-8"?>
-<p:sld xmlns:a="http://schemas.openxmlformats.org/drawingml/2006/main" xmlns:r="http://schemas.openxmlformats.org/officeDocument/2006/relationships" xmlns:p="http://schemas.openxmlformats.org/presentationml/2006/main">
-  <p:cSld>
-    <p:spTree>
-      <p:nvGrpSpPr>
-        <p:cNvPr id="1" name=""/>
-        <p:cNvGrpSpPr/>
-        <p:nvPr/>
-      </p:nvGrpSpPr>
-      <p:grpSpPr>
-        <a:xfrm>
-          <a:off x="0" y="0"/>
-          <a:ext cx="0" cy="0"/>
-          <a:chOff x="0" y="0"/>
-          <a:chExt cx="0" cy="0"/>
-        </a:xfrm>
-      </p:grpSpPr>
-      <p:pic>
-        <p:nvPicPr>
-          <p:cNvPr id="1026" name="Picture 2" descr="Image associée">
-            <a:extLst>
-              <a:ext uri="{FF2B5EF4-FFF2-40B4-BE49-F238E27FC236}">
-                <a16:creationId xmlns:a16="http://schemas.microsoft.com/office/drawing/2014/main" id="{C816F3D8-CC4C-46B3-A21E-58AE9AD30454}"/>
+                <a16:creationId xmlns:a16="http://schemas.microsoft.com/office/drawing/2014/main" id="{42980D13-27EB-407A-A911-1179305F49FC}"/>
               </a:ext>
             </a:extLst>
           </p:cNvPr>
@@ -13501,12 +14587,81 @@
           </a:extLst>
         </p:spPr>
       </p:pic>
+      <p:pic>
+        <p:nvPicPr>
+          <p:cNvPr id="6" name="Image 5">
+            <a:extLst>
+              <a:ext uri="{FF2B5EF4-FFF2-40B4-BE49-F238E27FC236}">
+                <a16:creationId xmlns:a16="http://schemas.microsoft.com/office/drawing/2014/main" id="{2DF70B55-D409-4D06-BEFE-77DF00988E09}"/>
+              </a:ext>
+            </a:extLst>
+          </p:cNvPr>
+          <p:cNvPicPr>
+            <a:picLocks noChangeAspect="1"/>
+          </p:cNvPicPr>
+          <p:nvPr/>
+        </p:nvPicPr>
+        <p:blipFill rotWithShape="1">
+          <a:blip r:embed="rId3"/>
+          <a:srcRect r="549" b="931"/>
+          <a:stretch/>
+        </p:blipFill>
+        <p:spPr>
+          <a:xfrm>
+            <a:off x="2413071" y="1416204"/>
+            <a:ext cx="4837835" cy="5015552"/>
+          </a:xfrm>
+          <a:prstGeom prst="rect">
+            <a:avLst/>
+          </a:prstGeom>
+          <a:ln>
+            <a:noFill/>
+          </a:ln>
+          <a:effectLst>
+            <a:outerShdw blurRad="292100" dist="139700" dir="2700000" algn="tl" rotWithShape="0">
+              <a:srgbClr val="333333">
+                <a:alpha val="65000"/>
+              </a:srgbClr>
+            </a:outerShdw>
+          </a:effectLst>
+        </p:spPr>
+      </p:pic>
+    </p:spTree>
+    <p:extLst>
+      <p:ext uri="{BB962C8B-B14F-4D97-AF65-F5344CB8AC3E}">
+        <p14:creationId xmlns:p14="http://schemas.microsoft.com/office/powerpoint/2010/main" val="2860333650"/>
+      </p:ext>
+    </p:extLst>
+  </p:cSld>
+  <p:clrMapOvr>
+    <a:masterClrMapping/>
+  </p:clrMapOvr>
+</p:sld>
+</file>
+
+<file path=ppt/slides/slide9.xml><?xml version="1.0" encoding="utf-8"?>
+<p:sld xmlns:a="http://schemas.openxmlformats.org/drawingml/2006/main" xmlns:r="http://schemas.openxmlformats.org/officeDocument/2006/relationships" xmlns:p="http://schemas.openxmlformats.org/presentationml/2006/main">
+  <p:cSld>
+    <p:spTree>
+      <p:nvGrpSpPr>
+        <p:cNvPr id="1" name=""/>
+        <p:cNvGrpSpPr/>
+        <p:nvPr/>
+      </p:nvGrpSpPr>
+      <p:grpSpPr>
+        <a:xfrm>
+          <a:off x="0" y="0"/>
+          <a:ext cx="0" cy="0"/>
+          <a:chOff x="0" y="0"/>
+          <a:chExt cx="0" cy="0"/>
+        </a:xfrm>
+      </p:grpSpPr>
       <p:sp>
         <p:nvSpPr>
-          <p:cNvPr id="5" name="ZoneTexte 4">
+          <p:cNvPr id="4" name="ZoneTexte 3">
             <a:extLst>
               <a:ext uri="{FF2B5EF4-FFF2-40B4-BE49-F238E27FC236}">
-                <a16:creationId xmlns:a16="http://schemas.microsoft.com/office/drawing/2014/main" id="{DE4D560C-9537-428C-82EA-D1E94E276955}"/>
+                <a16:creationId xmlns:a16="http://schemas.microsoft.com/office/drawing/2014/main" id="{B996E070-5299-461D-9259-6BD38B8072A0}"/>
               </a:ext>
             </a:extLst>
           </p:cNvPr>
@@ -13515,8 +14670,8 @@
         </p:nvSpPr>
         <p:spPr>
           <a:xfrm>
-            <a:off x="3560382" y="125069"/>
-            <a:ext cx="3242435" cy="646331"/>
+            <a:off x="3323065" y="103221"/>
+            <a:ext cx="5698272" cy="1138773"/>
           </a:xfrm>
           <a:prstGeom prst="rect">
             <a:avLst/>
@@ -13561,35 +14716,89 @@
           <a:p>
             <a:pPr algn="ctr"/>
             <a:r>
-              <a:rPr lang="fr-FR" sz="2000" b="1" dirty="0">
+              <a:rPr lang="fr-FR" sz="3600" b="1" dirty="0">
                 <a:latin typeface="Eras Medium ITC" panose="020B0602030504020804" pitchFamily="34" charset="0"/>
               </a:rPr>
-              <a:t>Diagramme de séquence : </a:t>
-            </a:r>
-            <a:r>
-              <a:rPr lang="fr-FR" sz="1600" b="1" dirty="0">
+              <a:t>Application de supervision </a:t>
+            </a:r>
+            <a:r>
+              <a:rPr lang="fr-FR" sz="2800" b="1" dirty="0" err="1">
                 <a:solidFill>
                   <a:srgbClr val="A41258"/>
                 </a:solidFill>
                 <a:latin typeface="Eras Medium ITC" panose="020B0602030504020804" pitchFamily="34" charset="0"/>
               </a:rPr>
-              <a:t>Envoi d’un message</a:t>
-            </a:r>
-            <a:endParaRPr lang="fr-FR" b="1" dirty="0">
-              <a:solidFill>
-                <a:srgbClr val="A41258"/>
-              </a:solidFill>
-              <a:latin typeface="Eras Medium ITC" panose="020B0602030504020804" pitchFamily="34" charset="0"/>
-            </a:endParaRPr>
+              <a:t>Supervision</a:t>
+            </a:r>
+            <a:r>
+              <a:rPr lang="fr-FR" sz="2800" b="1" dirty="0">
+                <a:solidFill>
+                  <a:srgbClr val="A41258"/>
+                </a:solidFill>
+                <a:latin typeface="Eras Medium ITC" panose="020B0602030504020804" pitchFamily="34" charset="0"/>
+              </a:rPr>
+              <a:t> </a:t>
+            </a:r>
+            <a:r>
+              <a:rPr lang="fr-FR" sz="3200" b="1" dirty="0">
+                <a:latin typeface="Eras Medium ITC" panose="020B0602030504020804" pitchFamily="34" charset="0"/>
+              </a:rPr>
+              <a:t>:</a:t>
+            </a:r>
           </a:p>
         </p:txBody>
       </p:sp>
       <p:pic>
         <p:nvPicPr>
-          <p:cNvPr id="4" name="Image 3">
+          <p:cNvPr id="5" name="Picture 2" descr="Image associée">
             <a:extLst>
               <a:ext uri="{FF2B5EF4-FFF2-40B4-BE49-F238E27FC236}">
-                <a16:creationId xmlns:a16="http://schemas.microsoft.com/office/drawing/2014/main" id="{23D5BB14-85E0-47B6-9674-A8E0DB36C8AC}"/>
+                <a16:creationId xmlns:a16="http://schemas.microsoft.com/office/drawing/2014/main" id="{42980D13-27EB-407A-A911-1179305F49FC}"/>
+              </a:ext>
+            </a:extLst>
+          </p:cNvPr>
+          <p:cNvPicPr>
+            <a:picLocks noChangeAspect="1" noChangeArrowheads="1"/>
+          </p:cNvPicPr>
+          <p:nvPr/>
+        </p:nvPicPr>
+        <p:blipFill rotWithShape="1">
+          <a:blip r:embed="rId2">
+            <a:extLst>
+              <a:ext uri="{28A0092B-C50C-407E-A947-70E740481C1C}">
+                <a14:useLocalDpi xmlns:a14="http://schemas.microsoft.com/office/drawing/2010/main" val="0"/>
+              </a:ext>
+            </a:extLst>
+          </a:blip>
+          <a:srcRect l="18677" r="15441"/>
+          <a:stretch/>
+        </p:blipFill>
+        <p:spPr bwMode="auto">
+          <a:xfrm>
+            <a:off x="143436" y="143435"/>
+            <a:ext cx="2269635" cy="609600"/>
+          </a:xfrm>
+          <a:prstGeom prst="rect">
+            <a:avLst/>
+          </a:prstGeom>
+          <a:noFill/>
+          <a:extLst>
+            <a:ext uri="{909E8E84-426E-40DD-AFC4-6F175D3DCCD1}">
+              <a14:hiddenFill xmlns:a14="http://schemas.microsoft.com/office/drawing/2010/main">
+                <a:solidFill>
+                  <a:srgbClr val="FFFFFF"/>
+                </a:solidFill>
+              </a14:hiddenFill>
+            </a:ext>
+          </a:extLst>
+        </p:spPr>
+      </p:pic>
+      <p:pic>
+        <p:nvPicPr>
+          <p:cNvPr id="2" name="Image 1">
+            <a:extLst>
+              <a:ext uri="{FF2B5EF4-FFF2-40B4-BE49-F238E27FC236}">
+                <a16:creationId xmlns:a16="http://schemas.microsoft.com/office/drawing/2014/main" id="{66C1DE2A-C142-4ED2-9E13-DCFA37058D76}"/>
               </a:ext>
             </a:extLst>
           </p:cNvPr>
@@ -13598,43 +14807,42 @@
           </p:cNvPicPr>
           <p:nvPr/>
         </p:nvPicPr>
-        <p:blipFill rotWithShape="1">
+        <p:blipFill>
           <a:blip r:embed="rId3"/>
-          <a:srcRect t="4014"/>
-          <a:stretch/>
+          <a:stretch>
+            <a:fillRect/>
+          </a:stretch>
         </p:blipFill>
         <p:spPr>
           <a:xfrm>
-            <a:off x="143436" y="753035"/>
-            <a:ext cx="9576636" cy="6112494"/>
+            <a:off x="813034" y="1241994"/>
+            <a:ext cx="7722875" cy="5111496"/>
           </a:xfrm>
           <a:prstGeom prst="rect">
             <a:avLst/>
           </a:prstGeom>
+          <a:ln>
+            <a:noFill/>
+          </a:ln>
+          <a:effectLst>
+            <a:outerShdw blurRad="292100" dist="139700" dir="2700000" algn="tl" rotWithShape="0">
+              <a:srgbClr val="333333">
+                <a:alpha val="65000"/>
+              </a:srgbClr>
+            </a:outerShdw>
+          </a:effectLst>
         </p:spPr>
       </p:pic>
     </p:spTree>
     <p:extLst>
       <p:ext uri="{BB962C8B-B14F-4D97-AF65-F5344CB8AC3E}">
-        <p14:creationId xmlns:p14="http://schemas.microsoft.com/office/powerpoint/2010/main" val="2695738063"/>
+        <p14:creationId xmlns:p14="http://schemas.microsoft.com/office/powerpoint/2010/main" val="428774615"/>
       </p:ext>
     </p:extLst>
   </p:cSld>
   <p:clrMapOvr>
     <a:masterClrMapping/>
   </p:clrMapOvr>
-  <mc:AlternateContent xmlns:mc="http://schemas.openxmlformats.org/markup-compatibility/2006" xmlns:p159="http://schemas.microsoft.com/office/powerpoint/2015/09/main">
-    <mc:Choice Requires="p159">
-      <p:transition xmlns:p14="http://schemas.microsoft.com/office/powerpoint/2010/main" spd="slow" p14:dur="2000">
-        <p159:morph option="byObject"/>
-      </p:transition>
-    </mc:Choice>
-    <mc:Fallback xmlns="">
-      <p:transition spd="slow">
-        <p:fade/>
-      </p:transition>
-    </mc:Fallback>
-  </mc:AlternateContent>
 </p:sld>
 </file>
 

</xml_diff>

<commit_message>
MAJ diaporama de revue 2. Apport de modifications dans le modèle relationnel.
</commit_message>
<xml_diff>
--- a/Nathan/Compte-rendus/REVUE-R2-GUIGAND-SFL6.pptx
+++ b/Nathan/Compte-rendus/REVUE-R2-GUIGAND-SFL6.pptx
@@ -10,17 +10,17 @@
     <p:sldId id="259" r:id="rId4"/>
     <p:sldId id="270" r:id="rId5"/>
     <p:sldId id="271" r:id="rId6"/>
-    <p:sldId id="269" r:id="rId7"/>
-    <p:sldId id="266" r:id="rId8"/>
-    <p:sldId id="274" r:id="rId9"/>
-    <p:sldId id="275" r:id="rId10"/>
-    <p:sldId id="276" r:id="rId11"/>
-    <p:sldId id="261" r:id="rId12"/>
-    <p:sldId id="264" r:id="rId13"/>
-    <p:sldId id="267" r:id="rId14"/>
-    <p:sldId id="265" r:id="rId15"/>
-    <p:sldId id="273" r:id="rId16"/>
-    <p:sldId id="262" r:id="rId17"/>
+    <p:sldId id="262" r:id="rId7"/>
+    <p:sldId id="269" r:id="rId8"/>
+    <p:sldId id="266" r:id="rId9"/>
+    <p:sldId id="274" r:id="rId10"/>
+    <p:sldId id="275" r:id="rId11"/>
+    <p:sldId id="276" r:id="rId12"/>
+    <p:sldId id="261" r:id="rId13"/>
+    <p:sldId id="264" r:id="rId14"/>
+    <p:sldId id="267" r:id="rId15"/>
+    <p:sldId id="265" r:id="rId16"/>
+    <p:sldId id="273" r:id="rId17"/>
     <p:sldId id="263" r:id="rId18"/>
     <p:sldId id="272" r:id="rId19"/>
   </p:sldIdLst>
@@ -10117,6 +10117,213 @@
               <a:t>Application de supervision </a:t>
             </a:r>
             <a:r>
+              <a:rPr lang="fr-FR" sz="2800" b="1" dirty="0" err="1">
+                <a:solidFill>
+                  <a:srgbClr val="A41258"/>
+                </a:solidFill>
+                <a:latin typeface="Eras Medium ITC" panose="020B0602030504020804" pitchFamily="34" charset="0"/>
+              </a:rPr>
+              <a:t>Supervision</a:t>
+            </a:r>
+            <a:r>
+              <a:rPr lang="fr-FR" sz="2800" b="1" dirty="0">
+                <a:solidFill>
+                  <a:srgbClr val="A41258"/>
+                </a:solidFill>
+                <a:latin typeface="Eras Medium ITC" panose="020B0602030504020804" pitchFamily="34" charset="0"/>
+              </a:rPr>
+              <a:t> </a:t>
+            </a:r>
+            <a:r>
+              <a:rPr lang="fr-FR" sz="3200" b="1" dirty="0">
+                <a:latin typeface="Eras Medium ITC" panose="020B0602030504020804" pitchFamily="34" charset="0"/>
+              </a:rPr>
+              <a:t>:</a:t>
+            </a:r>
+          </a:p>
+        </p:txBody>
+      </p:sp>
+      <p:pic>
+        <p:nvPicPr>
+          <p:cNvPr id="5" name="Picture 2" descr="Image associée">
+            <a:extLst>
+              <a:ext uri="{FF2B5EF4-FFF2-40B4-BE49-F238E27FC236}">
+                <a16:creationId xmlns:a16="http://schemas.microsoft.com/office/drawing/2014/main" id="{42980D13-27EB-407A-A911-1179305F49FC}"/>
+              </a:ext>
+            </a:extLst>
+          </p:cNvPr>
+          <p:cNvPicPr>
+            <a:picLocks noChangeAspect="1" noChangeArrowheads="1"/>
+          </p:cNvPicPr>
+          <p:nvPr/>
+        </p:nvPicPr>
+        <p:blipFill rotWithShape="1">
+          <a:blip r:embed="rId2">
+            <a:extLst>
+              <a:ext uri="{28A0092B-C50C-407E-A947-70E740481C1C}">
+                <a14:useLocalDpi xmlns:a14="http://schemas.microsoft.com/office/drawing/2010/main" val="0"/>
+              </a:ext>
+            </a:extLst>
+          </a:blip>
+          <a:srcRect l="18677" r="15441"/>
+          <a:stretch/>
+        </p:blipFill>
+        <p:spPr bwMode="auto">
+          <a:xfrm>
+            <a:off x="143436" y="143435"/>
+            <a:ext cx="2269635" cy="609600"/>
+          </a:xfrm>
+          <a:prstGeom prst="rect">
+            <a:avLst/>
+          </a:prstGeom>
+          <a:noFill/>
+          <a:extLst>
+            <a:ext uri="{909E8E84-426E-40DD-AFC4-6F175D3DCCD1}">
+              <a14:hiddenFill xmlns:a14="http://schemas.microsoft.com/office/drawing/2010/main">
+                <a:solidFill>
+                  <a:srgbClr val="FFFFFF"/>
+                </a:solidFill>
+              </a14:hiddenFill>
+            </a:ext>
+          </a:extLst>
+        </p:spPr>
+      </p:pic>
+      <p:pic>
+        <p:nvPicPr>
+          <p:cNvPr id="2" name="Image 1">
+            <a:extLst>
+              <a:ext uri="{FF2B5EF4-FFF2-40B4-BE49-F238E27FC236}">
+                <a16:creationId xmlns:a16="http://schemas.microsoft.com/office/drawing/2014/main" id="{66C1DE2A-C142-4ED2-9E13-DCFA37058D76}"/>
+              </a:ext>
+            </a:extLst>
+          </p:cNvPr>
+          <p:cNvPicPr>
+            <a:picLocks noChangeAspect="1"/>
+          </p:cNvPicPr>
+          <p:nvPr/>
+        </p:nvPicPr>
+        <p:blipFill>
+          <a:blip r:embed="rId3"/>
+          <a:stretch>
+            <a:fillRect/>
+          </a:stretch>
+        </p:blipFill>
+        <p:spPr>
+          <a:xfrm>
+            <a:off x="813034" y="1241994"/>
+            <a:ext cx="7722875" cy="5111496"/>
+          </a:xfrm>
+          <a:prstGeom prst="rect">
+            <a:avLst/>
+          </a:prstGeom>
+          <a:ln>
+            <a:noFill/>
+          </a:ln>
+          <a:effectLst>
+            <a:outerShdw blurRad="292100" dist="139700" dir="2700000" algn="tl" rotWithShape="0">
+              <a:srgbClr val="333333">
+                <a:alpha val="65000"/>
+              </a:srgbClr>
+            </a:outerShdw>
+          </a:effectLst>
+        </p:spPr>
+      </p:pic>
+    </p:spTree>
+    <p:extLst>
+      <p:ext uri="{BB962C8B-B14F-4D97-AF65-F5344CB8AC3E}">
+        <p14:creationId xmlns:p14="http://schemas.microsoft.com/office/powerpoint/2010/main" val="428774615"/>
+      </p:ext>
+    </p:extLst>
+  </p:cSld>
+  <p:clrMapOvr>
+    <a:masterClrMapping/>
+  </p:clrMapOvr>
+</p:sld>
+</file>
+
+<file path=ppt/slides/slide11.xml><?xml version="1.0" encoding="utf-8"?>
+<p:sld xmlns:a="http://schemas.openxmlformats.org/drawingml/2006/main" xmlns:r="http://schemas.openxmlformats.org/officeDocument/2006/relationships" xmlns:p="http://schemas.openxmlformats.org/presentationml/2006/main">
+  <p:cSld>
+    <p:spTree>
+      <p:nvGrpSpPr>
+        <p:cNvPr id="1" name=""/>
+        <p:cNvGrpSpPr/>
+        <p:nvPr/>
+      </p:nvGrpSpPr>
+      <p:grpSpPr>
+        <a:xfrm>
+          <a:off x="0" y="0"/>
+          <a:ext cx="0" cy="0"/>
+          <a:chOff x="0" y="0"/>
+          <a:chExt cx="0" cy="0"/>
+        </a:xfrm>
+      </p:grpSpPr>
+      <p:sp>
+        <p:nvSpPr>
+          <p:cNvPr id="4" name="ZoneTexte 3">
+            <a:extLst>
+              <a:ext uri="{FF2B5EF4-FFF2-40B4-BE49-F238E27FC236}">
+                <a16:creationId xmlns:a16="http://schemas.microsoft.com/office/drawing/2014/main" id="{B996E070-5299-461D-9259-6BD38B8072A0}"/>
+              </a:ext>
+            </a:extLst>
+          </p:cNvPr>
+          <p:cNvSpPr txBox="1"/>
+          <p:nvPr/>
+        </p:nvSpPr>
+        <p:spPr>
+          <a:xfrm>
+            <a:off x="3323065" y="103221"/>
+            <a:ext cx="5698272" cy="1138773"/>
+          </a:xfrm>
+          <a:prstGeom prst="rect">
+            <a:avLst/>
+          </a:prstGeom>
+          <a:noFill/>
+          <a:ln>
+            <a:noFill/>
+          </a:ln>
+          <a:effectLst>
+            <a:glow rad="63500">
+              <a:schemeClr val="accent4">
+                <a:satMod val="175000"/>
+                <a:alpha val="40000"/>
+              </a:schemeClr>
+            </a:glow>
+            <a:outerShdw blurRad="50800" dist="38100" dir="5400000" algn="t" rotWithShape="0">
+              <a:prstClr val="black">
+                <a:alpha val="40000"/>
+              </a:prstClr>
+            </a:outerShdw>
+          </a:effectLst>
+          <a:scene3d>
+            <a:camera prst="orthographicFront">
+              <a:rot lat="0" lon="0" rev="0"/>
+            </a:camera>
+            <a:lightRig rig="soft" dir="t">
+              <a:rot lat="0" lon="0" rev="0"/>
+            </a:lightRig>
+          </a:scene3d>
+          <a:sp3d contourW="44450" prstMaterial="matte">
+            <a:bevelT w="63500" h="63500" prst="artDeco"/>
+            <a:contourClr>
+              <a:srgbClr val="FFFFFF"/>
+            </a:contourClr>
+          </a:sp3d>
+        </p:spPr>
+        <p:txBody>
+          <a:bodyPr wrap="square" rtlCol="0">
+            <a:spAutoFit/>
+          </a:bodyPr>
+          <a:lstStyle/>
+          <a:p>
+            <a:pPr algn="ctr"/>
+            <a:r>
+              <a:rPr lang="fr-FR" sz="3600" b="1" dirty="0">
+                <a:latin typeface="Eras Medium ITC" panose="020B0602030504020804" pitchFamily="34" charset="0"/>
+              </a:rPr>
+              <a:t>Application de supervision </a:t>
+            </a:r>
+            <a:r>
               <a:rPr lang="fr-FR" sz="2800" b="1" dirty="0">
                 <a:solidFill>
                   <a:srgbClr val="A41258"/>
@@ -10272,7 +10479,7 @@
 </p:sld>
 </file>
 
-<file path=ppt/slides/slide11.xml><?xml version="1.0" encoding="utf-8"?>
+<file path=ppt/slides/slide12.xml><?xml version="1.0" encoding="utf-8"?>
 <p:sld xmlns:a="http://schemas.openxmlformats.org/drawingml/2006/main" xmlns:r="http://schemas.openxmlformats.org/officeDocument/2006/relationships" xmlns:p="http://schemas.openxmlformats.org/presentationml/2006/main">
   <p:cSld>
     <p:spTree>
@@ -10472,7 +10679,7 @@
 </p:sld>
 </file>
 
-<file path=ppt/slides/slide12.xml><?xml version="1.0" encoding="utf-8"?>
+<file path=ppt/slides/slide13.xml><?xml version="1.0" encoding="utf-8"?>
 <p:sld xmlns:a="http://schemas.openxmlformats.org/drawingml/2006/main" xmlns:r="http://schemas.openxmlformats.org/officeDocument/2006/relationships" xmlns:p="http://schemas.openxmlformats.org/presentationml/2006/main">
   <p:cSld>
     <p:spTree>
@@ -10671,7 +10878,7 @@
 </p:sld>
 </file>
 
-<file path=ppt/slides/slide13.xml><?xml version="1.0" encoding="utf-8"?>
+<file path=ppt/slides/slide14.xml><?xml version="1.0" encoding="utf-8"?>
 <p:sld xmlns:a="http://schemas.openxmlformats.org/drawingml/2006/main" xmlns:r="http://schemas.openxmlformats.org/officeDocument/2006/relationships" xmlns:p="http://schemas.openxmlformats.org/presentationml/2006/main">
   <p:cSld>
     <p:spTree>
@@ -10734,7 +10941,7 @@
 </p:sld>
 </file>
 
-<file path=ppt/slides/slide14.xml><?xml version="1.0" encoding="utf-8"?>
+<file path=ppt/slides/slide15.xml><?xml version="1.0" encoding="utf-8"?>
 <p:sld xmlns:a="http://schemas.openxmlformats.org/drawingml/2006/main" xmlns:r="http://schemas.openxmlformats.org/officeDocument/2006/relationships" xmlns:p="http://schemas.openxmlformats.org/presentationml/2006/main">
   <p:cSld>
     <p:spTree>
@@ -10934,7 +11141,7 @@
 </p:sld>
 </file>
 
-<file path=ppt/slides/slide15.xml><?xml version="1.0" encoding="utf-8"?>
+<file path=ppt/slides/slide16.xml><?xml version="1.0" encoding="utf-8"?>
 <p:sld xmlns:a="http://schemas.openxmlformats.org/drawingml/2006/main" xmlns:r="http://schemas.openxmlformats.org/officeDocument/2006/relationships" xmlns:p="http://schemas.openxmlformats.org/presentationml/2006/main">
   <p:cSld>
     <p:spTree>
@@ -11119,209 +11326,6 @@
   <p:clrMapOvr>
     <a:masterClrMapping/>
   </p:clrMapOvr>
-</p:sld>
-</file>
-
-<file path=ppt/slides/slide16.xml><?xml version="1.0" encoding="utf-8"?>
-<p:sld xmlns:a="http://schemas.openxmlformats.org/drawingml/2006/main" xmlns:r="http://schemas.openxmlformats.org/officeDocument/2006/relationships" xmlns:p="http://schemas.openxmlformats.org/presentationml/2006/main">
-  <p:cSld>
-    <p:spTree>
-      <p:nvGrpSpPr>
-        <p:cNvPr id="1" name=""/>
-        <p:cNvGrpSpPr/>
-        <p:nvPr/>
-      </p:nvGrpSpPr>
-      <p:grpSpPr>
-        <a:xfrm>
-          <a:off x="0" y="0"/>
-          <a:ext cx="0" cy="0"/>
-          <a:chOff x="0" y="0"/>
-          <a:chExt cx="0" cy="0"/>
-        </a:xfrm>
-      </p:grpSpPr>
-      <p:pic>
-        <p:nvPicPr>
-          <p:cNvPr id="1026" name="Picture 2" descr="Image associée">
-            <a:extLst>
-              <a:ext uri="{FF2B5EF4-FFF2-40B4-BE49-F238E27FC236}">
-                <a16:creationId xmlns:a16="http://schemas.microsoft.com/office/drawing/2014/main" id="{C816F3D8-CC4C-46B3-A21E-58AE9AD30454}"/>
-              </a:ext>
-            </a:extLst>
-          </p:cNvPr>
-          <p:cNvPicPr>
-            <a:picLocks noChangeAspect="1" noChangeArrowheads="1"/>
-          </p:cNvPicPr>
-          <p:nvPr/>
-        </p:nvPicPr>
-        <p:blipFill rotWithShape="1">
-          <a:blip r:embed="rId2">
-            <a:extLst>
-              <a:ext uri="{28A0092B-C50C-407E-A947-70E740481C1C}">
-                <a14:useLocalDpi xmlns:a14="http://schemas.microsoft.com/office/drawing/2010/main" val="0"/>
-              </a:ext>
-            </a:extLst>
-          </a:blip>
-          <a:srcRect l="18677" r="15441"/>
-          <a:stretch/>
-        </p:blipFill>
-        <p:spPr bwMode="auto">
-          <a:xfrm>
-            <a:off x="143436" y="143435"/>
-            <a:ext cx="2269635" cy="609600"/>
-          </a:xfrm>
-          <a:prstGeom prst="rect">
-            <a:avLst/>
-          </a:prstGeom>
-          <a:noFill/>
-          <a:extLst>
-            <a:ext uri="{909E8E84-426E-40DD-AFC4-6F175D3DCCD1}">
-              <a14:hiddenFill xmlns:a14="http://schemas.microsoft.com/office/drawing/2010/main">
-                <a:solidFill>
-                  <a:srgbClr val="FFFFFF"/>
-                </a:solidFill>
-              </a14:hiddenFill>
-            </a:ext>
-          </a:extLst>
-        </p:spPr>
-      </p:pic>
-      <p:sp>
-        <p:nvSpPr>
-          <p:cNvPr id="3" name="ZoneTexte 2">
-            <a:extLst>
-              <a:ext uri="{FF2B5EF4-FFF2-40B4-BE49-F238E27FC236}">
-                <a16:creationId xmlns:a16="http://schemas.microsoft.com/office/drawing/2014/main" id="{B5DA24B5-6993-45AE-B83E-5BA1E69FACD0}"/>
-              </a:ext>
-            </a:extLst>
-          </p:cNvPr>
-          <p:cNvSpPr txBox="1"/>
-          <p:nvPr/>
-        </p:nvSpPr>
-        <p:spPr>
-          <a:xfrm>
-            <a:off x="2816352" y="143435"/>
-            <a:ext cx="5342576" cy="646331"/>
-          </a:xfrm>
-          <a:prstGeom prst="rect">
-            <a:avLst/>
-          </a:prstGeom>
-          <a:noFill/>
-          <a:ln>
-            <a:noFill/>
-          </a:ln>
-          <a:effectLst>
-            <a:glow rad="63500">
-              <a:schemeClr val="accent4">
-                <a:satMod val="175000"/>
-                <a:alpha val="40000"/>
-              </a:schemeClr>
-            </a:glow>
-            <a:outerShdw blurRad="50800" dist="38100" dir="5400000" algn="t" rotWithShape="0">
-              <a:prstClr val="black">
-                <a:alpha val="40000"/>
-              </a:prstClr>
-            </a:outerShdw>
-          </a:effectLst>
-          <a:scene3d>
-            <a:camera prst="orthographicFront">
-              <a:rot lat="0" lon="0" rev="0"/>
-            </a:camera>
-            <a:lightRig rig="soft" dir="t">
-              <a:rot lat="0" lon="0" rev="0"/>
-            </a:lightRig>
-          </a:scene3d>
-          <a:sp3d contourW="44450" prstMaterial="matte">
-            <a:bevelT w="63500" h="63500" prst="artDeco"/>
-            <a:contourClr>
-              <a:srgbClr val="FFFFFF"/>
-            </a:contourClr>
-          </a:sp3d>
-        </p:spPr>
-        <p:txBody>
-          <a:bodyPr wrap="square" rtlCol="0">
-            <a:spAutoFit/>
-          </a:bodyPr>
-          <a:lstStyle/>
-          <a:p>
-            <a:pPr algn="ctr"/>
-            <a:r>
-              <a:rPr lang="fr-FR" sz="3600" b="1" dirty="0">
-                <a:latin typeface="Eras Medium ITC" panose="020B0602030504020804" pitchFamily="34" charset="0"/>
-              </a:rPr>
-              <a:t>Schéma du </a:t>
-            </a:r>
-            <a:r>
-              <a:rPr lang="fr-FR" sz="3600" b="1" dirty="0">
-                <a:solidFill>
-                  <a:srgbClr val="A41258"/>
-                </a:solidFill>
-                <a:latin typeface="Eras Medium ITC" panose="020B0602030504020804" pitchFamily="34" charset="0"/>
-              </a:rPr>
-              <a:t>réseau</a:t>
-            </a:r>
-            <a:r>
-              <a:rPr lang="fr-FR" sz="3600" b="1" dirty="0">
-                <a:latin typeface="Eras Medium ITC" panose="020B0602030504020804" pitchFamily="34" charset="0"/>
-              </a:rPr>
-              <a:t> :</a:t>
-            </a:r>
-            <a:endParaRPr lang="fr-FR" sz="3200" b="1" dirty="0">
-              <a:latin typeface="Eras Medium ITC" panose="020B0602030504020804" pitchFamily="34" charset="0"/>
-            </a:endParaRPr>
-          </a:p>
-        </p:txBody>
-      </p:sp>
-      <p:pic>
-        <p:nvPicPr>
-          <p:cNvPr id="2" name="Image 1">
-            <a:extLst>
-              <a:ext uri="{FF2B5EF4-FFF2-40B4-BE49-F238E27FC236}">
-                <a16:creationId xmlns:a16="http://schemas.microsoft.com/office/drawing/2014/main" id="{10D031A8-0679-4012-BA3F-648C05FE51E2}"/>
-              </a:ext>
-            </a:extLst>
-          </p:cNvPr>
-          <p:cNvPicPr>
-            <a:picLocks noChangeAspect="1"/>
-          </p:cNvPicPr>
-          <p:nvPr/>
-        </p:nvPicPr>
-        <p:blipFill>
-          <a:blip r:embed="rId3"/>
-          <a:stretch>
-            <a:fillRect/>
-          </a:stretch>
-        </p:blipFill>
-        <p:spPr>
-          <a:xfrm>
-            <a:off x="439776" y="1285754"/>
-            <a:ext cx="8697087" cy="5105173"/>
-          </a:xfrm>
-          <a:prstGeom prst="rect">
-            <a:avLst/>
-          </a:prstGeom>
-        </p:spPr>
-      </p:pic>
-    </p:spTree>
-    <p:extLst>
-      <p:ext uri="{BB962C8B-B14F-4D97-AF65-F5344CB8AC3E}">
-        <p14:creationId xmlns:p14="http://schemas.microsoft.com/office/powerpoint/2010/main" val="4044395586"/>
-      </p:ext>
-    </p:extLst>
-  </p:cSld>
-  <p:clrMapOvr>
-    <a:masterClrMapping/>
-  </p:clrMapOvr>
-  <mc:AlternateContent xmlns:mc="http://schemas.openxmlformats.org/markup-compatibility/2006" xmlns:p159="http://schemas.microsoft.com/office/powerpoint/2015/09/main">
-    <mc:Choice Requires="p159">
-      <p:transition xmlns:p14="http://schemas.microsoft.com/office/powerpoint/2010/main" spd="slow" p14:dur="2000">
-        <p159:morph option="byObject"/>
-      </p:transition>
-    </mc:Choice>
-    <mc:Fallback xmlns="">
-      <p:transition spd="slow">
-        <p:fade/>
-      </p:transition>
-    </mc:Fallback>
-  </mc:AlternateContent>
 </p:sld>
 </file>
 
@@ -13983,6 +13987,209 @@
           <a:chExt cx="0" cy="0"/>
         </a:xfrm>
       </p:grpSpPr>
+      <p:pic>
+        <p:nvPicPr>
+          <p:cNvPr id="1026" name="Picture 2" descr="Image associée">
+            <a:extLst>
+              <a:ext uri="{FF2B5EF4-FFF2-40B4-BE49-F238E27FC236}">
+                <a16:creationId xmlns:a16="http://schemas.microsoft.com/office/drawing/2014/main" id="{C816F3D8-CC4C-46B3-A21E-58AE9AD30454}"/>
+              </a:ext>
+            </a:extLst>
+          </p:cNvPr>
+          <p:cNvPicPr>
+            <a:picLocks noChangeAspect="1" noChangeArrowheads="1"/>
+          </p:cNvPicPr>
+          <p:nvPr/>
+        </p:nvPicPr>
+        <p:blipFill rotWithShape="1">
+          <a:blip r:embed="rId2">
+            <a:extLst>
+              <a:ext uri="{28A0092B-C50C-407E-A947-70E740481C1C}">
+                <a14:useLocalDpi xmlns:a14="http://schemas.microsoft.com/office/drawing/2010/main" val="0"/>
+              </a:ext>
+            </a:extLst>
+          </a:blip>
+          <a:srcRect l="18677" r="15441"/>
+          <a:stretch/>
+        </p:blipFill>
+        <p:spPr bwMode="auto">
+          <a:xfrm>
+            <a:off x="143436" y="143435"/>
+            <a:ext cx="2269635" cy="609600"/>
+          </a:xfrm>
+          <a:prstGeom prst="rect">
+            <a:avLst/>
+          </a:prstGeom>
+          <a:noFill/>
+          <a:extLst>
+            <a:ext uri="{909E8E84-426E-40DD-AFC4-6F175D3DCCD1}">
+              <a14:hiddenFill xmlns:a14="http://schemas.microsoft.com/office/drawing/2010/main">
+                <a:solidFill>
+                  <a:srgbClr val="FFFFFF"/>
+                </a:solidFill>
+              </a14:hiddenFill>
+            </a:ext>
+          </a:extLst>
+        </p:spPr>
+      </p:pic>
+      <p:sp>
+        <p:nvSpPr>
+          <p:cNvPr id="3" name="ZoneTexte 2">
+            <a:extLst>
+              <a:ext uri="{FF2B5EF4-FFF2-40B4-BE49-F238E27FC236}">
+                <a16:creationId xmlns:a16="http://schemas.microsoft.com/office/drawing/2014/main" id="{B5DA24B5-6993-45AE-B83E-5BA1E69FACD0}"/>
+              </a:ext>
+            </a:extLst>
+          </p:cNvPr>
+          <p:cNvSpPr txBox="1"/>
+          <p:nvPr/>
+        </p:nvSpPr>
+        <p:spPr>
+          <a:xfrm>
+            <a:off x="2816352" y="143435"/>
+            <a:ext cx="5342576" cy="646331"/>
+          </a:xfrm>
+          <a:prstGeom prst="rect">
+            <a:avLst/>
+          </a:prstGeom>
+          <a:noFill/>
+          <a:ln>
+            <a:noFill/>
+          </a:ln>
+          <a:effectLst>
+            <a:glow rad="63500">
+              <a:schemeClr val="accent4">
+                <a:satMod val="175000"/>
+                <a:alpha val="40000"/>
+              </a:schemeClr>
+            </a:glow>
+            <a:outerShdw blurRad="50800" dist="38100" dir="5400000" algn="t" rotWithShape="0">
+              <a:prstClr val="black">
+                <a:alpha val="40000"/>
+              </a:prstClr>
+            </a:outerShdw>
+          </a:effectLst>
+          <a:scene3d>
+            <a:camera prst="orthographicFront">
+              <a:rot lat="0" lon="0" rev="0"/>
+            </a:camera>
+            <a:lightRig rig="soft" dir="t">
+              <a:rot lat="0" lon="0" rev="0"/>
+            </a:lightRig>
+          </a:scene3d>
+          <a:sp3d contourW="44450" prstMaterial="matte">
+            <a:bevelT w="63500" h="63500" prst="artDeco"/>
+            <a:contourClr>
+              <a:srgbClr val="FFFFFF"/>
+            </a:contourClr>
+          </a:sp3d>
+        </p:spPr>
+        <p:txBody>
+          <a:bodyPr wrap="square" rtlCol="0">
+            <a:spAutoFit/>
+          </a:bodyPr>
+          <a:lstStyle/>
+          <a:p>
+            <a:pPr algn="ctr"/>
+            <a:r>
+              <a:rPr lang="fr-FR" sz="3600" b="1" dirty="0">
+                <a:latin typeface="Eras Medium ITC" panose="020B0602030504020804" pitchFamily="34" charset="0"/>
+              </a:rPr>
+              <a:t>Schéma du </a:t>
+            </a:r>
+            <a:r>
+              <a:rPr lang="fr-FR" sz="3600" b="1" dirty="0">
+                <a:solidFill>
+                  <a:srgbClr val="A41258"/>
+                </a:solidFill>
+                <a:latin typeface="Eras Medium ITC" panose="020B0602030504020804" pitchFamily="34" charset="0"/>
+              </a:rPr>
+              <a:t>réseau</a:t>
+            </a:r>
+            <a:r>
+              <a:rPr lang="fr-FR" sz="3600" b="1" dirty="0">
+                <a:latin typeface="Eras Medium ITC" panose="020B0602030504020804" pitchFamily="34" charset="0"/>
+              </a:rPr>
+              <a:t> :</a:t>
+            </a:r>
+            <a:endParaRPr lang="fr-FR" sz="3200" b="1" dirty="0">
+              <a:latin typeface="Eras Medium ITC" panose="020B0602030504020804" pitchFamily="34" charset="0"/>
+            </a:endParaRPr>
+          </a:p>
+        </p:txBody>
+      </p:sp>
+      <p:pic>
+        <p:nvPicPr>
+          <p:cNvPr id="2" name="Image 1">
+            <a:extLst>
+              <a:ext uri="{FF2B5EF4-FFF2-40B4-BE49-F238E27FC236}">
+                <a16:creationId xmlns:a16="http://schemas.microsoft.com/office/drawing/2014/main" id="{10D031A8-0679-4012-BA3F-648C05FE51E2}"/>
+              </a:ext>
+            </a:extLst>
+          </p:cNvPr>
+          <p:cNvPicPr>
+            <a:picLocks noChangeAspect="1"/>
+          </p:cNvPicPr>
+          <p:nvPr/>
+        </p:nvPicPr>
+        <p:blipFill>
+          <a:blip r:embed="rId3"/>
+          <a:stretch>
+            <a:fillRect/>
+          </a:stretch>
+        </p:blipFill>
+        <p:spPr>
+          <a:xfrm>
+            <a:off x="439776" y="1285754"/>
+            <a:ext cx="8697087" cy="5105173"/>
+          </a:xfrm>
+          <a:prstGeom prst="rect">
+            <a:avLst/>
+          </a:prstGeom>
+        </p:spPr>
+      </p:pic>
+    </p:spTree>
+    <p:extLst>
+      <p:ext uri="{BB962C8B-B14F-4D97-AF65-F5344CB8AC3E}">
+        <p14:creationId xmlns:p14="http://schemas.microsoft.com/office/powerpoint/2010/main" val="4044395586"/>
+      </p:ext>
+    </p:extLst>
+  </p:cSld>
+  <p:clrMapOvr>
+    <a:masterClrMapping/>
+  </p:clrMapOvr>
+  <mc:AlternateContent xmlns:mc="http://schemas.openxmlformats.org/markup-compatibility/2006" xmlns:p159="http://schemas.microsoft.com/office/powerpoint/2015/09/main">
+    <mc:Choice Requires="p159">
+      <p:transition xmlns:p14="http://schemas.microsoft.com/office/powerpoint/2010/main" spd="slow" p14:dur="2000">
+        <p159:morph option="byObject"/>
+      </p:transition>
+    </mc:Choice>
+    <mc:Fallback xmlns="">
+      <p:transition spd="slow">
+        <p:fade/>
+      </p:transition>
+    </mc:Fallback>
+  </mc:AlternateContent>
+</p:sld>
+</file>
+
+<file path=ppt/slides/slide7.xml><?xml version="1.0" encoding="utf-8"?>
+<p:sld xmlns:a="http://schemas.openxmlformats.org/drawingml/2006/main" xmlns:r="http://schemas.openxmlformats.org/officeDocument/2006/relationships" xmlns:p="http://schemas.openxmlformats.org/presentationml/2006/main">
+  <p:cSld>
+    <p:spTree>
+      <p:nvGrpSpPr>
+        <p:cNvPr id="1" name=""/>
+        <p:cNvGrpSpPr/>
+        <p:nvPr/>
+      </p:nvGrpSpPr>
+      <p:grpSpPr>
+        <a:xfrm>
+          <a:off x="0" y="0"/>
+          <a:ext cx="0" cy="0"/>
+          <a:chOff x="0" y="0"/>
+          <a:chExt cx="0" cy="0"/>
+        </a:xfrm>
+      </p:grpSpPr>
       <p:sp>
         <p:nvSpPr>
           <p:cNvPr id="4" name="ZoneTexte 3">
@@ -14242,7 +14449,7 @@
 </p:sld>
 </file>
 
-<file path=ppt/slides/slide7.xml><?xml version="1.0" encoding="utf-8"?>
+<file path=ppt/slides/slide8.xml><?xml version="1.0" encoding="utf-8"?>
 <p:sld xmlns:a="http://schemas.openxmlformats.org/drawingml/2006/main" xmlns:r="http://schemas.openxmlformats.org/officeDocument/2006/relationships" xmlns:p="http://schemas.openxmlformats.org/presentationml/2006/main">
   <p:cSld>
     <p:spTree>
@@ -14442,7 +14649,7 @@
 </p:sld>
 </file>
 
-<file path=ppt/slides/slide8.xml><?xml version="1.0" encoding="utf-8"?>
+<file path=ppt/slides/slide9.xml><?xml version="1.0" encoding="utf-8"?>
 <p:sld xmlns:a="http://schemas.openxmlformats.org/drawingml/2006/main" xmlns:r="http://schemas.openxmlformats.org/officeDocument/2006/relationships" xmlns:p="http://schemas.openxmlformats.org/presentationml/2006/main">
   <p:cSld>
     <p:spTree>
@@ -14630,213 +14837,6 @@
     <p:extLst>
       <p:ext uri="{BB962C8B-B14F-4D97-AF65-F5344CB8AC3E}">
         <p14:creationId xmlns:p14="http://schemas.microsoft.com/office/powerpoint/2010/main" val="2860333650"/>
-      </p:ext>
-    </p:extLst>
-  </p:cSld>
-  <p:clrMapOvr>
-    <a:masterClrMapping/>
-  </p:clrMapOvr>
-</p:sld>
-</file>
-
-<file path=ppt/slides/slide9.xml><?xml version="1.0" encoding="utf-8"?>
-<p:sld xmlns:a="http://schemas.openxmlformats.org/drawingml/2006/main" xmlns:r="http://schemas.openxmlformats.org/officeDocument/2006/relationships" xmlns:p="http://schemas.openxmlformats.org/presentationml/2006/main">
-  <p:cSld>
-    <p:spTree>
-      <p:nvGrpSpPr>
-        <p:cNvPr id="1" name=""/>
-        <p:cNvGrpSpPr/>
-        <p:nvPr/>
-      </p:nvGrpSpPr>
-      <p:grpSpPr>
-        <a:xfrm>
-          <a:off x="0" y="0"/>
-          <a:ext cx="0" cy="0"/>
-          <a:chOff x="0" y="0"/>
-          <a:chExt cx="0" cy="0"/>
-        </a:xfrm>
-      </p:grpSpPr>
-      <p:sp>
-        <p:nvSpPr>
-          <p:cNvPr id="4" name="ZoneTexte 3">
-            <a:extLst>
-              <a:ext uri="{FF2B5EF4-FFF2-40B4-BE49-F238E27FC236}">
-                <a16:creationId xmlns:a16="http://schemas.microsoft.com/office/drawing/2014/main" id="{B996E070-5299-461D-9259-6BD38B8072A0}"/>
-              </a:ext>
-            </a:extLst>
-          </p:cNvPr>
-          <p:cNvSpPr txBox="1"/>
-          <p:nvPr/>
-        </p:nvSpPr>
-        <p:spPr>
-          <a:xfrm>
-            <a:off x="3323065" y="103221"/>
-            <a:ext cx="5698272" cy="1138773"/>
-          </a:xfrm>
-          <a:prstGeom prst="rect">
-            <a:avLst/>
-          </a:prstGeom>
-          <a:noFill/>
-          <a:ln>
-            <a:noFill/>
-          </a:ln>
-          <a:effectLst>
-            <a:glow rad="63500">
-              <a:schemeClr val="accent4">
-                <a:satMod val="175000"/>
-                <a:alpha val="40000"/>
-              </a:schemeClr>
-            </a:glow>
-            <a:outerShdw blurRad="50800" dist="38100" dir="5400000" algn="t" rotWithShape="0">
-              <a:prstClr val="black">
-                <a:alpha val="40000"/>
-              </a:prstClr>
-            </a:outerShdw>
-          </a:effectLst>
-          <a:scene3d>
-            <a:camera prst="orthographicFront">
-              <a:rot lat="0" lon="0" rev="0"/>
-            </a:camera>
-            <a:lightRig rig="soft" dir="t">
-              <a:rot lat="0" lon="0" rev="0"/>
-            </a:lightRig>
-          </a:scene3d>
-          <a:sp3d contourW="44450" prstMaterial="matte">
-            <a:bevelT w="63500" h="63500" prst="artDeco"/>
-            <a:contourClr>
-              <a:srgbClr val="FFFFFF"/>
-            </a:contourClr>
-          </a:sp3d>
-        </p:spPr>
-        <p:txBody>
-          <a:bodyPr wrap="square" rtlCol="0">
-            <a:spAutoFit/>
-          </a:bodyPr>
-          <a:lstStyle/>
-          <a:p>
-            <a:pPr algn="ctr"/>
-            <a:r>
-              <a:rPr lang="fr-FR" sz="3600" b="1" dirty="0">
-                <a:latin typeface="Eras Medium ITC" panose="020B0602030504020804" pitchFamily="34" charset="0"/>
-              </a:rPr>
-              <a:t>Application de supervision </a:t>
-            </a:r>
-            <a:r>
-              <a:rPr lang="fr-FR" sz="2800" b="1" dirty="0" err="1">
-                <a:solidFill>
-                  <a:srgbClr val="A41258"/>
-                </a:solidFill>
-                <a:latin typeface="Eras Medium ITC" panose="020B0602030504020804" pitchFamily="34" charset="0"/>
-              </a:rPr>
-              <a:t>Supervision</a:t>
-            </a:r>
-            <a:r>
-              <a:rPr lang="fr-FR" sz="2800" b="1" dirty="0">
-                <a:solidFill>
-                  <a:srgbClr val="A41258"/>
-                </a:solidFill>
-                <a:latin typeface="Eras Medium ITC" panose="020B0602030504020804" pitchFamily="34" charset="0"/>
-              </a:rPr>
-              <a:t> </a:t>
-            </a:r>
-            <a:r>
-              <a:rPr lang="fr-FR" sz="3200" b="1" dirty="0">
-                <a:latin typeface="Eras Medium ITC" panose="020B0602030504020804" pitchFamily="34" charset="0"/>
-              </a:rPr>
-              <a:t>:</a:t>
-            </a:r>
-          </a:p>
-        </p:txBody>
-      </p:sp>
-      <p:pic>
-        <p:nvPicPr>
-          <p:cNvPr id="5" name="Picture 2" descr="Image associée">
-            <a:extLst>
-              <a:ext uri="{FF2B5EF4-FFF2-40B4-BE49-F238E27FC236}">
-                <a16:creationId xmlns:a16="http://schemas.microsoft.com/office/drawing/2014/main" id="{42980D13-27EB-407A-A911-1179305F49FC}"/>
-              </a:ext>
-            </a:extLst>
-          </p:cNvPr>
-          <p:cNvPicPr>
-            <a:picLocks noChangeAspect="1" noChangeArrowheads="1"/>
-          </p:cNvPicPr>
-          <p:nvPr/>
-        </p:nvPicPr>
-        <p:blipFill rotWithShape="1">
-          <a:blip r:embed="rId2">
-            <a:extLst>
-              <a:ext uri="{28A0092B-C50C-407E-A947-70E740481C1C}">
-                <a14:useLocalDpi xmlns:a14="http://schemas.microsoft.com/office/drawing/2010/main" val="0"/>
-              </a:ext>
-            </a:extLst>
-          </a:blip>
-          <a:srcRect l="18677" r="15441"/>
-          <a:stretch/>
-        </p:blipFill>
-        <p:spPr bwMode="auto">
-          <a:xfrm>
-            <a:off x="143436" y="143435"/>
-            <a:ext cx="2269635" cy="609600"/>
-          </a:xfrm>
-          <a:prstGeom prst="rect">
-            <a:avLst/>
-          </a:prstGeom>
-          <a:noFill/>
-          <a:extLst>
-            <a:ext uri="{909E8E84-426E-40DD-AFC4-6F175D3DCCD1}">
-              <a14:hiddenFill xmlns:a14="http://schemas.microsoft.com/office/drawing/2010/main">
-                <a:solidFill>
-                  <a:srgbClr val="FFFFFF"/>
-                </a:solidFill>
-              </a14:hiddenFill>
-            </a:ext>
-          </a:extLst>
-        </p:spPr>
-      </p:pic>
-      <p:pic>
-        <p:nvPicPr>
-          <p:cNvPr id="2" name="Image 1">
-            <a:extLst>
-              <a:ext uri="{FF2B5EF4-FFF2-40B4-BE49-F238E27FC236}">
-                <a16:creationId xmlns:a16="http://schemas.microsoft.com/office/drawing/2014/main" id="{66C1DE2A-C142-4ED2-9E13-DCFA37058D76}"/>
-              </a:ext>
-            </a:extLst>
-          </p:cNvPr>
-          <p:cNvPicPr>
-            <a:picLocks noChangeAspect="1"/>
-          </p:cNvPicPr>
-          <p:nvPr/>
-        </p:nvPicPr>
-        <p:blipFill>
-          <a:blip r:embed="rId3"/>
-          <a:stretch>
-            <a:fillRect/>
-          </a:stretch>
-        </p:blipFill>
-        <p:spPr>
-          <a:xfrm>
-            <a:off x="813034" y="1241994"/>
-            <a:ext cx="7722875" cy="5111496"/>
-          </a:xfrm>
-          <a:prstGeom prst="rect">
-            <a:avLst/>
-          </a:prstGeom>
-          <a:ln>
-            <a:noFill/>
-          </a:ln>
-          <a:effectLst>
-            <a:outerShdw blurRad="292100" dist="139700" dir="2700000" algn="tl" rotWithShape="0">
-              <a:srgbClr val="333333">
-                <a:alpha val="65000"/>
-              </a:srgbClr>
-            </a:outerShdw>
-          </a:effectLst>
-        </p:spPr>
-      </p:pic>
-    </p:spTree>
-    <p:extLst>
-      <p:ext uri="{BB962C8B-B14F-4D97-AF65-F5344CB8AC3E}">
-        <p14:creationId xmlns:p14="http://schemas.microsoft.com/office/powerpoint/2010/main" val="428774615"/>
       </p:ext>
     </p:extLst>
   </p:cSld>

</xml_diff>

<commit_message>
MAJ du diagramme de Classes. MAJ du diaporama de revue 2. Hierarchisation de mes repertoires personnels.
</commit_message>
<xml_diff>
--- a/Nathan/Compte-rendus/REVUE-R2-GUIGAND-SFL6.pptx
+++ b/Nathan/Compte-rendus/REVUE-R2-GUIGAND-SFL6.pptx
@@ -3973,7 +3973,7 @@
             <a:fld id="{B61BEF0D-F0BB-DE4B-95CE-6DB70DBA9567}" type="datetimeFigureOut">
               <a:rPr lang="en-US" dirty="0"/>
               <a:pPr/>
-              <a:t>3/6/2020</a:t>
+              <a:t>3/10/2020</a:t>
             </a:fld>
             <a:endParaRPr lang="en-US" dirty="0"/>
           </a:p>
@@ -4221,7 +4221,7 @@
             <a:fld id="{B61BEF0D-F0BB-DE4B-95CE-6DB70DBA9567}" type="datetimeFigureOut">
               <a:rPr lang="en-US" dirty="0"/>
               <a:pPr/>
-              <a:t>3/6/2020</a:t>
+              <a:t>3/10/2020</a:t>
             </a:fld>
             <a:endParaRPr lang="en-US" dirty="0"/>
           </a:p>
@@ -4532,7 +4532,7 @@
             <a:fld id="{B61BEF0D-F0BB-DE4B-95CE-6DB70DBA9567}" type="datetimeFigureOut">
               <a:rPr lang="en-US" dirty="0"/>
               <a:pPr/>
-              <a:t>3/6/2020</a:t>
+              <a:t>3/10/2020</a:t>
             </a:fld>
             <a:endParaRPr lang="en-US" dirty="0"/>
           </a:p>
@@ -4870,7 +4870,7 @@
             <a:fld id="{B61BEF0D-F0BB-DE4B-95CE-6DB70DBA9567}" type="datetimeFigureOut">
               <a:rPr lang="en-US" dirty="0"/>
               <a:pPr/>
-              <a:t>3/6/2020</a:t>
+              <a:t>3/10/2020</a:t>
             </a:fld>
             <a:endParaRPr lang="en-US" dirty="0"/>
           </a:p>
@@ -5181,7 +5181,7 @@
             <a:fld id="{B61BEF0D-F0BB-DE4B-95CE-6DB70DBA9567}" type="datetimeFigureOut">
               <a:rPr lang="en-US" dirty="0"/>
               <a:pPr/>
-              <a:t>3/6/2020</a:t>
+              <a:t>3/10/2020</a:t>
             </a:fld>
             <a:endParaRPr lang="en-US" dirty="0"/>
           </a:p>
@@ -5571,7 +5571,7 @@
             <a:fld id="{B61BEF0D-F0BB-DE4B-95CE-6DB70DBA9567}" type="datetimeFigureOut">
               <a:rPr lang="en-US" dirty="0"/>
               <a:pPr/>
-              <a:t>3/6/2020</a:t>
+              <a:t>3/10/2020</a:t>
             </a:fld>
             <a:endParaRPr lang="en-US" dirty="0"/>
           </a:p>
@@ -5737,7 +5737,7 @@
           <a:p>
             <a:fld id="{55C6B4A9-1611-4792-9094-5F34BCA07E0B}" type="datetimeFigureOut">
               <a:rPr lang="en-US" dirty="0"/>
-              <a:t>3/6/2020</a:t>
+              <a:t>3/10/2020</a:t>
             </a:fld>
             <a:endParaRPr lang="en-US" dirty="0"/>
           </a:p>
@@ -5913,7 +5913,7 @@
             <a:fld id="{B61BEF0D-F0BB-DE4B-95CE-6DB70DBA9567}" type="datetimeFigureOut">
               <a:rPr lang="en-US" dirty="0"/>
               <a:pPr/>
-              <a:t>3/6/2020</a:t>
+              <a:t>3/10/2020</a:t>
             </a:fld>
             <a:endParaRPr lang="en-US" dirty="0"/>
           </a:p>
@@ -6086,7 +6086,7 @@
             <a:fld id="{B61BEF0D-F0BB-DE4B-95CE-6DB70DBA9567}" type="datetimeFigureOut">
               <a:rPr lang="en-US" dirty="0"/>
               <a:pPr/>
-              <a:t>3/6/2020</a:t>
+              <a:t>3/10/2020</a:t>
             </a:fld>
             <a:endParaRPr lang="en-US" dirty="0"/>
           </a:p>
@@ -6330,7 +6330,7 @@
             <a:fld id="{B61BEF0D-F0BB-DE4B-95CE-6DB70DBA9567}" type="datetimeFigureOut">
               <a:rPr lang="en-US" dirty="0"/>
               <a:pPr/>
-              <a:t>3/6/2020</a:t>
+              <a:t>3/10/2020</a:t>
             </a:fld>
             <a:endParaRPr lang="en-US" dirty="0"/>
           </a:p>
@@ -6558,7 +6558,7 @@
           <a:p>
             <a:fld id="{EB712588-04B1-427B-82EE-E8DB90309F08}" type="datetimeFigureOut">
               <a:rPr lang="en-US" dirty="0"/>
-              <a:t>3/6/2020</a:t>
+              <a:t>3/10/2020</a:t>
             </a:fld>
             <a:endParaRPr lang="en-US" dirty="0"/>
           </a:p>
@@ -6928,7 +6928,7 @@
             <a:fld id="{B61BEF0D-F0BB-DE4B-95CE-6DB70DBA9567}" type="datetimeFigureOut">
               <a:rPr lang="en-US" dirty="0"/>
               <a:pPr/>
-              <a:t>3/6/2020</a:t>
+              <a:t>3/10/2020</a:t>
             </a:fld>
             <a:endParaRPr lang="en-US" dirty="0"/>
           </a:p>
@@ -7048,7 +7048,7 @@
             <a:fld id="{B61BEF0D-F0BB-DE4B-95CE-6DB70DBA9567}" type="datetimeFigureOut">
               <a:rPr lang="en-US" dirty="0"/>
               <a:pPr/>
-              <a:t>3/6/2020</a:t>
+              <a:t>3/10/2020</a:t>
             </a:fld>
             <a:endParaRPr lang="en-US" dirty="0"/>
           </a:p>
@@ -7140,7 +7140,7 @@
             <a:fld id="{B61BEF0D-F0BB-DE4B-95CE-6DB70DBA9567}" type="datetimeFigureOut">
               <a:rPr lang="en-US" dirty="0"/>
               <a:pPr/>
-              <a:t>3/6/2020</a:t>
+              <a:t>3/10/2020</a:t>
             </a:fld>
             <a:endParaRPr lang="en-US" dirty="0"/>
           </a:p>
@@ -7391,7 +7391,7 @@
           <a:p>
             <a:fld id="{42A54C80-263E-416B-A8E0-580EDEADCBDC}" type="datetimeFigureOut">
               <a:rPr lang="en-US" dirty="0"/>
-              <a:t>3/6/2020</a:t>
+              <a:t>3/10/2020</a:t>
             </a:fld>
             <a:endParaRPr lang="en-US" dirty="0"/>
           </a:p>
@@ -7650,7 +7650,7 @@
             <a:fld id="{B61BEF0D-F0BB-DE4B-95CE-6DB70DBA9567}" type="datetimeFigureOut">
               <a:rPr lang="en-US" dirty="0"/>
               <a:pPr/>
-              <a:t>3/6/2020</a:t>
+              <a:t>3/10/2020</a:t>
             </a:fld>
             <a:endParaRPr lang="en-US" dirty="0"/>
           </a:p>
@@ -8390,7 +8390,7 @@
             <a:fld id="{B61BEF0D-F0BB-DE4B-95CE-6DB70DBA9567}" type="datetimeFigureOut">
               <a:rPr lang="en-US" dirty="0"/>
               <a:pPr/>
-              <a:t>3/6/2020</a:t>
+              <a:t>3/10/2020</a:t>
             </a:fld>
             <a:endParaRPr lang="en-US" dirty="0"/>
           </a:p>
@@ -10117,22 +10117,13 @@
               <a:t>Application de supervision </a:t>
             </a:r>
             <a:r>
-              <a:rPr lang="fr-FR" sz="2800" b="1" dirty="0" err="1">
-                <a:solidFill>
-                  <a:srgbClr val="A41258"/>
-                </a:solidFill>
-                <a:latin typeface="Eras Medium ITC" panose="020B0602030504020804" pitchFamily="34" charset="0"/>
-              </a:rPr>
-              <a:t>Supervision</a:t>
-            </a:r>
-            <a:r>
               <a:rPr lang="fr-FR" sz="2800" b="1" dirty="0">
                 <a:solidFill>
                   <a:srgbClr val="A41258"/>
                 </a:solidFill>
                 <a:latin typeface="Eras Medium ITC" panose="020B0602030504020804" pitchFamily="34" charset="0"/>
               </a:rPr>
-              <a:t> </a:t>
+              <a:t>Supervision </a:t>
             </a:r>
             <a:r>
               <a:rPr lang="fr-FR" sz="3200" b="1" dirty="0">

</xml_diff>

<commit_message>
Modification du diagramme de Gantt et mise à jour de cette partie dans le diaporama de revue 2.
</commit_message>
<xml_diff>
--- a/Nathan/Compte-rendus/REVUE-R2-GUIGAND-SFL6.pptx
+++ b/Nathan/Compte-rendus/REVUE-R2-GUIGAND-SFL6.pptx
@@ -10976,8 +10976,8 @@
         </p:blipFill>
         <p:spPr bwMode="auto">
           <a:xfrm>
-            <a:off x="143436" y="143435"/>
-            <a:ext cx="2269635" cy="609600"/>
+            <a:off x="64008" y="0"/>
+            <a:ext cx="2019309" cy="542365"/>
           </a:xfrm>
           <a:prstGeom prst="rect">
             <a:avLst/>
@@ -11008,8 +11008,8 @@
         </p:nvSpPr>
         <p:spPr>
           <a:xfrm>
-            <a:off x="0" y="2693239"/>
-            <a:ext cx="3242435" cy="646331"/>
+            <a:off x="0" y="2474893"/>
+            <a:ext cx="1810512" cy="954107"/>
           </a:xfrm>
           <a:prstGeom prst="rect">
             <a:avLst/>
@@ -11099,7 +11099,7 @@
         </p:blipFill>
         <p:spPr>
           <a:xfrm>
-            <a:off x="2413071" y="71717"/>
+            <a:off x="2019309" y="143435"/>
             <a:ext cx="8536272" cy="6714565"/>
           </a:xfrm>
           <a:prstGeom prst="rect">
@@ -11717,10 +11717,10 @@
       </p:sp>
       <p:pic>
         <p:nvPicPr>
-          <p:cNvPr id="4" name="Image 3">
+          <p:cNvPr id="2" name="Image 1">
             <a:extLst>
               <a:ext uri="{FF2B5EF4-FFF2-40B4-BE49-F238E27FC236}">
-                <a16:creationId xmlns:a16="http://schemas.microsoft.com/office/drawing/2014/main" id="{62B69717-E633-4EC8-B3A1-6EC9DF2156A9}"/>
+                <a16:creationId xmlns:a16="http://schemas.microsoft.com/office/drawing/2014/main" id="{C6C9B6DA-3D2F-44E1-8F81-AEBD94181678}"/>
               </a:ext>
             </a:extLst>
           </p:cNvPr>
@@ -11737,8 +11737,8 @@
         </p:blipFill>
         <p:spPr>
           <a:xfrm>
-            <a:off x="107048" y="802102"/>
-            <a:ext cx="9539303" cy="5912463"/>
+            <a:off x="111708" y="780109"/>
+            <a:ext cx="9214227" cy="5934456"/>
           </a:xfrm>
           <a:prstGeom prst="rect">
             <a:avLst/>
@@ -12529,8 +12529,8 @@
         </p:nvSpPr>
         <p:spPr>
           <a:xfrm>
-            <a:off x="385590" y="4146550"/>
-            <a:ext cx="3354560" cy="2457450"/>
+            <a:off x="383939" y="4135684"/>
+            <a:ext cx="3354560" cy="2523598"/>
           </a:xfrm>
           <a:prstGeom prst="rect">
             <a:avLst/>

</xml_diff>

<commit_message>
MAJ Diapo de revue 2. Maj diagrammes de séquences et de classes.
</commit_message>
<xml_diff>
--- a/Nathan/Compte-rendus/REVUE-R2-GUIGAND-SFL6.pptx
+++ b/Nathan/Compte-rendus/REVUE-R2-GUIGAND-SFL6.pptx
@@ -11317,6 +11317,18 @@
   <p:clrMapOvr>
     <a:masterClrMapping/>
   </p:clrMapOvr>
+  <mc:AlternateContent xmlns:mc="http://schemas.openxmlformats.org/markup-compatibility/2006">
+    <mc:Choice xmlns:p159="http://schemas.microsoft.com/office/powerpoint/2015/09/main" Requires="p159">
+      <p:transition xmlns:p14="http://schemas.microsoft.com/office/powerpoint/2010/main" spd="slow" p14:dur="2000">
+        <p159:morph option="byObject"/>
+      </p:transition>
+    </mc:Choice>
+    <mc:Fallback>
+      <p:transition spd="slow">
+        <p:fade/>
+      </p:transition>
+    </mc:Fallback>
+  </mc:AlternateContent>
 </p:sld>
 </file>
 

</xml_diff>

<commit_message>
Finalisation du diaporama de revue 2.
</commit_message>
<xml_diff>
--- a/Nathan/Compte-rendus/REVUE-R2-GUIGAND-SFL6.pptx
+++ b/Nathan/Compte-rendus/REVUE-R2-GUIGAND-SFL6.pptx
@@ -12098,13 +12098,13 @@
   <p:clrMapOvr>
     <a:masterClrMapping/>
   </p:clrMapOvr>
-  <mc:AlternateContent xmlns:mc="http://schemas.openxmlformats.org/markup-compatibility/2006">
-    <mc:Choice xmlns:p159="http://schemas.microsoft.com/office/powerpoint/2015/09/main" Requires="p159">
+  <mc:AlternateContent xmlns:mc="http://schemas.openxmlformats.org/markup-compatibility/2006" xmlns:p159="http://schemas.microsoft.com/office/powerpoint/2015/09/main">
+    <mc:Choice Requires="p159">
       <p:transition xmlns:p14="http://schemas.microsoft.com/office/powerpoint/2010/main" spd="slow" p14:dur="2000">
         <p159:morph option="byObject"/>
       </p:transition>
     </mc:Choice>
-    <mc:Fallback>
+    <mc:Fallback xmlns="">
       <p:transition spd="slow">
         <p:fade/>
       </p:transition>
@@ -14216,13 +14216,13 @@
   <p:clrMapOvr>
     <a:masterClrMapping/>
   </p:clrMapOvr>
-  <mc:AlternateContent xmlns:mc="http://schemas.openxmlformats.org/markup-compatibility/2006">
-    <mc:Choice xmlns:p159="http://schemas.microsoft.com/office/powerpoint/2015/09/main" Requires="p159">
+  <mc:AlternateContent xmlns:mc="http://schemas.openxmlformats.org/markup-compatibility/2006" xmlns:p159="http://schemas.microsoft.com/office/powerpoint/2015/09/main">
+    <mc:Choice Requires="p159">
       <p:transition xmlns:p14="http://schemas.microsoft.com/office/powerpoint/2010/main" spd="slow" p14:dur="2000">
         <p159:morph option="byObject"/>
       </p:transition>
     </mc:Choice>
-    <mc:Fallback>
+    <mc:Fallback xmlns="">
       <p:transition spd="slow">
         <p:fade/>
       </p:transition>
@@ -30823,10 +30823,552 @@
       </p:sp>
       <p:sp>
         <p:nvSpPr>
-          <p:cNvPr id="2" name="ZoneTexte 1">
-            <a:extLst>
-              <a:ext uri="{FF2B5EF4-FFF2-40B4-BE49-F238E27FC236}">
-                <a16:creationId xmlns:a16="http://schemas.microsoft.com/office/drawing/2014/main" id="{FB1E84CE-9DB5-4FA0-BDF7-9F51DDB210EA}"/>
+          <p:cNvPr id="5" name="Rectangle : coins arrondis 4">
+            <a:extLst>
+              <a:ext uri="{FF2B5EF4-FFF2-40B4-BE49-F238E27FC236}">
+                <a16:creationId xmlns:a16="http://schemas.microsoft.com/office/drawing/2014/main" id="{7712986F-15D9-48D1-A16C-E324A49A43D4}"/>
+              </a:ext>
+            </a:extLst>
+          </p:cNvPr>
+          <p:cNvSpPr/>
+          <p:nvPr/>
+        </p:nvSpPr>
+        <p:spPr>
+          <a:xfrm>
+            <a:off x="504125" y="3049465"/>
+            <a:ext cx="9135542" cy="60374"/>
+          </a:xfrm>
+          <a:prstGeom prst="roundRect">
+            <a:avLst>
+              <a:gd name="adj" fmla="val 50000"/>
+            </a:avLst>
+          </a:prstGeom>
+          <a:solidFill>
+            <a:srgbClr val="A31257"/>
+          </a:solidFill>
+          <a:ln>
+            <a:solidFill>
+              <a:srgbClr val="A41258"/>
+            </a:solidFill>
+          </a:ln>
+        </p:spPr>
+        <p:style>
+          <a:lnRef idx="2">
+            <a:schemeClr val="accent1">
+              <a:shade val="50000"/>
+            </a:schemeClr>
+          </a:lnRef>
+          <a:fillRef idx="1">
+            <a:schemeClr val="accent1"/>
+          </a:fillRef>
+          <a:effectRef idx="0">
+            <a:schemeClr val="accent1"/>
+          </a:effectRef>
+          <a:fontRef idx="minor">
+            <a:schemeClr val="lt1"/>
+          </a:fontRef>
+        </p:style>
+        <p:txBody>
+          <a:bodyPr rtlCol="0" anchor="ctr"/>
+          <a:lstStyle/>
+          <a:p>
+            <a:pPr algn="ctr"/>
+            <a:endParaRPr lang="fr-FR"/>
+          </a:p>
+        </p:txBody>
+      </p:sp>
+      <p:sp>
+        <p:nvSpPr>
+          <p:cNvPr id="7" name="Ellipse 6">
+            <a:extLst>
+              <a:ext uri="{FF2B5EF4-FFF2-40B4-BE49-F238E27FC236}">
+                <a16:creationId xmlns:a16="http://schemas.microsoft.com/office/drawing/2014/main" id="{5371ADA4-FD5B-451E-A914-DB5BD5EAFA4F}"/>
+              </a:ext>
+            </a:extLst>
+          </p:cNvPr>
+          <p:cNvSpPr/>
+          <p:nvPr/>
+        </p:nvSpPr>
+        <p:spPr>
+          <a:xfrm>
+            <a:off x="215109" y="2861453"/>
+            <a:ext cx="426729" cy="436398"/>
+          </a:xfrm>
+          <a:prstGeom prst="ellipse">
+            <a:avLst/>
+          </a:prstGeom>
+          <a:solidFill>
+            <a:srgbClr val="A31257"/>
+          </a:solidFill>
+          <a:ln>
+            <a:solidFill>
+              <a:schemeClr val="bg1"/>
+            </a:solidFill>
+          </a:ln>
+        </p:spPr>
+        <p:style>
+          <a:lnRef idx="2">
+            <a:schemeClr val="accent1">
+              <a:shade val="50000"/>
+            </a:schemeClr>
+          </a:lnRef>
+          <a:fillRef idx="1">
+            <a:schemeClr val="accent1"/>
+          </a:fillRef>
+          <a:effectRef idx="0">
+            <a:schemeClr val="accent1"/>
+          </a:effectRef>
+          <a:fontRef idx="minor">
+            <a:schemeClr val="lt1"/>
+          </a:fontRef>
+        </p:style>
+        <p:txBody>
+          <a:bodyPr rtlCol="0" anchor="ctr"/>
+          <a:lstStyle/>
+          <a:p>
+            <a:pPr algn="ctr"/>
+            <a:endParaRPr lang="fr-FR" dirty="0"/>
+          </a:p>
+        </p:txBody>
+      </p:sp>
+      <p:sp>
+        <p:nvSpPr>
+          <p:cNvPr id="8" name="Ellipse 7">
+            <a:extLst>
+              <a:ext uri="{FF2B5EF4-FFF2-40B4-BE49-F238E27FC236}">
+                <a16:creationId xmlns:a16="http://schemas.microsoft.com/office/drawing/2014/main" id="{74923205-BBFF-4D38-A95E-AD9114BA1F9F}"/>
+              </a:ext>
+            </a:extLst>
+          </p:cNvPr>
+          <p:cNvSpPr/>
+          <p:nvPr/>
+        </p:nvSpPr>
+        <p:spPr>
+          <a:xfrm>
+            <a:off x="1835825" y="2861453"/>
+            <a:ext cx="426729" cy="436398"/>
+          </a:xfrm>
+          <a:prstGeom prst="ellipse">
+            <a:avLst/>
+          </a:prstGeom>
+          <a:solidFill>
+            <a:srgbClr val="A31257"/>
+          </a:solidFill>
+          <a:ln>
+            <a:solidFill>
+              <a:schemeClr val="bg1"/>
+            </a:solidFill>
+          </a:ln>
+        </p:spPr>
+        <p:style>
+          <a:lnRef idx="2">
+            <a:schemeClr val="accent1">
+              <a:shade val="50000"/>
+            </a:schemeClr>
+          </a:lnRef>
+          <a:fillRef idx="1">
+            <a:schemeClr val="accent1"/>
+          </a:fillRef>
+          <a:effectRef idx="0">
+            <a:schemeClr val="accent1"/>
+          </a:effectRef>
+          <a:fontRef idx="minor">
+            <a:schemeClr val="lt1"/>
+          </a:fontRef>
+        </p:style>
+        <p:txBody>
+          <a:bodyPr rtlCol="0" anchor="ctr"/>
+          <a:lstStyle/>
+          <a:p>
+            <a:pPr algn="ctr"/>
+            <a:endParaRPr lang="fr-FR" dirty="0"/>
+          </a:p>
+        </p:txBody>
+      </p:sp>
+      <p:sp>
+        <p:nvSpPr>
+          <p:cNvPr id="9" name="Ellipse 8">
+            <a:extLst>
+              <a:ext uri="{FF2B5EF4-FFF2-40B4-BE49-F238E27FC236}">
+                <a16:creationId xmlns:a16="http://schemas.microsoft.com/office/drawing/2014/main" id="{7A522763-6A1C-4991-AB37-E2E4CE81E2BA}"/>
+              </a:ext>
+            </a:extLst>
+          </p:cNvPr>
+          <p:cNvSpPr/>
+          <p:nvPr/>
+        </p:nvSpPr>
+        <p:spPr>
+          <a:xfrm>
+            <a:off x="2529734" y="2858815"/>
+            <a:ext cx="426729" cy="436398"/>
+          </a:xfrm>
+          <a:prstGeom prst="ellipse">
+            <a:avLst/>
+          </a:prstGeom>
+          <a:solidFill>
+            <a:srgbClr val="A31257"/>
+          </a:solidFill>
+          <a:ln>
+            <a:solidFill>
+              <a:schemeClr val="bg1"/>
+            </a:solidFill>
+          </a:ln>
+        </p:spPr>
+        <p:style>
+          <a:lnRef idx="2">
+            <a:schemeClr val="accent1">
+              <a:shade val="50000"/>
+            </a:schemeClr>
+          </a:lnRef>
+          <a:fillRef idx="1">
+            <a:schemeClr val="accent1"/>
+          </a:fillRef>
+          <a:effectRef idx="0">
+            <a:schemeClr val="accent1"/>
+          </a:effectRef>
+          <a:fontRef idx="minor">
+            <a:schemeClr val="lt1"/>
+          </a:fontRef>
+        </p:style>
+        <p:txBody>
+          <a:bodyPr rtlCol="0" anchor="ctr"/>
+          <a:lstStyle/>
+          <a:p>
+            <a:pPr algn="ctr"/>
+            <a:endParaRPr lang="fr-FR" dirty="0"/>
+          </a:p>
+        </p:txBody>
+      </p:sp>
+      <p:sp>
+        <p:nvSpPr>
+          <p:cNvPr id="10" name="Ellipse 9">
+            <a:extLst>
+              <a:ext uri="{FF2B5EF4-FFF2-40B4-BE49-F238E27FC236}">
+                <a16:creationId xmlns:a16="http://schemas.microsoft.com/office/drawing/2014/main" id="{1330B624-F568-461E-AC74-64E614A717EC}"/>
+              </a:ext>
+            </a:extLst>
+          </p:cNvPr>
+          <p:cNvSpPr/>
+          <p:nvPr/>
+        </p:nvSpPr>
+        <p:spPr>
+          <a:xfrm>
+            <a:off x="3284878" y="2858815"/>
+            <a:ext cx="426729" cy="436398"/>
+          </a:xfrm>
+          <a:prstGeom prst="ellipse">
+            <a:avLst/>
+          </a:prstGeom>
+          <a:solidFill>
+            <a:srgbClr val="A31257"/>
+          </a:solidFill>
+          <a:ln>
+            <a:solidFill>
+              <a:schemeClr val="bg1"/>
+            </a:solidFill>
+          </a:ln>
+        </p:spPr>
+        <p:style>
+          <a:lnRef idx="2">
+            <a:schemeClr val="accent1">
+              <a:shade val="50000"/>
+            </a:schemeClr>
+          </a:lnRef>
+          <a:fillRef idx="1">
+            <a:schemeClr val="accent1"/>
+          </a:fillRef>
+          <a:effectRef idx="0">
+            <a:schemeClr val="accent1"/>
+          </a:effectRef>
+          <a:fontRef idx="minor">
+            <a:schemeClr val="lt1"/>
+          </a:fontRef>
+        </p:style>
+        <p:txBody>
+          <a:bodyPr rtlCol="0" anchor="ctr"/>
+          <a:lstStyle/>
+          <a:p>
+            <a:pPr algn="ctr"/>
+            <a:endParaRPr lang="fr-FR" dirty="0"/>
+          </a:p>
+        </p:txBody>
+      </p:sp>
+      <p:sp>
+        <p:nvSpPr>
+          <p:cNvPr id="11" name="Ellipse 10">
+            <a:extLst>
+              <a:ext uri="{FF2B5EF4-FFF2-40B4-BE49-F238E27FC236}">
+                <a16:creationId xmlns:a16="http://schemas.microsoft.com/office/drawing/2014/main" id="{0F74EA79-A629-4904-901B-C20817FF4890}"/>
+              </a:ext>
+            </a:extLst>
+          </p:cNvPr>
+          <p:cNvSpPr/>
+          <p:nvPr/>
+        </p:nvSpPr>
+        <p:spPr>
+          <a:xfrm>
+            <a:off x="4077102" y="2858815"/>
+            <a:ext cx="426729" cy="436398"/>
+          </a:xfrm>
+          <a:prstGeom prst="ellipse">
+            <a:avLst/>
+          </a:prstGeom>
+          <a:solidFill>
+            <a:srgbClr val="A31257"/>
+          </a:solidFill>
+          <a:ln>
+            <a:solidFill>
+              <a:schemeClr val="bg1"/>
+            </a:solidFill>
+          </a:ln>
+        </p:spPr>
+        <p:style>
+          <a:lnRef idx="2">
+            <a:schemeClr val="accent1">
+              <a:shade val="50000"/>
+            </a:schemeClr>
+          </a:lnRef>
+          <a:fillRef idx="1">
+            <a:schemeClr val="accent1"/>
+          </a:fillRef>
+          <a:effectRef idx="0">
+            <a:schemeClr val="accent1"/>
+          </a:effectRef>
+          <a:fontRef idx="minor">
+            <a:schemeClr val="lt1"/>
+          </a:fontRef>
+        </p:style>
+        <p:txBody>
+          <a:bodyPr rtlCol="0" anchor="ctr"/>
+          <a:lstStyle/>
+          <a:p>
+            <a:pPr algn="ctr"/>
+            <a:endParaRPr lang="fr-FR" dirty="0"/>
+          </a:p>
+        </p:txBody>
+      </p:sp>
+      <p:sp>
+        <p:nvSpPr>
+          <p:cNvPr id="12" name="Ellipse 11">
+            <a:extLst>
+              <a:ext uri="{FF2B5EF4-FFF2-40B4-BE49-F238E27FC236}">
+                <a16:creationId xmlns:a16="http://schemas.microsoft.com/office/drawing/2014/main" id="{6FA8551F-83AA-48AD-922D-C0DBD31C3219}"/>
+              </a:ext>
+            </a:extLst>
+          </p:cNvPr>
+          <p:cNvSpPr/>
+          <p:nvPr/>
+        </p:nvSpPr>
+        <p:spPr>
+          <a:xfrm>
+            <a:off x="5969389" y="2858815"/>
+            <a:ext cx="426729" cy="436398"/>
+          </a:xfrm>
+          <a:prstGeom prst="ellipse">
+            <a:avLst/>
+          </a:prstGeom>
+          <a:solidFill>
+            <a:srgbClr val="A31257"/>
+          </a:solidFill>
+          <a:ln>
+            <a:solidFill>
+              <a:schemeClr val="bg1"/>
+            </a:solidFill>
+          </a:ln>
+        </p:spPr>
+        <p:style>
+          <a:lnRef idx="2">
+            <a:schemeClr val="accent1">
+              <a:shade val="50000"/>
+            </a:schemeClr>
+          </a:lnRef>
+          <a:fillRef idx="1">
+            <a:schemeClr val="accent1"/>
+          </a:fillRef>
+          <a:effectRef idx="0">
+            <a:schemeClr val="accent1"/>
+          </a:effectRef>
+          <a:fontRef idx="minor">
+            <a:schemeClr val="lt1"/>
+          </a:fontRef>
+        </p:style>
+        <p:txBody>
+          <a:bodyPr rtlCol="0" anchor="ctr"/>
+          <a:lstStyle/>
+          <a:p>
+            <a:pPr algn="ctr"/>
+            <a:endParaRPr lang="fr-FR" dirty="0"/>
+          </a:p>
+        </p:txBody>
+      </p:sp>
+      <p:sp>
+        <p:nvSpPr>
+          <p:cNvPr id="13" name="Ellipse 12">
+            <a:extLst>
+              <a:ext uri="{FF2B5EF4-FFF2-40B4-BE49-F238E27FC236}">
+                <a16:creationId xmlns:a16="http://schemas.microsoft.com/office/drawing/2014/main" id="{AE036F23-3776-4D3B-8152-9E5CD806C8D4}"/>
+              </a:ext>
+            </a:extLst>
+          </p:cNvPr>
+          <p:cNvSpPr/>
+          <p:nvPr/>
+        </p:nvSpPr>
+        <p:spPr>
+          <a:xfrm>
+            <a:off x="7803470" y="2844168"/>
+            <a:ext cx="426729" cy="436398"/>
+          </a:xfrm>
+          <a:prstGeom prst="ellipse">
+            <a:avLst/>
+          </a:prstGeom>
+          <a:solidFill>
+            <a:srgbClr val="A31257"/>
+          </a:solidFill>
+          <a:ln>
+            <a:solidFill>
+              <a:schemeClr val="bg1"/>
+            </a:solidFill>
+          </a:ln>
+        </p:spPr>
+        <p:style>
+          <a:lnRef idx="2">
+            <a:schemeClr val="accent1">
+              <a:shade val="50000"/>
+            </a:schemeClr>
+          </a:lnRef>
+          <a:fillRef idx="1">
+            <a:schemeClr val="accent1"/>
+          </a:fillRef>
+          <a:effectRef idx="0">
+            <a:schemeClr val="accent1"/>
+          </a:effectRef>
+          <a:fontRef idx="minor">
+            <a:schemeClr val="lt1"/>
+          </a:fontRef>
+        </p:style>
+        <p:txBody>
+          <a:bodyPr rtlCol="0" anchor="ctr"/>
+          <a:lstStyle/>
+          <a:p>
+            <a:pPr algn="ctr"/>
+            <a:endParaRPr lang="fr-FR" dirty="0"/>
+          </a:p>
+        </p:txBody>
+      </p:sp>
+      <p:sp>
+        <p:nvSpPr>
+          <p:cNvPr id="14" name="Ellipse 13">
+            <a:extLst>
+              <a:ext uri="{FF2B5EF4-FFF2-40B4-BE49-F238E27FC236}">
+                <a16:creationId xmlns:a16="http://schemas.microsoft.com/office/drawing/2014/main" id="{DCE9DC7A-F89B-4C7B-9D4D-56E401CDD4CC}"/>
+              </a:ext>
+            </a:extLst>
+          </p:cNvPr>
+          <p:cNvSpPr/>
+          <p:nvPr/>
+        </p:nvSpPr>
+        <p:spPr>
+          <a:xfrm>
+            <a:off x="8513386" y="2840814"/>
+            <a:ext cx="426729" cy="436398"/>
+          </a:xfrm>
+          <a:prstGeom prst="ellipse">
+            <a:avLst/>
+          </a:prstGeom>
+          <a:solidFill>
+            <a:srgbClr val="A31257"/>
+          </a:solidFill>
+          <a:ln>
+            <a:solidFill>
+              <a:schemeClr val="bg1"/>
+            </a:solidFill>
+          </a:ln>
+        </p:spPr>
+        <p:style>
+          <a:lnRef idx="2">
+            <a:schemeClr val="accent1">
+              <a:shade val="50000"/>
+            </a:schemeClr>
+          </a:lnRef>
+          <a:fillRef idx="1">
+            <a:schemeClr val="accent1"/>
+          </a:fillRef>
+          <a:effectRef idx="0">
+            <a:schemeClr val="accent1"/>
+          </a:effectRef>
+          <a:fontRef idx="minor">
+            <a:schemeClr val="lt1"/>
+          </a:fontRef>
+        </p:style>
+        <p:txBody>
+          <a:bodyPr rtlCol="0" anchor="ctr"/>
+          <a:lstStyle/>
+          <a:p>
+            <a:pPr algn="ctr"/>
+            <a:endParaRPr lang="fr-FR" dirty="0"/>
+          </a:p>
+        </p:txBody>
+      </p:sp>
+      <p:sp>
+        <p:nvSpPr>
+          <p:cNvPr id="15" name="Ellipse 14">
+            <a:extLst>
+              <a:ext uri="{FF2B5EF4-FFF2-40B4-BE49-F238E27FC236}">
+                <a16:creationId xmlns:a16="http://schemas.microsoft.com/office/drawing/2014/main" id="{7DF9CBBE-D07C-4797-ABEE-99057D7DD677}"/>
+              </a:ext>
+            </a:extLst>
+          </p:cNvPr>
+          <p:cNvSpPr/>
+          <p:nvPr/>
+        </p:nvSpPr>
+        <p:spPr>
+          <a:xfrm>
+            <a:off x="9223302" y="2840814"/>
+            <a:ext cx="426729" cy="436398"/>
+          </a:xfrm>
+          <a:prstGeom prst="ellipse">
+            <a:avLst/>
+          </a:prstGeom>
+          <a:solidFill>
+            <a:srgbClr val="A31257"/>
+          </a:solidFill>
+          <a:ln>
+            <a:solidFill>
+              <a:schemeClr val="bg1"/>
+            </a:solidFill>
+          </a:ln>
+        </p:spPr>
+        <p:style>
+          <a:lnRef idx="2">
+            <a:schemeClr val="accent1">
+              <a:shade val="50000"/>
+            </a:schemeClr>
+          </a:lnRef>
+          <a:fillRef idx="1">
+            <a:schemeClr val="accent1"/>
+          </a:fillRef>
+          <a:effectRef idx="0">
+            <a:schemeClr val="accent1"/>
+          </a:effectRef>
+          <a:fontRef idx="minor">
+            <a:schemeClr val="lt1"/>
+          </a:fontRef>
+        </p:style>
+        <p:txBody>
+          <a:bodyPr rtlCol="0" anchor="ctr"/>
+          <a:lstStyle/>
+          <a:p>
+            <a:pPr algn="ctr"/>
+            <a:endParaRPr lang="fr-FR" dirty="0"/>
+          </a:p>
+        </p:txBody>
+      </p:sp>
+      <p:sp>
+        <p:nvSpPr>
+          <p:cNvPr id="16" name="ZoneTexte 15">
+            <a:extLst>
+              <a:ext uri="{FF2B5EF4-FFF2-40B4-BE49-F238E27FC236}">
+                <a16:creationId xmlns:a16="http://schemas.microsoft.com/office/drawing/2014/main" id="{DAAA17D3-89D1-4A6A-8FD9-6176FA4A5D71}"/>
               </a:ext>
             </a:extLst>
           </p:cNvPr>
@@ -30834,9 +31376,9 @@
           <p:nvPr/>
         </p:nvSpPr>
         <p:spPr>
-          <a:xfrm>
-            <a:off x="1051560" y="1307592"/>
-            <a:ext cx="4754880" cy="2585323"/>
+          <a:xfrm rot="18644952">
+            <a:off x="-657" y="2110629"/>
+            <a:ext cx="1874223" cy="276999"/>
           </a:xfrm>
           <a:prstGeom prst="rect">
             <a:avLst/>
@@ -30849,86 +31391,1271 @@
           </a:bodyPr>
           <a:lstStyle/>
           <a:p>
-            <a:pPr marL="285750" indent="-285750">
-              <a:buFontTx/>
-              <a:buChar char="-"/>
-            </a:pPr>
-            <a:r>
-              <a:rPr lang="fr-FR" dirty="0"/>
+            <a:pPr algn="r"/>
+            <a:r>
+              <a:rPr lang="fr-FR" sz="1200" i="1" dirty="0">
+                <a:effectLst>
+                  <a:outerShdw blurRad="38100" dist="38100" dir="2700000" algn="tl">
+                    <a:srgbClr val="000000">
+                      <a:alpha val="43137"/>
+                    </a:srgbClr>
+                  </a:outerShdw>
+                </a:effectLst>
+              </a:rPr>
               <a:t>Présentation du projet</a:t>
             </a:r>
           </a:p>
-          <a:p>
-            <a:pPr marL="285750" indent="-285750">
-              <a:buFontTx/>
-              <a:buChar char="-"/>
-            </a:pPr>
-            <a:r>
-              <a:rPr lang="fr-FR" dirty="0"/>
-              <a:t>Schématisation globale du projet</a:t>
-            </a:r>
-          </a:p>
-          <a:p>
-            <a:pPr marL="285750" indent="-285750">
-              <a:buFontTx/>
-              <a:buChar char="-"/>
-            </a:pPr>
-            <a:r>
-              <a:rPr lang="fr-FR" dirty="0"/>
+        </p:txBody>
+      </p:sp>
+      <p:sp>
+        <p:nvSpPr>
+          <p:cNvPr id="17" name="ZoneTexte 16">
+            <a:extLst>
+              <a:ext uri="{FF2B5EF4-FFF2-40B4-BE49-F238E27FC236}">
+                <a16:creationId xmlns:a16="http://schemas.microsoft.com/office/drawing/2014/main" id="{22C27595-2BAE-4F9B-86F1-44E90695D8A7}"/>
+              </a:ext>
+            </a:extLst>
+          </p:cNvPr>
+          <p:cNvSpPr txBox="1"/>
+          <p:nvPr/>
+        </p:nvSpPr>
+        <p:spPr>
+          <a:xfrm rot="18644952">
+            <a:off x="1653857" y="2096588"/>
+            <a:ext cx="1874223" cy="276999"/>
+          </a:xfrm>
+          <a:prstGeom prst="rect">
+            <a:avLst/>
+          </a:prstGeom>
+          <a:noFill/>
+        </p:spPr>
+        <p:txBody>
+          <a:bodyPr wrap="square" rtlCol="0">
+            <a:spAutoFit/>
+          </a:bodyPr>
+          <a:lstStyle/>
+          <a:p>
+            <a:pPr algn="r"/>
+            <a:r>
+              <a:rPr lang="fr-FR" sz="1200" i="1" dirty="0">
+                <a:effectLst>
+                  <a:outerShdw blurRad="38100" dist="38100" dir="2700000" algn="tl">
+                    <a:srgbClr val="000000">
+                      <a:alpha val="43137"/>
+                    </a:srgbClr>
+                  </a:outerShdw>
+                </a:effectLst>
+              </a:rPr>
+              <a:t>Schématisation réseau</a:t>
+            </a:r>
+          </a:p>
+        </p:txBody>
+      </p:sp>
+      <p:sp>
+        <p:nvSpPr>
+          <p:cNvPr id="18" name="ZoneTexte 17">
+            <a:extLst>
+              <a:ext uri="{FF2B5EF4-FFF2-40B4-BE49-F238E27FC236}">
+                <a16:creationId xmlns:a16="http://schemas.microsoft.com/office/drawing/2014/main" id="{36201143-B55A-40F5-A5B3-89777491DF7C}"/>
+              </a:ext>
+            </a:extLst>
+          </p:cNvPr>
+          <p:cNvSpPr txBox="1"/>
+          <p:nvPr/>
+        </p:nvSpPr>
+        <p:spPr>
+          <a:xfrm rot="18644952">
+            <a:off x="2073319" y="2356376"/>
+            <a:ext cx="1874223" cy="276999"/>
+          </a:xfrm>
+          <a:prstGeom prst="rect">
+            <a:avLst/>
+          </a:prstGeom>
+          <a:noFill/>
+        </p:spPr>
+        <p:txBody>
+          <a:bodyPr wrap="square" rtlCol="0">
+            <a:spAutoFit/>
+          </a:bodyPr>
+          <a:lstStyle/>
+          <a:p>
+            <a:pPr algn="r"/>
+            <a:r>
+              <a:rPr lang="fr-FR" sz="1200" i="1" dirty="0">
+                <a:effectLst>
+                  <a:outerShdw blurRad="38100" dist="38100" dir="2700000" algn="tl">
+                    <a:srgbClr val="000000">
+                      <a:alpha val="43137"/>
+                    </a:srgbClr>
+                  </a:outerShdw>
+                </a:effectLst>
+              </a:rPr>
+              <a:t>Développement</a:t>
+            </a:r>
+          </a:p>
+        </p:txBody>
+      </p:sp>
+      <p:sp>
+        <p:nvSpPr>
+          <p:cNvPr id="19" name="ZoneTexte 18">
+            <a:extLst>
+              <a:ext uri="{FF2B5EF4-FFF2-40B4-BE49-F238E27FC236}">
+                <a16:creationId xmlns:a16="http://schemas.microsoft.com/office/drawing/2014/main" id="{FEBB1535-1A3C-4365-9AE4-B8962F7FF42B}"/>
+              </a:ext>
+            </a:extLst>
+          </p:cNvPr>
+          <p:cNvSpPr txBox="1"/>
+          <p:nvPr/>
+        </p:nvSpPr>
+        <p:spPr>
+          <a:xfrm rot="18644952">
+            <a:off x="2867136" y="1864292"/>
+            <a:ext cx="2517595" cy="276999"/>
+          </a:xfrm>
+          <a:prstGeom prst="rect">
+            <a:avLst/>
+          </a:prstGeom>
+          <a:noFill/>
+        </p:spPr>
+        <p:txBody>
+          <a:bodyPr wrap="square" rtlCol="0">
+            <a:spAutoFit/>
+          </a:bodyPr>
+          <a:lstStyle/>
+          <a:p>
+            <a:pPr algn="r"/>
+            <a:r>
+              <a:rPr lang="fr-FR" sz="1200" i="1" dirty="0">
+                <a:effectLst>
+                  <a:outerShdw blurRad="38100" dist="38100" dir="2700000" algn="tl">
+                    <a:srgbClr val="000000">
+                      <a:alpha val="43137"/>
+                    </a:srgbClr>
+                  </a:outerShdw>
+                </a:effectLst>
+              </a:rPr>
+              <a:t>Diagramme de cas d’utilisation</a:t>
+            </a:r>
+          </a:p>
+        </p:txBody>
+      </p:sp>
+      <p:sp>
+        <p:nvSpPr>
+          <p:cNvPr id="20" name="ZoneTexte 19">
+            <a:extLst>
+              <a:ext uri="{FF2B5EF4-FFF2-40B4-BE49-F238E27FC236}">
+                <a16:creationId xmlns:a16="http://schemas.microsoft.com/office/drawing/2014/main" id="{90436888-4622-4D17-BDDC-5F7FDF384214}"/>
+              </a:ext>
+            </a:extLst>
+          </p:cNvPr>
+          <p:cNvSpPr txBox="1"/>
+          <p:nvPr/>
+        </p:nvSpPr>
+        <p:spPr>
+          <a:xfrm rot="18644952">
+            <a:off x="3424260" y="2094674"/>
+            <a:ext cx="2517595" cy="276999"/>
+          </a:xfrm>
+          <a:prstGeom prst="rect">
+            <a:avLst/>
+          </a:prstGeom>
+          <a:noFill/>
+        </p:spPr>
+        <p:txBody>
+          <a:bodyPr wrap="square" rtlCol="0">
+            <a:spAutoFit/>
+          </a:bodyPr>
+          <a:lstStyle/>
+          <a:p>
+            <a:pPr algn="r"/>
+            <a:r>
+              <a:rPr lang="fr-FR" sz="1200" i="1" dirty="0">
+                <a:effectLst>
+                  <a:outerShdw blurRad="38100" dist="38100" dir="2700000" algn="tl">
+                    <a:srgbClr val="000000">
+                      <a:alpha val="43137"/>
+                    </a:srgbClr>
+                  </a:outerShdw>
+                </a:effectLst>
+              </a:rPr>
+              <a:t>Application de supervision</a:t>
+            </a:r>
+          </a:p>
+        </p:txBody>
+      </p:sp>
+      <p:sp>
+        <p:nvSpPr>
+          <p:cNvPr id="21" name="ZoneTexte 20">
+            <a:extLst>
+              <a:ext uri="{FF2B5EF4-FFF2-40B4-BE49-F238E27FC236}">
+                <a16:creationId xmlns:a16="http://schemas.microsoft.com/office/drawing/2014/main" id="{46FB00AC-62B1-4E2D-926A-103C15AB1375}"/>
+              </a:ext>
+            </a:extLst>
+          </p:cNvPr>
+          <p:cNvSpPr txBox="1"/>
+          <p:nvPr/>
+        </p:nvSpPr>
+        <p:spPr>
+          <a:xfrm rot="18644952">
+            <a:off x="5337813" y="2246463"/>
+            <a:ext cx="2517595" cy="276999"/>
+          </a:xfrm>
+          <a:prstGeom prst="rect">
+            <a:avLst/>
+          </a:prstGeom>
+          <a:noFill/>
+        </p:spPr>
+        <p:txBody>
+          <a:bodyPr wrap="square" rtlCol="0">
+            <a:spAutoFit/>
+          </a:bodyPr>
+          <a:lstStyle/>
+          <a:p>
+            <a:pPr algn="r"/>
+            <a:r>
+              <a:rPr lang="fr-FR" sz="1200" i="1" dirty="0">
+                <a:effectLst>
+                  <a:outerShdw blurRad="38100" dist="38100" dir="2700000" algn="tl">
+                    <a:srgbClr val="000000">
+                      <a:alpha val="43137"/>
+                    </a:srgbClr>
+                  </a:outerShdw>
+                </a:effectLst>
+              </a:rPr>
+              <a:t>Diagrammes de séquence</a:t>
+            </a:r>
+          </a:p>
+        </p:txBody>
+      </p:sp>
+      <p:sp>
+        <p:nvSpPr>
+          <p:cNvPr id="22" name="ZoneTexte 21">
+            <a:extLst>
+              <a:ext uri="{FF2B5EF4-FFF2-40B4-BE49-F238E27FC236}">
+                <a16:creationId xmlns:a16="http://schemas.microsoft.com/office/drawing/2014/main" id="{421C534E-9398-4F6C-95A5-6FBC5CD180A6}"/>
+              </a:ext>
+            </a:extLst>
+          </p:cNvPr>
+          <p:cNvSpPr txBox="1"/>
+          <p:nvPr/>
+        </p:nvSpPr>
+        <p:spPr>
+          <a:xfrm rot="18644952">
+            <a:off x="6971401" y="2391188"/>
+            <a:ext cx="2517595" cy="276999"/>
+          </a:xfrm>
+          <a:prstGeom prst="rect">
+            <a:avLst/>
+          </a:prstGeom>
+          <a:noFill/>
+        </p:spPr>
+        <p:txBody>
+          <a:bodyPr wrap="square" rtlCol="0">
+            <a:spAutoFit/>
+          </a:bodyPr>
+          <a:lstStyle/>
+          <a:p>
+            <a:pPr algn="r"/>
+            <a:r>
+              <a:rPr lang="fr-FR" sz="1200" i="1" dirty="0">
+                <a:effectLst>
+                  <a:outerShdw blurRad="38100" dist="38100" dir="2700000" algn="tl">
+                    <a:srgbClr val="000000">
+                      <a:alpha val="43137"/>
+                    </a:srgbClr>
+                  </a:outerShdw>
+                </a:effectLst>
+              </a:rPr>
+              <a:t>Diagramme de classe</a:t>
+            </a:r>
+          </a:p>
+        </p:txBody>
+      </p:sp>
+      <p:sp>
+        <p:nvSpPr>
+          <p:cNvPr id="23" name="ZoneTexte 22">
+            <a:extLst>
+              <a:ext uri="{FF2B5EF4-FFF2-40B4-BE49-F238E27FC236}">
+                <a16:creationId xmlns:a16="http://schemas.microsoft.com/office/drawing/2014/main" id="{46FBF72E-7CE7-433C-81CC-7AF5D1310CBF}"/>
+              </a:ext>
+            </a:extLst>
+          </p:cNvPr>
+          <p:cNvSpPr txBox="1"/>
+          <p:nvPr/>
+        </p:nvSpPr>
+        <p:spPr>
+          <a:xfrm rot="18644952">
+            <a:off x="7506982" y="2600077"/>
+            <a:ext cx="2517595" cy="276999"/>
+          </a:xfrm>
+          <a:prstGeom prst="rect">
+            <a:avLst/>
+          </a:prstGeom>
+          <a:noFill/>
+        </p:spPr>
+        <p:txBody>
+          <a:bodyPr wrap="square" rtlCol="0">
+            <a:spAutoFit/>
+          </a:bodyPr>
+          <a:lstStyle/>
+          <a:p>
+            <a:pPr algn="r"/>
+            <a:r>
+              <a:rPr lang="fr-FR" sz="1200" i="1" dirty="0">
+                <a:effectLst>
+                  <a:outerShdw blurRad="38100" dist="38100" dir="2700000" algn="tl">
+                    <a:srgbClr val="000000">
+                      <a:alpha val="43137"/>
+                    </a:srgbClr>
+                  </a:outerShdw>
+                </a:effectLst>
+              </a:rPr>
+              <a:t>Base de données</a:t>
+            </a:r>
+          </a:p>
+        </p:txBody>
+      </p:sp>
+      <p:sp>
+        <p:nvSpPr>
+          <p:cNvPr id="24" name="ZoneTexte 23">
+            <a:extLst>
+              <a:ext uri="{FF2B5EF4-FFF2-40B4-BE49-F238E27FC236}">
+                <a16:creationId xmlns:a16="http://schemas.microsoft.com/office/drawing/2014/main" id="{15638C6A-2D8D-43F1-B432-3494A6AF6A9F}"/>
+              </a:ext>
+            </a:extLst>
+          </p:cNvPr>
+          <p:cNvSpPr txBox="1"/>
+          <p:nvPr/>
+        </p:nvSpPr>
+        <p:spPr>
+          <a:xfrm rot="18644952">
+            <a:off x="8051358" y="2808967"/>
+            <a:ext cx="2517595" cy="276999"/>
+          </a:xfrm>
+          <a:prstGeom prst="rect">
+            <a:avLst/>
+          </a:prstGeom>
+          <a:noFill/>
+        </p:spPr>
+        <p:txBody>
+          <a:bodyPr wrap="square" rtlCol="0">
+            <a:spAutoFit/>
+          </a:bodyPr>
+          <a:lstStyle/>
+          <a:p>
+            <a:pPr algn="r"/>
+            <a:r>
+              <a:rPr lang="fr-FR" sz="1200" i="1" dirty="0">
+                <a:effectLst>
+                  <a:outerShdw blurRad="38100" dist="38100" dir="2700000" algn="tl">
+                    <a:srgbClr val="000000">
+                      <a:alpha val="43137"/>
+                    </a:srgbClr>
+                  </a:outerShdw>
+                </a:effectLst>
+              </a:rPr>
+              <a:t>Planification</a:t>
+            </a:r>
+          </a:p>
+        </p:txBody>
+      </p:sp>
+      <p:sp>
+        <p:nvSpPr>
+          <p:cNvPr id="25" name="Rectangle : coins arrondis 24">
+            <a:extLst>
+              <a:ext uri="{FF2B5EF4-FFF2-40B4-BE49-F238E27FC236}">
+                <a16:creationId xmlns:a16="http://schemas.microsoft.com/office/drawing/2014/main" id="{E40A7B39-1DFE-4909-A257-7BF66176AFCF}"/>
+              </a:ext>
+            </a:extLst>
+          </p:cNvPr>
+          <p:cNvSpPr/>
+          <p:nvPr/>
+        </p:nvSpPr>
+        <p:spPr>
+          <a:xfrm rot="5400000">
+            <a:off x="803635" y="3138666"/>
+            <a:ext cx="225112" cy="60374"/>
+          </a:xfrm>
+          <a:prstGeom prst="roundRect">
+            <a:avLst>
+              <a:gd name="adj" fmla="val 50000"/>
+            </a:avLst>
+          </a:prstGeom>
+          <a:solidFill>
+            <a:srgbClr val="A31257"/>
+          </a:solidFill>
+          <a:ln>
+            <a:solidFill>
+              <a:srgbClr val="A41258"/>
+            </a:solidFill>
+          </a:ln>
+        </p:spPr>
+        <p:style>
+          <a:lnRef idx="2">
+            <a:schemeClr val="accent1">
+              <a:shade val="50000"/>
+            </a:schemeClr>
+          </a:lnRef>
+          <a:fillRef idx="1">
+            <a:schemeClr val="accent1"/>
+          </a:fillRef>
+          <a:effectRef idx="0">
+            <a:schemeClr val="accent1"/>
+          </a:effectRef>
+          <a:fontRef idx="minor">
+            <a:schemeClr val="lt1"/>
+          </a:fontRef>
+        </p:style>
+        <p:txBody>
+          <a:bodyPr rtlCol="0" anchor="ctr"/>
+          <a:lstStyle/>
+          <a:p>
+            <a:pPr algn="ctr"/>
+            <a:endParaRPr lang="fr-FR"/>
+          </a:p>
+        </p:txBody>
+      </p:sp>
+      <p:sp>
+        <p:nvSpPr>
+          <p:cNvPr id="26" name="Rectangle : coins arrondis 25">
+            <a:extLst>
+              <a:ext uri="{FF2B5EF4-FFF2-40B4-BE49-F238E27FC236}">
+                <a16:creationId xmlns:a16="http://schemas.microsoft.com/office/drawing/2014/main" id="{988A0DE9-C1D4-4F62-95D3-4E56B5CB1BA7}"/>
+              </a:ext>
+            </a:extLst>
+          </p:cNvPr>
+          <p:cNvSpPr/>
+          <p:nvPr/>
+        </p:nvSpPr>
+        <p:spPr>
+          <a:xfrm rot="5400000">
+            <a:off x="1126275" y="3145875"/>
+            <a:ext cx="225112" cy="60374"/>
+          </a:xfrm>
+          <a:prstGeom prst="roundRect">
+            <a:avLst>
+              <a:gd name="adj" fmla="val 50000"/>
+            </a:avLst>
+          </a:prstGeom>
+          <a:solidFill>
+            <a:srgbClr val="A31257"/>
+          </a:solidFill>
+          <a:ln>
+            <a:solidFill>
+              <a:srgbClr val="A41258"/>
+            </a:solidFill>
+          </a:ln>
+        </p:spPr>
+        <p:style>
+          <a:lnRef idx="2">
+            <a:schemeClr val="accent1">
+              <a:shade val="50000"/>
+            </a:schemeClr>
+          </a:lnRef>
+          <a:fillRef idx="1">
+            <a:schemeClr val="accent1"/>
+          </a:fillRef>
+          <a:effectRef idx="0">
+            <a:schemeClr val="accent1"/>
+          </a:effectRef>
+          <a:fontRef idx="minor">
+            <a:schemeClr val="lt1"/>
+          </a:fontRef>
+        </p:style>
+        <p:txBody>
+          <a:bodyPr rtlCol="0" anchor="ctr"/>
+          <a:lstStyle/>
+          <a:p>
+            <a:pPr algn="ctr"/>
+            <a:endParaRPr lang="fr-FR"/>
+          </a:p>
+        </p:txBody>
+      </p:sp>
+      <p:sp>
+        <p:nvSpPr>
+          <p:cNvPr id="27" name="Rectangle : coins arrondis 26">
+            <a:extLst>
+              <a:ext uri="{FF2B5EF4-FFF2-40B4-BE49-F238E27FC236}">
+                <a16:creationId xmlns:a16="http://schemas.microsoft.com/office/drawing/2014/main" id="{008445F2-B9BE-4329-B9E4-3003A41ED0DB}"/>
+              </a:ext>
+            </a:extLst>
+          </p:cNvPr>
+          <p:cNvSpPr/>
+          <p:nvPr/>
+        </p:nvSpPr>
+        <p:spPr>
+          <a:xfrm rot="5400000">
+            <a:off x="1430815" y="3138666"/>
+            <a:ext cx="225112" cy="60374"/>
+          </a:xfrm>
+          <a:prstGeom prst="roundRect">
+            <a:avLst>
+              <a:gd name="adj" fmla="val 50000"/>
+            </a:avLst>
+          </a:prstGeom>
+          <a:solidFill>
+            <a:srgbClr val="A31257"/>
+          </a:solidFill>
+          <a:ln>
+            <a:solidFill>
+              <a:srgbClr val="A41258"/>
+            </a:solidFill>
+          </a:ln>
+        </p:spPr>
+        <p:style>
+          <a:lnRef idx="2">
+            <a:schemeClr val="accent1">
+              <a:shade val="50000"/>
+            </a:schemeClr>
+          </a:lnRef>
+          <a:fillRef idx="1">
+            <a:schemeClr val="accent1"/>
+          </a:fillRef>
+          <a:effectRef idx="0">
+            <a:schemeClr val="accent1"/>
+          </a:effectRef>
+          <a:fontRef idx="minor">
+            <a:schemeClr val="lt1"/>
+          </a:fontRef>
+        </p:style>
+        <p:txBody>
+          <a:bodyPr rtlCol="0" anchor="ctr"/>
+          <a:lstStyle/>
+          <a:p>
+            <a:pPr algn="ctr"/>
+            <a:endParaRPr lang="fr-FR"/>
+          </a:p>
+        </p:txBody>
+      </p:sp>
+      <p:sp>
+        <p:nvSpPr>
+          <p:cNvPr id="28" name="Rectangle : coins arrondis 27">
+            <a:extLst>
+              <a:ext uri="{FF2B5EF4-FFF2-40B4-BE49-F238E27FC236}">
+                <a16:creationId xmlns:a16="http://schemas.microsoft.com/office/drawing/2014/main" id="{8F4768E7-B68F-4CB1-8269-694759F832F0}"/>
+              </a:ext>
+            </a:extLst>
+          </p:cNvPr>
+          <p:cNvSpPr/>
+          <p:nvPr/>
+        </p:nvSpPr>
+        <p:spPr>
+          <a:xfrm rot="5400000">
+            <a:off x="4822439" y="3138666"/>
+            <a:ext cx="225112" cy="60374"/>
+          </a:xfrm>
+          <a:prstGeom prst="roundRect">
+            <a:avLst>
+              <a:gd name="adj" fmla="val 50000"/>
+            </a:avLst>
+          </a:prstGeom>
+          <a:solidFill>
+            <a:srgbClr val="A31257"/>
+          </a:solidFill>
+          <a:ln>
+            <a:solidFill>
+              <a:srgbClr val="A41258"/>
+            </a:solidFill>
+          </a:ln>
+        </p:spPr>
+        <p:style>
+          <a:lnRef idx="2">
+            <a:schemeClr val="accent1">
+              <a:shade val="50000"/>
+            </a:schemeClr>
+          </a:lnRef>
+          <a:fillRef idx="1">
+            <a:schemeClr val="accent1"/>
+          </a:fillRef>
+          <a:effectRef idx="0">
+            <a:schemeClr val="accent1"/>
+          </a:effectRef>
+          <a:fontRef idx="minor">
+            <a:schemeClr val="lt1"/>
+          </a:fontRef>
+        </p:style>
+        <p:txBody>
+          <a:bodyPr rtlCol="0" anchor="ctr"/>
+          <a:lstStyle/>
+          <a:p>
+            <a:pPr algn="ctr"/>
+            <a:endParaRPr lang="fr-FR"/>
+          </a:p>
+        </p:txBody>
+      </p:sp>
+      <p:sp>
+        <p:nvSpPr>
+          <p:cNvPr id="29" name="Rectangle : coins arrondis 28">
+            <a:extLst>
+              <a:ext uri="{FF2B5EF4-FFF2-40B4-BE49-F238E27FC236}">
+                <a16:creationId xmlns:a16="http://schemas.microsoft.com/office/drawing/2014/main" id="{7FDF38AB-C3CC-4D89-AB86-2DE47B769B25}"/>
+              </a:ext>
+            </a:extLst>
+          </p:cNvPr>
+          <p:cNvSpPr/>
+          <p:nvPr/>
+        </p:nvSpPr>
+        <p:spPr>
+          <a:xfrm rot="5400000">
+            <a:off x="5145079" y="3145875"/>
+            <a:ext cx="225112" cy="60374"/>
+          </a:xfrm>
+          <a:prstGeom prst="roundRect">
+            <a:avLst>
+              <a:gd name="adj" fmla="val 50000"/>
+            </a:avLst>
+          </a:prstGeom>
+          <a:solidFill>
+            <a:srgbClr val="A31257"/>
+          </a:solidFill>
+          <a:ln>
+            <a:solidFill>
+              <a:srgbClr val="A41258"/>
+            </a:solidFill>
+          </a:ln>
+        </p:spPr>
+        <p:style>
+          <a:lnRef idx="2">
+            <a:schemeClr val="accent1">
+              <a:shade val="50000"/>
+            </a:schemeClr>
+          </a:lnRef>
+          <a:fillRef idx="1">
+            <a:schemeClr val="accent1"/>
+          </a:fillRef>
+          <a:effectRef idx="0">
+            <a:schemeClr val="accent1"/>
+          </a:effectRef>
+          <a:fontRef idx="minor">
+            <a:schemeClr val="lt1"/>
+          </a:fontRef>
+        </p:style>
+        <p:txBody>
+          <a:bodyPr rtlCol="0" anchor="ctr"/>
+          <a:lstStyle/>
+          <a:p>
+            <a:pPr algn="ctr"/>
+            <a:endParaRPr lang="fr-FR"/>
+          </a:p>
+        </p:txBody>
+      </p:sp>
+      <p:sp>
+        <p:nvSpPr>
+          <p:cNvPr id="30" name="Rectangle : coins arrondis 29">
+            <a:extLst>
+              <a:ext uri="{FF2B5EF4-FFF2-40B4-BE49-F238E27FC236}">
+                <a16:creationId xmlns:a16="http://schemas.microsoft.com/office/drawing/2014/main" id="{43D8F1FC-B261-477C-ADF1-6B4F891A4293}"/>
+              </a:ext>
+            </a:extLst>
+          </p:cNvPr>
+          <p:cNvSpPr/>
+          <p:nvPr/>
+        </p:nvSpPr>
+        <p:spPr>
+          <a:xfrm rot="5400000">
+            <a:off x="5449619" y="3138666"/>
+            <a:ext cx="225112" cy="60374"/>
+          </a:xfrm>
+          <a:prstGeom prst="roundRect">
+            <a:avLst>
+              <a:gd name="adj" fmla="val 50000"/>
+            </a:avLst>
+          </a:prstGeom>
+          <a:solidFill>
+            <a:srgbClr val="A31257"/>
+          </a:solidFill>
+          <a:ln>
+            <a:solidFill>
+              <a:srgbClr val="A41258"/>
+            </a:solidFill>
+          </a:ln>
+        </p:spPr>
+        <p:style>
+          <a:lnRef idx="2">
+            <a:schemeClr val="accent1">
+              <a:shade val="50000"/>
+            </a:schemeClr>
+          </a:lnRef>
+          <a:fillRef idx="1">
+            <a:schemeClr val="accent1"/>
+          </a:fillRef>
+          <a:effectRef idx="0">
+            <a:schemeClr val="accent1"/>
+          </a:effectRef>
+          <a:fontRef idx="minor">
+            <a:schemeClr val="lt1"/>
+          </a:fontRef>
+        </p:style>
+        <p:txBody>
+          <a:bodyPr rtlCol="0" anchor="ctr"/>
+          <a:lstStyle/>
+          <a:p>
+            <a:pPr algn="ctr"/>
+            <a:endParaRPr lang="fr-FR"/>
+          </a:p>
+        </p:txBody>
+      </p:sp>
+      <p:sp>
+        <p:nvSpPr>
+          <p:cNvPr id="31" name="Rectangle : coins arrondis 30">
+            <a:extLst>
+              <a:ext uri="{FF2B5EF4-FFF2-40B4-BE49-F238E27FC236}">
+                <a16:creationId xmlns:a16="http://schemas.microsoft.com/office/drawing/2014/main" id="{BFB4C96A-CAE8-4A17-9261-15A69EF5A0EF}"/>
+              </a:ext>
+            </a:extLst>
+          </p:cNvPr>
+          <p:cNvSpPr/>
+          <p:nvPr/>
+        </p:nvSpPr>
+        <p:spPr>
+          <a:xfrm rot="5400000">
+            <a:off x="6732291" y="3134469"/>
+            <a:ext cx="225112" cy="60374"/>
+          </a:xfrm>
+          <a:prstGeom prst="roundRect">
+            <a:avLst>
+              <a:gd name="adj" fmla="val 50000"/>
+            </a:avLst>
+          </a:prstGeom>
+          <a:solidFill>
+            <a:srgbClr val="A31257"/>
+          </a:solidFill>
+          <a:ln>
+            <a:solidFill>
+              <a:srgbClr val="A41258"/>
+            </a:solidFill>
+          </a:ln>
+        </p:spPr>
+        <p:style>
+          <a:lnRef idx="2">
+            <a:schemeClr val="accent1">
+              <a:shade val="50000"/>
+            </a:schemeClr>
+          </a:lnRef>
+          <a:fillRef idx="1">
+            <a:schemeClr val="accent1"/>
+          </a:fillRef>
+          <a:effectRef idx="0">
+            <a:schemeClr val="accent1"/>
+          </a:effectRef>
+          <a:fontRef idx="minor">
+            <a:schemeClr val="lt1"/>
+          </a:fontRef>
+        </p:style>
+        <p:txBody>
+          <a:bodyPr rtlCol="0" anchor="ctr"/>
+          <a:lstStyle/>
+          <a:p>
+            <a:pPr algn="ctr"/>
+            <a:endParaRPr lang="fr-FR"/>
+          </a:p>
+        </p:txBody>
+      </p:sp>
+      <p:sp>
+        <p:nvSpPr>
+          <p:cNvPr id="32" name="Rectangle : coins arrondis 31">
+            <a:extLst>
+              <a:ext uri="{FF2B5EF4-FFF2-40B4-BE49-F238E27FC236}">
+                <a16:creationId xmlns:a16="http://schemas.microsoft.com/office/drawing/2014/main" id="{F18BA096-590B-471B-9E40-DC3BE480D47A}"/>
+              </a:ext>
+            </a:extLst>
+          </p:cNvPr>
+          <p:cNvSpPr/>
+          <p:nvPr/>
+        </p:nvSpPr>
+        <p:spPr>
+          <a:xfrm rot="5400000">
+            <a:off x="7054931" y="3141678"/>
+            <a:ext cx="225112" cy="60374"/>
+          </a:xfrm>
+          <a:prstGeom prst="roundRect">
+            <a:avLst>
+              <a:gd name="adj" fmla="val 50000"/>
+            </a:avLst>
+          </a:prstGeom>
+          <a:solidFill>
+            <a:srgbClr val="A31257"/>
+          </a:solidFill>
+          <a:ln>
+            <a:solidFill>
+              <a:srgbClr val="A41258"/>
+            </a:solidFill>
+          </a:ln>
+        </p:spPr>
+        <p:style>
+          <a:lnRef idx="2">
+            <a:schemeClr val="accent1">
+              <a:shade val="50000"/>
+            </a:schemeClr>
+          </a:lnRef>
+          <a:fillRef idx="1">
+            <a:schemeClr val="accent1"/>
+          </a:fillRef>
+          <a:effectRef idx="0">
+            <a:schemeClr val="accent1"/>
+          </a:effectRef>
+          <a:fontRef idx="minor">
+            <a:schemeClr val="lt1"/>
+          </a:fontRef>
+        </p:style>
+        <p:txBody>
+          <a:bodyPr rtlCol="0" anchor="ctr"/>
+          <a:lstStyle/>
+          <a:p>
+            <a:pPr algn="ctr"/>
+            <a:endParaRPr lang="fr-FR"/>
+          </a:p>
+        </p:txBody>
+      </p:sp>
+      <p:sp>
+        <p:nvSpPr>
+          <p:cNvPr id="33" name="Rectangle : coins arrondis 32">
+            <a:extLst>
+              <a:ext uri="{FF2B5EF4-FFF2-40B4-BE49-F238E27FC236}">
+                <a16:creationId xmlns:a16="http://schemas.microsoft.com/office/drawing/2014/main" id="{69225A1E-68A1-423E-87FC-ECB494C9AC47}"/>
+              </a:ext>
+            </a:extLst>
+          </p:cNvPr>
+          <p:cNvSpPr/>
+          <p:nvPr/>
+        </p:nvSpPr>
+        <p:spPr>
+          <a:xfrm rot="5400000">
+            <a:off x="7359471" y="3134469"/>
+            <a:ext cx="225112" cy="60374"/>
+          </a:xfrm>
+          <a:prstGeom prst="roundRect">
+            <a:avLst>
+              <a:gd name="adj" fmla="val 50000"/>
+            </a:avLst>
+          </a:prstGeom>
+          <a:solidFill>
+            <a:srgbClr val="A31257"/>
+          </a:solidFill>
+          <a:ln>
+            <a:solidFill>
+              <a:srgbClr val="A41258"/>
+            </a:solidFill>
+          </a:ln>
+        </p:spPr>
+        <p:style>
+          <a:lnRef idx="2">
+            <a:schemeClr val="accent1">
+              <a:shade val="50000"/>
+            </a:schemeClr>
+          </a:lnRef>
+          <a:fillRef idx="1">
+            <a:schemeClr val="accent1"/>
+          </a:fillRef>
+          <a:effectRef idx="0">
+            <a:schemeClr val="accent1"/>
+          </a:effectRef>
+          <a:fontRef idx="minor">
+            <a:schemeClr val="lt1"/>
+          </a:fontRef>
+        </p:style>
+        <p:txBody>
+          <a:bodyPr rtlCol="0" anchor="ctr"/>
+          <a:lstStyle/>
+          <a:p>
+            <a:pPr algn="ctr"/>
+            <a:endParaRPr lang="fr-FR"/>
+          </a:p>
+        </p:txBody>
+      </p:sp>
+      <p:sp>
+        <p:nvSpPr>
+          <p:cNvPr id="34" name="ZoneTexte 33">
+            <a:extLst>
+              <a:ext uri="{FF2B5EF4-FFF2-40B4-BE49-F238E27FC236}">
+                <a16:creationId xmlns:a16="http://schemas.microsoft.com/office/drawing/2014/main" id="{405B3035-371C-4E70-9A0C-FFF664E12156}"/>
+              </a:ext>
+            </a:extLst>
+          </p:cNvPr>
+          <p:cNvSpPr txBox="1"/>
+          <p:nvPr/>
+        </p:nvSpPr>
+        <p:spPr>
+          <a:xfrm rot="18665530">
+            <a:off x="-183780" y="3648926"/>
+            <a:ext cx="1259752" cy="276999"/>
+          </a:xfrm>
+          <a:prstGeom prst="rect">
+            <a:avLst/>
+          </a:prstGeom>
+          <a:noFill/>
+        </p:spPr>
+        <p:txBody>
+          <a:bodyPr wrap="square" rtlCol="0">
+            <a:spAutoFit/>
+          </a:bodyPr>
+          <a:lstStyle/>
+          <a:p>
+            <a:pPr algn="r"/>
+            <a:r>
+              <a:rPr lang="fr-FR" sz="1200" i="1" dirty="0">
+                <a:effectLst>
+                  <a:outerShdw blurRad="38100" dist="38100" dir="2700000" algn="tl">
+                    <a:srgbClr val="000000">
+                      <a:alpha val="43137"/>
+                    </a:srgbClr>
+                  </a:outerShdw>
+                </a:effectLst>
+              </a:rPr>
+              <a:t>Schéma global</a:t>
+            </a:r>
+          </a:p>
+        </p:txBody>
+      </p:sp>
+      <p:sp>
+        <p:nvSpPr>
+          <p:cNvPr id="35" name="ZoneTexte 34">
+            <a:extLst>
+              <a:ext uri="{FF2B5EF4-FFF2-40B4-BE49-F238E27FC236}">
+                <a16:creationId xmlns:a16="http://schemas.microsoft.com/office/drawing/2014/main" id="{1DC01E82-8C40-44D5-9F47-5BC6F6FA2D3C}"/>
+              </a:ext>
+            </a:extLst>
+          </p:cNvPr>
+          <p:cNvSpPr txBox="1"/>
+          <p:nvPr/>
+        </p:nvSpPr>
+        <p:spPr>
+          <a:xfrm rot="18665530">
+            <a:off x="-176770" y="3822382"/>
+            <a:ext cx="1732827" cy="276999"/>
+          </a:xfrm>
+          <a:prstGeom prst="rect">
+            <a:avLst/>
+          </a:prstGeom>
+          <a:noFill/>
+        </p:spPr>
+        <p:txBody>
+          <a:bodyPr wrap="square" rtlCol="0">
+            <a:spAutoFit/>
+          </a:bodyPr>
+          <a:lstStyle/>
+          <a:p>
+            <a:pPr algn="r"/>
+            <a:r>
+              <a:rPr lang="fr-FR" sz="1200" i="1" dirty="0">
+                <a:effectLst>
+                  <a:outerShdw blurRad="38100" dist="38100" dir="2700000" algn="tl">
+                    <a:srgbClr val="000000">
+                      <a:alpha val="43137"/>
+                    </a:srgbClr>
+                  </a:outerShdw>
+                </a:effectLst>
+              </a:rPr>
+              <a:t>Schéma personnalisé</a:t>
+            </a:r>
+          </a:p>
+        </p:txBody>
+      </p:sp>
+      <p:sp>
+        <p:nvSpPr>
+          <p:cNvPr id="36" name="ZoneTexte 35">
+            <a:extLst>
+              <a:ext uri="{FF2B5EF4-FFF2-40B4-BE49-F238E27FC236}">
+                <a16:creationId xmlns:a16="http://schemas.microsoft.com/office/drawing/2014/main" id="{7B3A7607-4394-4760-842D-452207886078}"/>
+              </a:ext>
+            </a:extLst>
+          </p:cNvPr>
+          <p:cNvSpPr txBox="1"/>
+          <p:nvPr/>
+        </p:nvSpPr>
+        <p:spPr>
+          <a:xfrm rot="18665530">
+            <a:off x="182030" y="3842762"/>
+            <a:ext cx="1732827" cy="276999"/>
+          </a:xfrm>
+          <a:prstGeom prst="rect">
+            <a:avLst/>
+          </a:prstGeom>
+          <a:noFill/>
+        </p:spPr>
+        <p:txBody>
+          <a:bodyPr wrap="square" rtlCol="0">
+            <a:spAutoFit/>
+          </a:bodyPr>
+          <a:lstStyle/>
+          <a:p>
+            <a:pPr algn="r"/>
+            <a:r>
+              <a:rPr lang="fr-FR" sz="1200" i="1" dirty="0">
+                <a:effectLst>
+                  <a:outerShdw blurRad="38100" dist="38100" dir="2700000" algn="tl">
+                    <a:srgbClr val="000000">
+                      <a:alpha val="43137"/>
+                    </a:srgbClr>
+                  </a:outerShdw>
+                </a:effectLst>
+              </a:rPr>
               <a:t>Tâches personnelles</a:t>
             </a:r>
           </a:p>
-          <a:p>
-            <a:pPr marL="285750" indent="-285750">
-              <a:buFontTx/>
-              <a:buChar char="-"/>
-            </a:pPr>
-            <a:r>
-              <a:rPr lang="fr-FR" dirty="0"/>
-              <a:t>Diagramme de cas d’utilisation</a:t>
-            </a:r>
-          </a:p>
-          <a:p>
-            <a:pPr marL="285750" indent="-285750">
-              <a:buFontTx/>
-              <a:buChar char="-"/>
-            </a:pPr>
-            <a:r>
-              <a:rPr lang="fr-FR" dirty="0"/>
-              <a:t>Diagrammes de séquences : </a:t>
-            </a:r>
-            <a:r>
-              <a:rPr lang="fr-FR" dirty="0" err="1"/>
-              <a:t>a</a:t>
-            </a:r>
-            <a:r>
-              <a:rPr lang="fr-FR" dirty="0"/>
-              <a:t> compléter…</a:t>
-            </a:r>
-          </a:p>
-          <a:p>
-            <a:pPr marL="285750" indent="-285750">
-              <a:buFontTx/>
-              <a:buChar char="-"/>
-            </a:pPr>
-            <a:r>
-              <a:rPr lang="fr-FR" dirty="0"/>
-              <a:t>Schéma du réseau</a:t>
-            </a:r>
-          </a:p>
-          <a:p>
-            <a:pPr marL="285750" indent="-285750">
-              <a:buFontTx/>
-              <a:buChar char="-"/>
-            </a:pPr>
-            <a:endParaRPr lang="fr-FR" dirty="0"/>
-          </a:p>
-          <a:p>
-            <a:pPr marL="285750" indent="-285750">
-              <a:buFontTx/>
-              <a:buChar char="-"/>
-            </a:pPr>
-            <a:endParaRPr lang="fr-FR" dirty="0"/>
+        </p:txBody>
+      </p:sp>
+      <p:sp>
+        <p:nvSpPr>
+          <p:cNvPr id="37" name="ZoneTexte 36">
+            <a:extLst>
+              <a:ext uri="{FF2B5EF4-FFF2-40B4-BE49-F238E27FC236}">
+                <a16:creationId xmlns:a16="http://schemas.microsoft.com/office/drawing/2014/main" id="{60C2F241-55B0-454A-BFA8-04D0CC07A8F8}"/>
+              </a:ext>
+            </a:extLst>
+          </p:cNvPr>
+          <p:cNvSpPr txBox="1"/>
+          <p:nvPr/>
+        </p:nvSpPr>
+        <p:spPr>
+          <a:xfrm rot="18665530">
+            <a:off x="3548758" y="3807116"/>
+            <a:ext cx="1732827" cy="276999"/>
+          </a:xfrm>
+          <a:prstGeom prst="rect">
+            <a:avLst/>
+          </a:prstGeom>
+          <a:noFill/>
+        </p:spPr>
+        <p:txBody>
+          <a:bodyPr wrap="square" rtlCol="0">
+            <a:spAutoFit/>
+          </a:bodyPr>
+          <a:lstStyle/>
+          <a:p>
+            <a:pPr algn="r"/>
+            <a:r>
+              <a:rPr lang="fr-FR" sz="1200" i="1" dirty="0">
+                <a:effectLst>
+                  <a:outerShdw blurRad="38100" dist="38100" dir="2700000" algn="tl">
+                    <a:srgbClr val="000000">
+                      <a:alpha val="43137"/>
+                    </a:srgbClr>
+                  </a:outerShdw>
+                </a:effectLst>
+              </a:rPr>
+              <a:t>Lancer une partie</a:t>
+            </a:r>
+          </a:p>
+        </p:txBody>
+      </p:sp>
+      <p:sp>
+        <p:nvSpPr>
+          <p:cNvPr id="38" name="ZoneTexte 37">
+            <a:extLst>
+              <a:ext uri="{FF2B5EF4-FFF2-40B4-BE49-F238E27FC236}">
+                <a16:creationId xmlns:a16="http://schemas.microsoft.com/office/drawing/2014/main" id="{006FF268-7134-4DEF-8BFB-B9B089526AF3}"/>
+              </a:ext>
+            </a:extLst>
+          </p:cNvPr>
+          <p:cNvSpPr txBox="1"/>
+          <p:nvPr/>
+        </p:nvSpPr>
+        <p:spPr>
+          <a:xfrm rot="18665530">
+            <a:off x="3896116" y="3842762"/>
+            <a:ext cx="1732827" cy="276999"/>
+          </a:xfrm>
+          <a:prstGeom prst="rect">
+            <a:avLst/>
+          </a:prstGeom>
+          <a:noFill/>
+        </p:spPr>
+        <p:txBody>
+          <a:bodyPr wrap="square" rtlCol="0">
+            <a:spAutoFit/>
+          </a:bodyPr>
+          <a:lstStyle/>
+          <a:p>
+            <a:pPr algn="r"/>
+            <a:r>
+              <a:rPr lang="fr-FR" sz="1200" i="1" dirty="0">
+                <a:effectLst>
+                  <a:outerShdw blurRad="38100" dist="38100" dir="2700000" algn="tl">
+                    <a:srgbClr val="000000">
+                      <a:alpha val="43137"/>
+                    </a:srgbClr>
+                  </a:outerShdw>
+                </a:effectLst>
+              </a:rPr>
+              <a:t>Superviser</a:t>
+            </a:r>
+          </a:p>
+        </p:txBody>
+      </p:sp>
+      <p:sp>
+        <p:nvSpPr>
+          <p:cNvPr id="39" name="ZoneTexte 38">
+            <a:extLst>
+              <a:ext uri="{FF2B5EF4-FFF2-40B4-BE49-F238E27FC236}">
+                <a16:creationId xmlns:a16="http://schemas.microsoft.com/office/drawing/2014/main" id="{4B2A3D48-8C46-4A1E-8C3B-722A1DAB5F92}"/>
+              </a:ext>
+            </a:extLst>
+          </p:cNvPr>
+          <p:cNvSpPr txBox="1"/>
+          <p:nvPr/>
+        </p:nvSpPr>
+        <p:spPr>
+          <a:xfrm rot="18665530">
+            <a:off x="4260226" y="3822382"/>
+            <a:ext cx="1732827" cy="276999"/>
+          </a:xfrm>
+          <a:prstGeom prst="rect">
+            <a:avLst/>
+          </a:prstGeom>
+          <a:noFill/>
+        </p:spPr>
+        <p:txBody>
+          <a:bodyPr wrap="square" rtlCol="0">
+            <a:spAutoFit/>
+          </a:bodyPr>
+          <a:lstStyle/>
+          <a:p>
+            <a:pPr algn="r"/>
+            <a:r>
+              <a:rPr lang="fr-FR" sz="1200" i="1" dirty="0">
+                <a:effectLst>
+                  <a:outerShdw blurRad="38100" dist="38100" dir="2700000" algn="tl">
+                    <a:srgbClr val="000000">
+                      <a:alpha val="43137"/>
+                    </a:srgbClr>
+                  </a:outerShdw>
+                </a:effectLst>
+              </a:rPr>
+              <a:t>Envoi d’indice / Fin</a:t>
+            </a:r>
+          </a:p>
+        </p:txBody>
+      </p:sp>
+      <p:sp>
+        <p:nvSpPr>
+          <p:cNvPr id="40" name="ZoneTexte 39">
+            <a:extLst>
+              <a:ext uri="{FF2B5EF4-FFF2-40B4-BE49-F238E27FC236}">
+                <a16:creationId xmlns:a16="http://schemas.microsoft.com/office/drawing/2014/main" id="{640E99BC-DFE5-44DD-9E5F-242734587379}"/>
+              </a:ext>
+            </a:extLst>
+          </p:cNvPr>
+          <p:cNvSpPr txBox="1"/>
+          <p:nvPr/>
+        </p:nvSpPr>
+        <p:spPr>
+          <a:xfrm rot="18665530">
+            <a:off x="5277727" y="3865859"/>
+            <a:ext cx="1919933" cy="276999"/>
+          </a:xfrm>
+          <a:prstGeom prst="rect">
+            <a:avLst/>
+          </a:prstGeom>
+          <a:noFill/>
+        </p:spPr>
+        <p:txBody>
+          <a:bodyPr wrap="square" rtlCol="0">
+            <a:spAutoFit/>
+          </a:bodyPr>
+          <a:lstStyle/>
+          <a:p>
+            <a:pPr algn="r"/>
+            <a:r>
+              <a:rPr lang="fr-FR" sz="1200" i="1" dirty="0">
+                <a:effectLst>
+                  <a:outerShdw blurRad="38100" dist="38100" dir="2700000" algn="tl">
+                    <a:srgbClr val="000000">
+                      <a:alpha val="43137"/>
+                    </a:srgbClr>
+                  </a:outerShdw>
+                </a:effectLst>
+              </a:rPr>
+              <a:t>Lancement d’une partie</a:t>
+            </a:r>
+          </a:p>
+        </p:txBody>
+      </p:sp>
+      <p:sp>
+        <p:nvSpPr>
+          <p:cNvPr id="41" name="ZoneTexte 40">
+            <a:extLst>
+              <a:ext uri="{FF2B5EF4-FFF2-40B4-BE49-F238E27FC236}">
+                <a16:creationId xmlns:a16="http://schemas.microsoft.com/office/drawing/2014/main" id="{D8CF9CA7-E62E-4EFA-819F-996CF6066C45}"/>
+              </a:ext>
+            </a:extLst>
+          </p:cNvPr>
+          <p:cNvSpPr txBox="1"/>
+          <p:nvPr/>
+        </p:nvSpPr>
+        <p:spPr>
+          <a:xfrm rot="18665530">
+            <a:off x="5632931" y="3865858"/>
+            <a:ext cx="1919933" cy="276999"/>
+          </a:xfrm>
+          <a:prstGeom prst="rect">
+            <a:avLst/>
+          </a:prstGeom>
+          <a:noFill/>
+        </p:spPr>
+        <p:txBody>
+          <a:bodyPr wrap="square" rtlCol="0">
+            <a:spAutoFit/>
+          </a:bodyPr>
+          <a:lstStyle/>
+          <a:p>
+            <a:pPr algn="r"/>
+            <a:r>
+              <a:rPr lang="fr-FR" sz="1200" i="1" dirty="0">
+                <a:effectLst>
+                  <a:outerShdw blurRad="38100" dist="38100" dir="2700000" algn="tl">
+                    <a:srgbClr val="000000">
+                      <a:alpha val="43137"/>
+                    </a:srgbClr>
+                  </a:outerShdw>
+                </a:effectLst>
+              </a:rPr>
+              <a:t>Envoi d’un message</a:t>
+            </a:r>
+          </a:p>
+        </p:txBody>
+      </p:sp>
+      <p:sp>
+        <p:nvSpPr>
+          <p:cNvPr id="42" name="ZoneTexte 41">
+            <a:extLst>
+              <a:ext uri="{FF2B5EF4-FFF2-40B4-BE49-F238E27FC236}">
+                <a16:creationId xmlns:a16="http://schemas.microsoft.com/office/drawing/2014/main" id="{7EBF6F4B-B2EB-43C3-AE70-1E2CE6137BF7}"/>
+              </a:ext>
+            </a:extLst>
+          </p:cNvPr>
+          <p:cNvSpPr txBox="1"/>
+          <p:nvPr/>
+        </p:nvSpPr>
+        <p:spPr>
+          <a:xfrm rot="18665530">
+            <a:off x="5943379" y="3877623"/>
+            <a:ext cx="1919933" cy="276999"/>
+          </a:xfrm>
+          <a:prstGeom prst="rect">
+            <a:avLst/>
+          </a:prstGeom>
+          <a:noFill/>
+        </p:spPr>
+        <p:txBody>
+          <a:bodyPr wrap="square" rtlCol="0">
+            <a:spAutoFit/>
+          </a:bodyPr>
+          <a:lstStyle/>
+          <a:p>
+            <a:pPr algn="r"/>
+            <a:r>
+              <a:rPr lang="fr-FR" sz="1200" i="1" dirty="0">
+                <a:effectLst>
+                  <a:outerShdw blurRad="38100" dist="38100" dir="2700000" algn="tl">
+                    <a:srgbClr val="000000">
+                      <a:alpha val="43137"/>
+                    </a:srgbClr>
+                  </a:outerShdw>
+                </a:effectLst>
+              </a:rPr>
+              <a:t>Fin de la partie</a:t>
+            </a:r>
           </a:p>
         </p:txBody>
       </p:sp>
@@ -31775,7 +33502,7 @@
         </p:nvSpPr>
         <p:spPr>
           <a:xfrm>
-            <a:off x="9865580" y="164391"/>
+            <a:off x="9863775" y="181652"/>
             <a:ext cx="1874223" cy="261610"/>
           </a:xfrm>
           <a:prstGeom prst="rect">
@@ -33048,9 +34775,9 @@
     <a:masterClrMapping/>
   </p:clrMapOvr>
   <mc:AlternateContent xmlns:mc="http://schemas.openxmlformats.org/markup-compatibility/2006">
-    <mc:Choice xmlns:p159="http://schemas.microsoft.com/office/powerpoint/2015/09/main" Requires="p159">
-      <p:transition xmlns:p14="http://schemas.microsoft.com/office/powerpoint/2010/main" spd="slow" p14:dur="2000">
-        <p159:morph option="byObject"/>
+    <mc:Choice xmlns:p14="http://schemas.microsoft.com/office/powerpoint/2010/main" Requires="p14">
+      <p:transition spd="slow" p14:dur="2250">
+        <p14:reveal/>
       </p:transition>
     </mc:Choice>
     <mc:Fallback>
@@ -42692,13 +44419,13 @@
   <p:clrMapOvr>
     <a:masterClrMapping/>
   </p:clrMapOvr>
-  <mc:AlternateContent xmlns:mc="http://schemas.openxmlformats.org/markup-compatibility/2006">
-    <mc:Choice xmlns:p159="http://schemas.microsoft.com/office/powerpoint/2015/09/main" Requires="p159">
+  <mc:AlternateContent xmlns:mc="http://schemas.openxmlformats.org/markup-compatibility/2006" xmlns:p159="http://schemas.microsoft.com/office/powerpoint/2015/09/main">
+    <mc:Choice Requires="p159">
       <p:transition xmlns:p14="http://schemas.microsoft.com/office/powerpoint/2010/main" spd="slow" p14:dur="2000">
         <p159:morph option="byObject"/>
       </p:transition>
     </mc:Choice>
-    <mc:Fallback>
+    <mc:Fallback xmlns="">
       <p:transition spd="slow">
         <p:fade/>
       </p:transition>
@@ -46837,13 +48564,13 @@
   <p:clrMapOvr>
     <a:masterClrMapping/>
   </p:clrMapOvr>
-  <mc:AlternateContent xmlns:mc="http://schemas.openxmlformats.org/markup-compatibility/2006">
-    <mc:Choice xmlns:p159="http://schemas.microsoft.com/office/powerpoint/2015/09/main" Requires="p159">
+  <mc:AlternateContent xmlns:mc="http://schemas.openxmlformats.org/markup-compatibility/2006" xmlns:p159="http://schemas.microsoft.com/office/powerpoint/2015/09/main">
+    <mc:Choice Requires="p159">
       <p:transition xmlns:p14="http://schemas.microsoft.com/office/powerpoint/2010/main" spd="slow" p14:dur="2000">
         <p159:morph option="byObject"/>
       </p:transition>
     </mc:Choice>
-    <mc:Fallback>
+    <mc:Fallback xmlns="">
       <p:transition spd="slow">
         <p:fade/>
       </p:transition>

</xml_diff>

<commit_message>
Mise à jour du diaporama de revue 2 et des diagrammes de séquence.
</commit_message>
<xml_diff>
--- a/Nathan/Compte-rendus/REVUE-R2-GUIGAND-SFL6.pptx
+++ b/Nathan/Compte-rendus/REVUE-R2-GUIGAND-SFL6.pptx
@@ -3974,7 +3974,7 @@
             <a:fld id="{B61BEF0D-F0BB-DE4B-95CE-6DB70DBA9567}" type="datetimeFigureOut">
               <a:rPr lang="en-US" dirty="0"/>
               <a:pPr/>
-              <a:t>3/11/2020</a:t>
+              <a:t>3/12/2020</a:t>
             </a:fld>
             <a:endParaRPr lang="en-US" dirty="0"/>
           </a:p>
@@ -4222,7 +4222,7 @@
             <a:fld id="{B61BEF0D-F0BB-DE4B-95CE-6DB70DBA9567}" type="datetimeFigureOut">
               <a:rPr lang="en-US" dirty="0"/>
               <a:pPr/>
-              <a:t>3/11/2020</a:t>
+              <a:t>3/12/2020</a:t>
             </a:fld>
             <a:endParaRPr lang="en-US" dirty="0"/>
           </a:p>
@@ -4533,7 +4533,7 @@
             <a:fld id="{B61BEF0D-F0BB-DE4B-95CE-6DB70DBA9567}" type="datetimeFigureOut">
               <a:rPr lang="en-US" dirty="0"/>
               <a:pPr/>
-              <a:t>3/11/2020</a:t>
+              <a:t>3/12/2020</a:t>
             </a:fld>
             <a:endParaRPr lang="en-US" dirty="0"/>
           </a:p>
@@ -4871,7 +4871,7 @@
             <a:fld id="{B61BEF0D-F0BB-DE4B-95CE-6DB70DBA9567}" type="datetimeFigureOut">
               <a:rPr lang="en-US" dirty="0"/>
               <a:pPr/>
-              <a:t>3/11/2020</a:t>
+              <a:t>3/12/2020</a:t>
             </a:fld>
             <a:endParaRPr lang="en-US" dirty="0"/>
           </a:p>
@@ -5182,7 +5182,7 @@
             <a:fld id="{B61BEF0D-F0BB-DE4B-95CE-6DB70DBA9567}" type="datetimeFigureOut">
               <a:rPr lang="en-US" dirty="0"/>
               <a:pPr/>
-              <a:t>3/11/2020</a:t>
+              <a:t>3/12/2020</a:t>
             </a:fld>
             <a:endParaRPr lang="en-US" dirty="0"/>
           </a:p>
@@ -5572,7 +5572,7 @@
             <a:fld id="{B61BEF0D-F0BB-DE4B-95CE-6DB70DBA9567}" type="datetimeFigureOut">
               <a:rPr lang="en-US" dirty="0"/>
               <a:pPr/>
-              <a:t>3/11/2020</a:t>
+              <a:t>3/12/2020</a:t>
             </a:fld>
             <a:endParaRPr lang="en-US" dirty="0"/>
           </a:p>
@@ -5738,7 +5738,7 @@
           <a:p>
             <a:fld id="{55C6B4A9-1611-4792-9094-5F34BCA07E0B}" type="datetimeFigureOut">
               <a:rPr lang="en-US" dirty="0"/>
-              <a:t>3/11/2020</a:t>
+              <a:t>3/12/2020</a:t>
             </a:fld>
             <a:endParaRPr lang="en-US" dirty="0"/>
           </a:p>
@@ -5914,7 +5914,7 @@
             <a:fld id="{B61BEF0D-F0BB-DE4B-95CE-6DB70DBA9567}" type="datetimeFigureOut">
               <a:rPr lang="en-US" dirty="0"/>
               <a:pPr/>
-              <a:t>3/11/2020</a:t>
+              <a:t>3/12/2020</a:t>
             </a:fld>
             <a:endParaRPr lang="en-US" dirty="0"/>
           </a:p>
@@ -6087,7 +6087,7 @@
             <a:fld id="{B61BEF0D-F0BB-DE4B-95CE-6DB70DBA9567}" type="datetimeFigureOut">
               <a:rPr lang="en-US" dirty="0"/>
               <a:pPr/>
-              <a:t>3/11/2020</a:t>
+              <a:t>3/12/2020</a:t>
             </a:fld>
             <a:endParaRPr lang="en-US" dirty="0"/>
           </a:p>
@@ -6331,7 +6331,7 @@
             <a:fld id="{B61BEF0D-F0BB-DE4B-95CE-6DB70DBA9567}" type="datetimeFigureOut">
               <a:rPr lang="en-US" dirty="0"/>
               <a:pPr/>
-              <a:t>3/11/2020</a:t>
+              <a:t>3/12/2020</a:t>
             </a:fld>
             <a:endParaRPr lang="en-US" dirty="0"/>
           </a:p>
@@ -6559,7 +6559,7 @@
           <a:p>
             <a:fld id="{EB712588-04B1-427B-82EE-E8DB90309F08}" type="datetimeFigureOut">
               <a:rPr lang="en-US" dirty="0"/>
-              <a:t>3/11/2020</a:t>
+              <a:t>3/12/2020</a:t>
             </a:fld>
             <a:endParaRPr lang="en-US" dirty="0"/>
           </a:p>
@@ -6929,7 +6929,7 @@
             <a:fld id="{B61BEF0D-F0BB-DE4B-95CE-6DB70DBA9567}" type="datetimeFigureOut">
               <a:rPr lang="en-US" dirty="0"/>
               <a:pPr/>
-              <a:t>3/11/2020</a:t>
+              <a:t>3/12/2020</a:t>
             </a:fld>
             <a:endParaRPr lang="en-US" dirty="0"/>
           </a:p>
@@ -7049,7 +7049,7 @@
             <a:fld id="{B61BEF0D-F0BB-DE4B-95CE-6DB70DBA9567}" type="datetimeFigureOut">
               <a:rPr lang="en-US" dirty="0"/>
               <a:pPr/>
-              <a:t>3/11/2020</a:t>
+              <a:t>3/12/2020</a:t>
             </a:fld>
             <a:endParaRPr lang="en-US" dirty="0"/>
           </a:p>
@@ -7141,7 +7141,7 @@
             <a:fld id="{B61BEF0D-F0BB-DE4B-95CE-6DB70DBA9567}" type="datetimeFigureOut">
               <a:rPr lang="en-US" dirty="0"/>
               <a:pPr/>
-              <a:t>3/11/2020</a:t>
+              <a:t>3/12/2020</a:t>
             </a:fld>
             <a:endParaRPr lang="en-US" dirty="0"/>
           </a:p>
@@ -7392,7 +7392,7 @@
           <a:p>
             <a:fld id="{42A54C80-263E-416B-A8E0-580EDEADCBDC}" type="datetimeFigureOut">
               <a:rPr lang="en-US" dirty="0"/>
-              <a:t>3/11/2020</a:t>
+              <a:t>3/12/2020</a:t>
             </a:fld>
             <a:endParaRPr lang="en-US" dirty="0"/>
           </a:p>
@@ -7651,7 +7651,7 @@
             <a:fld id="{B61BEF0D-F0BB-DE4B-95CE-6DB70DBA9567}" type="datetimeFigureOut">
               <a:rPr lang="en-US" dirty="0"/>
               <a:pPr/>
-              <a:t>3/11/2020</a:t>
+              <a:t>3/12/2020</a:t>
             </a:fld>
             <a:endParaRPr lang="en-US" dirty="0"/>
           </a:p>
@@ -8391,7 +8391,7 @@
             <a:fld id="{B61BEF0D-F0BB-DE4B-95CE-6DB70DBA9567}" type="datetimeFigureOut">
               <a:rPr lang="en-US" dirty="0"/>
               <a:pPr/>
-              <a:t>3/11/2020</a:t>
+              <a:t>3/12/2020</a:t>
             </a:fld>
             <a:endParaRPr lang="en-US" dirty="0"/>
           </a:p>
@@ -12088,6 +12088,49 @@
           </a:p>
         </p:txBody>
       </p:sp>
+      <p:sp>
+        <p:nvSpPr>
+          <p:cNvPr id="44" name="ZoneTexte 43">
+            <a:extLst>
+              <a:ext uri="{FF2B5EF4-FFF2-40B4-BE49-F238E27FC236}">
+                <a16:creationId xmlns:a16="http://schemas.microsoft.com/office/drawing/2014/main" id="{46A14747-565A-4189-8050-2B8192696D9B}"/>
+              </a:ext>
+            </a:extLst>
+          </p:cNvPr>
+          <p:cNvSpPr txBox="1"/>
+          <p:nvPr/>
+        </p:nvSpPr>
+        <p:spPr>
+          <a:xfrm>
+            <a:off x="10008111" y="6539577"/>
+            <a:ext cx="481111" cy="369332"/>
+          </a:xfrm>
+          <a:prstGeom prst="rect">
+            <a:avLst/>
+          </a:prstGeom>
+          <a:noFill/>
+        </p:spPr>
+        <p:txBody>
+          <a:bodyPr wrap="square" rtlCol="0">
+            <a:spAutoFit/>
+          </a:bodyPr>
+          <a:lstStyle/>
+          <a:p>
+            <a:r>
+              <a:rPr lang="fr-FR" i="1" dirty="0">
+                <a:effectLst>
+                  <a:outerShdw blurRad="38100" dist="38100" dir="2700000" algn="tl">
+                    <a:srgbClr val="000000">
+                      <a:alpha val="43137"/>
+                    </a:srgbClr>
+                  </a:outerShdw>
+                </a:effectLst>
+              </a:rPr>
+              <a:t>10</a:t>
+            </a:r>
+          </a:p>
+        </p:txBody>
+      </p:sp>
     </p:spTree>
     <p:extLst>
       <p:ext uri="{BB962C8B-B14F-4D97-AF65-F5344CB8AC3E}">
@@ -14203,6 +14246,49 @@
           <a:p>
             <a:pPr algn="ctr"/>
             <a:endParaRPr lang="fr-FR" dirty="0"/>
+          </a:p>
+        </p:txBody>
+      </p:sp>
+      <p:sp>
+        <p:nvSpPr>
+          <p:cNvPr id="45" name="ZoneTexte 44">
+            <a:extLst>
+              <a:ext uri="{FF2B5EF4-FFF2-40B4-BE49-F238E27FC236}">
+                <a16:creationId xmlns:a16="http://schemas.microsoft.com/office/drawing/2014/main" id="{C91571F8-2CB9-4BE2-A945-5F73EED5013D}"/>
+              </a:ext>
+            </a:extLst>
+          </p:cNvPr>
+          <p:cNvSpPr txBox="1"/>
+          <p:nvPr/>
+        </p:nvSpPr>
+        <p:spPr>
+          <a:xfrm>
+            <a:off x="10008111" y="6539577"/>
+            <a:ext cx="481111" cy="369332"/>
+          </a:xfrm>
+          <a:prstGeom prst="rect">
+            <a:avLst/>
+          </a:prstGeom>
+          <a:noFill/>
+        </p:spPr>
+        <p:txBody>
+          <a:bodyPr wrap="square" rtlCol="0">
+            <a:spAutoFit/>
+          </a:bodyPr>
+          <a:lstStyle/>
+          <a:p>
+            <a:r>
+              <a:rPr lang="fr-FR" i="1" dirty="0">
+                <a:effectLst>
+                  <a:outerShdw blurRad="38100" dist="38100" dir="2700000" algn="tl">
+                    <a:srgbClr val="000000">
+                      <a:alpha val="43137"/>
+                    </a:srgbClr>
+                  </a:outerShdw>
+                </a:effectLst>
+              </a:rPr>
+              <a:t>11</a:t>
+            </a:r>
           </a:p>
         </p:txBody>
       </p:sp>
@@ -16274,6 +16360,49 @@
           </a:p>
         </p:txBody>
       </p:sp>
+      <p:sp>
+        <p:nvSpPr>
+          <p:cNvPr id="43" name="ZoneTexte 42">
+            <a:extLst>
+              <a:ext uri="{FF2B5EF4-FFF2-40B4-BE49-F238E27FC236}">
+                <a16:creationId xmlns:a16="http://schemas.microsoft.com/office/drawing/2014/main" id="{9E739289-D0DD-459F-BBAE-4B5FC8A278FD}"/>
+              </a:ext>
+            </a:extLst>
+          </p:cNvPr>
+          <p:cNvSpPr txBox="1"/>
+          <p:nvPr/>
+        </p:nvSpPr>
+        <p:spPr>
+          <a:xfrm>
+            <a:off x="10008111" y="6539577"/>
+            <a:ext cx="481111" cy="369332"/>
+          </a:xfrm>
+          <a:prstGeom prst="rect">
+            <a:avLst/>
+          </a:prstGeom>
+          <a:noFill/>
+        </p:spPr>
+        <p:txBody>
+          <a:bodyPr wrap="square" rtlCol="0">
+            <a:spAutoFit/>
+          </a:bodyPr>
+          <a:lstStyle/>
+          <a:p>
+            <a:r>
+              <a:rPr lang="fr-FR" i="1" dirty="0">
+                <a:effectLst>
+                  <a:outerShdw blurRad="38100" dist="38100" dir="2700000" algn="tl">
+                    <a:srgbClr val="000000">
+                      <a:alpha val="43137"/>
+                    </a:srgbClr>
+                  </a:outerShdw>
+                </a:effectLst>
+              </a:rPr>
+              <a:t>12</a:t>
+            </a:r>
+          </a:p>
+        </p:txBody>
+      </p:sp>
     </p:spTree>
     <p:extLst>
       <p:ext uri="{BB962C8B-B14F-4D97-AF65-F5344CB8AC3E}">
@@ -18341,6 +18470,49 @@
           </a:p>
         </p:txBody>
       </p:sp>
+      <p:sp>
+        <p:nvSpPr>
+          <p:cNvPr id="44" name="ZoneTexte 43">
+            <a:extLst>
+              <a:ext uri="{FF2B5EF4-FFF2-40B4-BE49-F238E27FC236}">
+                <a16:creationId xmlns:a16="http://schemas.microsoft.com/office/drawing/2014/main" id="{8CA6553D-5D78-47C1-A6DF-437DC71DD419}"/>
+              </a:ext>
+            </a:extLst>
+          </p:cNvPr>
+          <p:cNvSpPr txBox="1"/>
+          <p:nvPr/>
+        </p:nvSpPr>
+        <p:spPr>
+          <a:xfrm>
+            <a:off x="10008111" y="6539577"/>
+            <a:ext cx="481111" cy="369332"/>
+          </a:xfrm>
+          <a:prstGeom prst="rect">
+            <a:avLst/>
+          </a:prstGeom>
+          <a:noFill/>
+        </p:spPr>
+        <p:txBody>
+          <a:bodyPr wrap="square" rtlCol="0">
+            <a:spAutoFit/>
+          </a:bodyPr>
+          <a:lstStyle/>
+          <a:p>
+            <a:r>
+              <a:rPr lang="fr-FR" i="1" dirty="0">
+                <a:effectLst>
+                  <a:outerShdw blurRad="38100" dist="38100" dir="2700000" algn="tl">
+                    <a:srgbClr val="000000">
+                      <a:alpha val="43137"/>
+                    </a:srgbClr>
+                  </a:outerShdw>
+                </a:effectLst>
+              </a:rPr>
+              <a:t>13</a:t>
+            </a:r>
+          </a:p>
+        </p:txBody>
+      </p:sp>
     </p:spTree>
     <p:extLst>
       <p:ext uri="{BB962C8B-B14F-4D97-AF65-F5344CB8AC3E}">
@@ -20281,6 +20453,49 @@
           </a:p>
         </p:txBody>
       </p:sp>
+      <p:sp>
+        <p:nvSpPr>
+          <p:cNvPr id="41" name="ZoneTexte 40">
+            <a:extLst>
+              <a:ext uri="{FF2B5EF4-FFF2-40B4-BE49-F238E27FC236}">
+                <a16:creationId xmlns:a16="http://schemas.microsoft.com/office/drawing/2014/main" id="{3A93F50E-5C50-4400-B84D-0DB8D4CEC126}"/>
+              </a:ext>
+            </a:extLst>
+          </p:cNvPr>
+          <p:cNvSpPr txBox="1"/>
+          <p:nvPr/>
+        </p:nvSpPr>
+        <p:spPr>
+          <a:xfrm>
+            <a:off x="10008111" y="6539577"/>
+            <a:ext cx="481111" cy="369332"/>
+          </a:xfrm>
+          <a:prstGeom prst="rect">
+            <a:avLst/>
+          </a:prstGeom>
+          <a:noFill/>
+        </p:spPr>
+        <p:txBody>
+          <a:bodyPr wrap="square" rtlCol="0">
+            <a:spAutoFit/>
+          </a:bodyPr>
+          <a:lstStyle/>
+          <a:p>
+            <a:r>
+              <a:rPr lang="fr-FR" i="1" dirty="0">
+                <a:effectLst>
+                  <a:outerShdw blurRad="38100" dist="38100" dir="2700000" algn="tl">
+                    <a:srgbClr val="000000">
+                      <a:alpha val="43137"/>
+                    </a:srgbClr>
+                  </a:outerShdw>
+                </a:effectLst>
+              </a:rPr>
+              <a:t>14</a:t>
+            </a:r>
+          </a:p>
+        </p:txBody>
+      </p:sp>
     </p:spTree>
     <p:extLst>
       <p:ext uri="{BB962C8B-B14F-4D97-AF65-F5344CB8AC3E}">
@@ -22337,6 +22552,49 @@
           <a:p>
             <a:pPr algn="ctr"/>
             <a:endParaRPr lang="fr-FR" dirty="0"/>
+          </a:p>
+        </p:txBody>
+      </p:sp>
+      <p:sp>
+        <p:nvSpPr>
+          <p:cNvPr id="43" name="ZoneTexte 42">
+            <a:extLst>
+              <a:ext uri="{FF2B5EF4-FFF2-40B4-BE49-F238E27FC236}">
+                <a16:creationId xmlns:a16="http://schemas.microsoft.com/office/drawing/2014/main" id="{96B8A5BF-18F9-4648-B76F-BD1D124ABD54}"/>
+              </a:ext>
+            </a:extLst>
+          </p:cNvPr>
+          <p:cNvSpPr txBox="1"/>
+          <p:nvPr/>
+        </p:nvSpPr>
+        <p:spPr>
+          <a:xfrm>
+            <a:off x="10008111" y="6539577"/>
+            <a:ext cx="481111" cy="369332"/>
+          </a:xfrm>
+          <a:prstGeom prst="rect">
+            <a:avLst/>
+          </a:prstGeom>
+          <a:noFill/>
+        </p:spPr>
+        <p:txBody>
+          <a:bodyPr wrap="square" rtlCol="0">
+            <a:spAutoFit/>
+          </a:bodyPr>
+          <a:lstStyle/>
+          <a:p>
+            <a:r>
+              <a:rPr lang="fr-FR" i="1" dirty="0">
+                <a:effectLst>
+                  <a:outerShdw blurRad="38100" dist="38100" dir="2700000" algn="tl">
+                    <a:srgbClr val="000000">
+                      <a:alpha val="43137"/>
+                    </a:srgbClr>
+                  </a:outerShdw>
+                </a:effectLst>
+              </a:rPr>
+              <a:t>15</a:t>
+            </a:r>
           </a:p>
         </p:txBody>
       </p:sp>
@@ -24399,6 +24657,49 @@
           </a:p>
         </p:txBody>
       </p:sp>
+      <p:sp>
+        <p:nvSpPr>
+          <p:cNvPr id="45" name="ZoneTexte 44">
+            <a:extLst>
+              <a:ext uri="{FF2B5EF4-FFF2-40B4-BE49-F238E27FC236}">
+                <a16:creationId xmlns:a16="http://schemas.microsoft.com/office/drawing/2014/main" id="{CE47BF98-8266-422E-8408-41B39FB6BED9}"/>
+              </a:ext>
+            </a:extLst>
+          </p:cNvPr>
+          <p:cNvSpPr txBox="1"/>
+          <p:nvPr/>
+        </p:nvSpPr>
+        <p:spPr>
+          <a:xfrm>
+            <a:off x="10008111" y="6539577"/>
+            <a:ext cx="481111" cy="369332"/>
+          </a:xfrm>
+          <a:prstGeom prst="rect">
+            <a:avLst/>
+          </a:prstGeom>
+          <a:noFill/>
+        </p:spPr>
+        <p:txBody>
+          <a:bodyPr wrap="square" rtlCol="0">
+            <a:spAutoFit/>
+          </a:bodyPr>
+          <a:lstStyle/>
+          <a:p>
+            <a:r>
+              <a:rPr lang="fr-FR" i="1" dirty="0">
+                <a:effectLst>
+                  <a:outerShdw blurRad="38100" dist="38100" dir="2700000" algn="tl">
+                    <a:srgbClr val="000000">
+                      <a:alpha val="43137"/>
+                    </a:srgbClr>
+                  </a:outerShdw>
+                </a:effectLst>
+              </a:rPr>
+              <a:t>16</a:t>
+            </a:r>
+          </a:p>
+        </p:txBody>
+      </p:sp>
     </p:spTree>
     <p:extLst>
       <p:ext uri="{BB962C8B-B14F-4D97-AF65-F5344CB8AC3E}">
@@ -26467,6 +26768,49 @@
           </a:p>
         </p:txBody>
       </p:sp>
+      <p:sp>
+        <p:nvSpPr>
+          <p:cNvPr id="45" name="ZoneTexte 44">
+            <a:extLst>
+              <a:ext uri="{FF2B5EF4-FFF2-40B4-BE49-F238E27FC236}">
+                <a16:creationId xmlns:a16="http://schemas.microsoft.com/office/drawing/2014/main" id="{FA6586D0-A8E1-452F-A45B-75E80C1B34C3}"/>
+              </a:ext>
+            </a:extLst>
+          </p:cNvPr>
+          <p:cNvSpPr txBox="1"/>
+          <p:nvPr/>
+        </p:nvSpPr>
+        <p:spPr>
+          <a:xfrm>
+            <a:off x="10008111" y="6539577"/>
+            <a:ext cx="481111" cy="369332"/>
+          </a:xfrm>
+          <a:prstGeom prst="rect">
+            <a:avLst/>
+          </a:prstGeom>
+          <a:noFill/>
+        </p:spPr>
+        <p:txBody>
+          <a:bodyPr wrap="square" rtlCol="0">
+            <a:spAutoFit/>
+          </a:bodyPr>
+          <a:lstStyle/>
+          <a:p>
+            <a:r>
+              <a:rPr lang="fr-FR" i="1" dirty="0">
+                <a:effectLst>
+                  <a:outerShdw blurRad="38100" dist="38100" dir="2700000" algn="tl">
+                    <a:srgbClr val="000000">
+                      <a:alpha val="43137"/>
+                    </a:srgbClr>
+                  </a:outerShdw>
+                </a:effectLst>
+              </a:rPr>
+              <a:t>17</a:t>
+            </a:r>
+          </a:p>
+        </p:txBody>
+      </p:sp>
     </p:spTree>
     <p:extLst>
       <p:ext uri="{BB962C8B-B14F-4D97-AF65-F5344CB8AC3E}">
@@ -28585,6 +28929,49 @@
           </a:p>
         </p:txBody>
       </p:sp>
+      <p:sp>
+        <p:nvSpPr>
+          <p:cNvPr id="46" name="ZoneTexte 45">
+            <a:extLst>
+              <a:ext uri="{FF2B5EF4-FFF2-40B4-BE49-F238E27FC236}">
+                <a16:creationId xmlns:a16="http://schemas.microsoft.com/office/drawing/2014/main" id="{13287238-2796-498D-8A8F-08DEC3929B52}"/>
+              </a:ext>
+            </a:extLst>
+          </p:cNvPr>
+          <p:cNvSpPr txBox="1"/>
+          <p:nvPr/>
+        </p:nvSpPr>
+        <p:spPr>
+          <a:xfrm>
+            <a:off x="10008111" y="6539577"/>
+            <a:ext cx="481111" cy="369332"/>
+          </a:xfrm>
+          <a:prstGeom prst="rect">
+            <a:avLst/>
+          </a:prstGeom>
+          <a:noFill/>
+        </p:spPr>
+        <p:txBody>
+          <a:bodyPr wrap="square" rtlCol="0">
+            <a:spAutoFit/>
+          </a:bodyPr>
+          <a:lstStyle/>
+          <a:p>
+            <a:r>
+              <a:rPr lang="fr-FR" i="1" dirty="0">
+                <a:effectLst>
+                  <a:outerShdw blurRad="38100" dist="38100" dir="2700000" algn="tl">
+                    <a:srgbClr val="000000">
+                      <a:alpha val="43137"/>
+                    </a:srgbClr>
+                  </a:outerShdw>
+                </a:effectLst>
+              </a:rPr>
+              <a:t>18</a:t>
+            </a:r>
+          </a:p>
+        </p:txBody>
+      </p:sp>
     </p:spTree>
     <p:extLst>
       <p:ext uri="{BB962C8B-B14F-4D97-AF65-F5344CB8AC3E}">
@@ -30663,6 +31050,49 @@
           </a:p>
         </p:txBody>
       </p:sp>
+      <p:sp>
+        <p:nvSpPr>
+          <p:cNvPr id="43" name="ZoneTexte 42">
+            <a:extLst>
+              <a:ext uri="{FF2B5EF4-FFF2-40B4-BE49-F238E27FC236}">
+                <a16:creationId xmlns:a16="http://schemas.microsoft.com/office/drawing/2014/main" id="{59538CA6-34CF-4D78-B829-B11BEF8E0498}"/>
+              </a:ext>
+            </a:extLst>
+          </p:cNvPr>
+          <p:cNvSpPr txBox="1"/>
+          <p:nvPr/>
+        </p:nvSpPr>
+        <p:spPr>
+          <a:xfrm>
+            <a:off x="10008111" y="6539577"/>
+            <a:ext cx="481111" cy="369332"/>
+          </a:xfrm>
+          <a:prstGeom prst="rect">
+            <a:avLst/>
+          </a:prstGeom>
+          <a:noFill/>
+        </p:spPr>
+        <p:txBody>
+          <a:bodyPr wrap="square" rtlCol="0">
+            <a:spAutoFit/>
+          </a:bodyPr>
+          <a:lstStyle/>
+          <a:p>
+            <a:r>
+              <a:rPr lang="fr-FR" i="1" dirty="0">
+                <a:effectLst>
+                  <a:outerShdw blurRad="38100" dist="38100" dir="2700000" algn="tl">
+                    <a:srgbClr val="000000">
+                      <a:alpha val="43137"/>
+                    </a:srgbClr>
+                  </a:outerShdw>
+                </a:effectLst>
+              </a:rPr>
+              <a:t>19</a:t>
+            </a:r>
+          </a:p>
+        </p:txBody>
+      </p:sp>
     </p:spTree>
     <p:extLst>
       <p:ext uri="{BB962C8B-B14F-4D97-AF65-F5344CB8AC3E}">
@@ -32659,6 +33089,49 @@
           </a:p>
         </p:txBody>
       </p:sp>
+      <p:sp>
+        <p:nvSpPr>
+          <p:cNvPr id="43" name="ZoneTexte 42">
+            <a:extLst>
+              <a:ext uri="{FF2B5EF4-FFF2-40B4-BE49-F238E27FC236}">
+                <a16:creationId xmlns:a16="http://schemas.microsoft.com/office/drawing/2014/main" id="{C3C8B581-FAC8-415B-8069-B2A5192EE081}"/>
+              </a:ext>
+            </a:extLst>
+          </p:cNvPr>
+          <p:cNvSpPr txBox="1"/>
+          <p:nvPr/>
+        </p:nvSpPr>
+        <p:spPr>
+          <a:xfrm>
+            <a:off x="10008112" y="6539577"/>
+            <a:ext cx="395978" cy="369332"/>
+          </a:xfrm>
+          <a:prstGeom prst="rect">
+            <a:avLst/>
+          </a:prstGeom>
+          <a:noFill/>
+        </p:spPr>
+        <p:txBody>
+          <a:bodyPr wrap="square" rtlCol="0">
+            <a:spAutoFit/>
+          </a:bodyPr>
+          <a:lstStyle/>
+          <a:p>
+            <a:r>
+              <a:rPr lang="fr-FR" i="1" dirty="0">
+                <a:effectLst>
+                  <a:outerShdw blurRad="38100" dist="38100" dir="2700000" algn="tl">
+                    <a:srgbClr val="000000">
+                      <a:alpha val="43137"/>
+                    </a:srgbClr>
+                  </a:outerShdw>
+                </a:effectLst>
+              </a:rPr>
+              <a:t>2</a:t>
+            </a:r>
+          </a:p>
+        </p:txBody>
+      </p:sp>
     </p:spTree>
     <p:extLst>
       <p:ext uri="{BB962C8B-B14F-4D97-AF65-F5344CB8AC3E}">
@@ -34764,6 +35237,49 @@
           </a:p>
         </p:txBody>
       </p:sp>
+      <p:sp>
+        <p:nvSpPr>
+          <p:cNvPr id="4" name="ZoneTexte 3">
+            <a:extLst>
+              <a:ext uri="{FF2B5EF4-FFF2-40B4-BE49-F238E27FC236}">
+                <a16:creationId xmlns:a16="http://schemas.microsoft.com/office/drawing/2014/main" id="{F3AB0BB8-ABAF-496B-B8A9-521662CA9502}"/>
+              </a:ext>
+            </a:extLst>
+          </p:cNvPr>
+          <p:cNvSpPr txBox="1"/>
+          <p:nvPr/>
+        </p:nvSpPr>
+        <p:spPr>
+          <a:xfrm>
+            <a:off x="10008112" y="6539577"/>
+            <a:ext cx="395978" cy="369332"/>
+          </a:xfrm>
+          <a:prstGeom prst="rect">
+            <a:avLst/>
+          </a:prstGeom>
+          <a:noFill/>
+        </p:spPr>
+        <p:txBody>
+          <a:bodyPr wrap="square" rtlCol="0">
+            <a:spAutoFit/>
+          </a:bodyPr>
+          <a:lstStyle/>
+          <a:p>
+            <a:r>
+              <a:rPr lang="fr-FR" i="1" dirty="0">
+                <a:effectLst>
+                  <a:outerShdw blurRad="38100" dist="38100" dir="2700000" algn="tl">
+                    <a:srgbClr val="000000">
+                      <a:alpha val="43137"/>
+                    </a:srgbClr>
+                  </a:outerShdw>
+                </a:effectLst>
+              </a:rPr>
+              <a:t>3</a:t>
+            </a:r>
+          </a:p>
+        </p:txBody>
+      </p:sp>
     </p:spTree>
     <p:extLst>
       <p:ext uri="{BB962C8B-B14F-4D97-AF65-F5344CB8AC3E}">
@@ -34774,13 +35290,13 @@
   <p:clrMapOvr>
     <a:masterClrMapping/>
   </p:clrMapOvr>
-  <mc:AlternateContent xmlns:mc="http://schemas.openxmlformats.org/markup-compatibility/2006">
-    <mc:Choice xmlns:p14="http://schemas.microsoft.com/office/powerpoint/2010/main" Requires="p14">
+  <mc:AlternateContent xmlns:mc="http://schemas.openxmlformats.org/markup-compatibility/2006" xmlns:p14="http://schemas.microsoft.com/office/powerpoint/2010/main">
+    <mc:Choice Requires="p14">
       <p:transition spd="slow" p14:dur="2250">
         <p14:reveal/>
       </p:transition>
     </mc:Choice>
-    <mc:Fallback>
+    <mc:Fallback xmlns="">
       <p:transition spd="slow">
         <p:fade/>
       </p:transition>
@@ -37132,6 +37648,49 @@
           <a:p>
             <a:pPr algn="ctr"/>
             <a:endParaRPr lang="fr-FR" dirty="0"/>
+          </a:p>
+        </p:txBody>
+      </p:sp>
+      <p:sp>
+        <p:nvSpPr>
+          <p:cNvPr id="50" name="ZoneTexte 49">
+            <a:extLst>
+              <a:ext uri="{FF2B5EF4-FFF2-40B4-BE49-F238E27FC236}">
+                <a16:creationId xmlns:a16="http://schemas.microsoft.com/office/drawing/2014/main" id="{104ACBC5-E403-4961-B1DD-00E21EF15396}"/>
+              </a:ext>
+            </a:extLst>
+          </p:cNvPr>
+          <p:cNvSpPr txBox="1"/>
+          <p:nvPr/>
+        </p:nvSpPr>
+        <p:spPr>
+          <a:xfrm>
+            <a:off x="10008112" y="6539577"/>
+            <a:ext cx="395978" cy="369332"/>
+          </a:xfrm>
+          <a:prstGeom prst="rect">
+            <a:avLst/>
+          </a:prstGeom>
+          <a:noFill/>
+        </p:spPr>
+        <p:txBody>
+          <a:bodyPr wrap="square" rtlCol="0">
+            <a:spAutoFit/>
+          </a:bodyPr>
+          <a:lstStyle/>
+          <a:p>
+            <a:r>
+              <a:rPr lang="fr-FR" i="1" dirty="0">
+                <a:effectLst>
+                  <a:outerShdw blurRad="38100" dist="38100" dir="2700000" algn="tl">
+                    <a:srgbClr val="000000">
+                      <a:alpha val="43137"/>
+                    </a:srgbClr>
+                  </a:outerShdw>
+                </a:effectLst>
+              </a:rPr>
+              <a:t>4</a:t>
+            </a:r>
           </a:p>
         </p:txBody>
       </p:sp>
@@ -40182,6 +40741,49 @@
           </a:p>
         </p:txBody>
       </p:sp>
+      <p:sp>
+        <p:nvSpPr>
+          <p:cNvPr id="72" name="ZoneTexte 71">
+            <a:extLst>
+              <a:ext uri="{FF2B5EF4-FFF2-40B4-BE49-F238E27FC236}">
+                <a16:creationId xmlns:a16="http://schemas.microsoft.com/office/drawing/2014/main" id="{6F8E6BEB-12B8-4135-906D-E58E26391500}"/>
+              </a:ext>
+            </a:extLst>
+          </p:cNvPr>
+          <p:cNvSpPr txBox="1"/>
+          <p:nvPr/>
+        </p:nvSpPr>
+        <p:spPr>
+          <a:xfrm>
+            <a:off x="10008112" y="6539577"/>
+            <a:ext cx="395978" cy="369332"/>
+          </a:xfrm>
+          <a:prstGeom prst="rect">
+            <a:avLst/>
+          </a:prstGeom>
+          <a:noFill/>
+        </p:spPr>
+        <p:txBody>
+          <a:bodyPr wrap="square" rtlCol="0">
+            <a:spAutoFit/>
+          </a:bodyPr>
+          <a:lstStyle/>
+          <a:p>
+            <a:r>
+              <a:rPr lang="fr-FR" i="1" dirty="0">
+                <a:effectLst>
+                  <a:outerShdw blurRad="38100" dist="38100" dir="2700000" algn="tl">
+                    <a:srgbClr val="000000">
+                      <a:alpha val="43137"/>
+                    </a:srgbClr>
+                  </a:outerShdw>
+                </a:effectLst>
+              </a:rPr>
+              <a:t>5</a:t>
+            </a:r>
+          </a:p>
+        </p:txBody>
+      </p:sp>
     </p:spTree>
     <p:extLst>
       <p:ext uri="{BB962C8B-B14F-4D97-AF65-F5344CB8AC3E}">
@@ -42253,6 +42855,49 @@
           </a:p>
         </p:txBody>
       </p:sp>
+      <p:sp>
+        <p:nvSpPr>
+          <p:cNvPr id="43" name="ZoneTexte 42">
+            <a:extLst>
+              <a:ext uri="{FF2B5EF4-FFF2-40B4-BE49-F238E27FC236}">
+                <a16:creationId xmlns:a16="http://schemas.microsoft.com/office/drawing/2014/main" id="{60467AE8-43E4-4505-A7A3-F060899AFF5F}"/>
+              </a:ext>
+            </a:extLst>
+          </p:cNvPr>
+          <p:cNvSpPr txBox="1"/>
+          <p:nvPr/>
+        </p:nvSpPr>
+        <p:spPr>
+          <a:xfrm>
+            <a:off x="10008112" y="6539577"/>
+            <a:ext cx="395978" cy="369332"/>
+          </a:xfrm>
+          <a:prstGeom prst="rect">
+            <a:avLst/>
+          </a:prstGeom>
+          <a:noFill/>
+        </p:spPr>
+        <p:txBody>
+          <a:bodyPr wrap="square" rtlCol="0">
+            <a:spAutoFit/>
+          </a:bodyPr>
+          <a:lstStyle/>
+          <a:p>
+            <a:r>
+              <a:rPr lang="fr-FR" i="1" dirty="0">
+                <a:effectLst>
+                  <a:outerShdw blurRad="38100" dist="38100" dir="2700000" algn="tl">
+                    <a:srgbClr val="000000">
+                      <a:alpha val="43137"/>
+                    </a:srgbClr>
+                  </a:outerShdw>
+                </a:effectLst>
+              </a:rPr>
+              <a:t>6</a:t>
+            </a:r>
+          </a:p>
+        </p:txBody>
+      </p:sp>
     </p:spTree>
     <p:extLst>
       <p:ext uri="{BB962C8B-B14F-4D97-AF65-F5344CB8AC3E}">
@@ -44406,6 +45051,49 @@
           <a:p>
             <a:pPr algn="ctr"/>
             <a:endParaRPr lang="fr-FR" dirty="0"/>
+          </a:p>
+        </p:txBody>
+      </p:sp>
+      <p:sp>
+        <p:nvSpPr>
+          <p:cNvPr id="49" name="ZoneTexte 48">
+            <a:extLst>
+              <a:ext uri="{FF2B5EF4-FFF2-40B4-BE49-F238E27FC236}">
+                <a16:creationId xmlns:a16="http://schemas.microsoft.com/office/drawing/2014/main" id="{BDD96B6C-70FC-45AC-8F22-A86DCB1113C5}"/>
+              </a:ext>
+            </a:extLst>
+          </p:cNvPr>
+          <p:cNvSpPr txBox="1"/>
+          <p:nvPr/>
+        </p:nvSpPr>
+        <p:spPr>
+          <a:xfrm>
+            <a:off x="10008112" y="6539577"/>
+            <a:ext cx="395978" cy="369332"/>
+          </a:xfrm>
+          <a:prstGeom prst="rect">
+            <a:avLst/>
+          </a:prstGeom>
+          <a:noFill/>
+        </p:spPr>
+        <p:txBody>
+          <a:bodyPr wrap="square" rtlCol="0">
+            <a:spAutoFit/>
+          </a:bodyPr>
+          <a:lstStyle/>
+          <a:p>
+            <a:r>
+              <a:rPr lang="fr-FR" i="1" dirty="0">
+                <a:effectLst>
+                  <a:outerShdw blurRad="38100" dist="38100" dir="2700000" algn="tl">
+                    <a:srgbClr val="000000">
+                      <a:alpha val="43137"/>
+                    </a:srgbClr>
+                  </a:outerShdw>
+                </a:effectLst>
+              </a:rPr>
+              <a:t>7</a:t>
+            </a:r>
           </a:p>
         </p:txBody>
       </p:sp>
@@ -46477,6 +47165,49 @@
           </a:p>
         </p:txBody>
       </p:sp>
+      <p:sp>
+        <p:nvSpPr>
+          <p:cNvPr id="44" name="ZoneTexte 43">
+            <a:extLst>
+              <a:ext uri="{FF2B5EF4-FFF2-40B4-BE49-F238E27FC236}">
+                <a16:creationId xmlns:a16="http://schemas.microsoft.com/office/drawing/2014/main" id="{AF893EB2-0DF5-48FC-839B-FEB00D5D9DCD}"/>
+              </a:ext>
+            </a:extLst>
+          </p:cNvPr>
+          <p:cNvSpPr txBox="1"/>
+          <p:nvPr/>
+        </p:nvSpPr>
+        <p:spPr>
+          <a:xfrm>
+            <a:off x="10008112" y="6539577"/>
+            <a:ext cx="395978" cy="369332"/>
+          </a:xfrm>
+          <a:prstGeom prst="rect">
+            <a:avLst/>
+          </a:prstGeom>
+          <a:noFill/>
+        </p:spPr>
+        <p:txBody>
+          <a:bodyPr wrap="square" rtlCol="0">
+            <a:spAutoFit/>
+          </a:bodyPr>
+          <a:lstStyle/>
+          <a:p>
+            <a:r>
+              <a:rPr lang="fr-FR" i="1" dirty="0">
+                <a:effectLst>
+                  <a:outerShdw blurRad="38100" dist="38100" dir="2700000" algn="tl">
+                    <a:srgbClr val="000000">
+                      <a:alpha val="43137"/>
+                    </a:srgbClr>
+                  </a:outerShdw>
+                </a:effectLst>
+              </a:rPr>
+              <a:t>8</a:t>
+            </a:r>
+          </a:p>
+        </p:txBody>
+      </p:sp>
     </p:spTree>
     <p:extLst>
       <p:ext uri="{BB962C8B-B14F-4D97-AF65-F5344CB8AC3E}">
@@ -48551,6 +49282,49 @@
           <a:p>
             <a:pPr algn="ctr"/>
             <a:endParaRPr lang="fr-FR" dirty="0"/>
+          </a:p>
+        </p:txBody>
+      </p:sp>
+      <p:sp>
+        <p:nvSpPr>
+          <p:cNvPr id="45" name="ZoneTexte 44">
+            <a:extLst>
+              <a:ext uri="{FF2B5EF4-FFF2-40B4-BE49-F238E27FC236}">
+                <a16:creationId xmlns:a16="http://schemas.microsoft.com/office/drawing/2014/main" id="{1752E7E7-1FF5-42A1-8ADD-F158B0CDC915}"/>
+              </a:ext>
+            </a:extLst>
+          </p:cNvPr>
+          <p:cNvSpPr txBox="1"/>
+          <p:nvPr/>
+        </p:nvSpPr>
+        <p:spPr>
+          <a:xfrm>
+            <a:off x="10008112" y="6539577"/>
+            <a:ext cx="395978" cy="369332"/>
+          </a:xfrm>
+          <a:prstGeom prst="rect">
+            <a:avLst/>
+          </a:prstGeom>
+          <a:noFill/>
+        </p:spPr>
+        <p:txBody>
+          <a:bodyPr wrap="square" rtlCol="0">
+            <a:spAutoFit/>
+          </a:bodyPr>
+          <a:lstStyle/>
+          <a:p>
+            <a:r>
+              <a:rPr lang="fr-FR" i="1" dirty="0">
+                <a:effectLst>
+                  <a:outerShdw blurRad="38100" dist="38100" dir="2700000" algn="tl">
+                    <a:srgbClr val="000000">
+                      <a:alpha val="43137"/>
+                    </a:srgbClr>
+                  </a:outerShdw>
+                </a:effectLst>
+              </a:rPr>
+              <a:t>9</a:t>
+            </a:r>
           </a:p>
         </p:txBody>
       </p:sp>

</xml_diff>

<commit_message>
Correction des diagrammes de séquences. Mise à jour du diaporama de revue 2 avec prise en compte des subjections.
</commit_message>
<xml_diff>
--- a/Nathan/Compte-rendus/REVUE-R2-GUIGAND-SFL6.pptx
+++ b/Nathan/Compte-rendus/REVUE-R2-GUIGAND-SFL6.pptx
@@ -3974,7 +3974,7 @@
             <a:fld id="{B61BEF0D-F0BB-DE4B-95CE-6DB70DBA9567}" type="datetimeFigureOut">
               <a:rPr lang="en-US" dirty="0"/>
               <a:pPr/>
-              <a:t>3/12/2020</a:t>
+              <a:t>3/13/2020</a:t>
             </a:fld>
             <a:endParaRPr lang="en-US" dirty="0"/>
           </a:p>
@@ -4222,7 +4222,7 @@
             <a:fld id="{B61BEF0D-F0BB-DE4B-95CE-6DB70DBA9567}" type="datetimeFigureOut">
               <a:rPr lang="en-US" dirty="0"/>
               <a:pPr/>
-              <a:t>3/12/2020</a:t>
+              <a:t>3/13/2020</a:t>
             </a:fld>
             <a:endParaRPr lang="en-US" dirty="0"/>
           </a:p>
@@ -4533,7 +4533,7 @@
             <a:fld id="{B61BEF0D-F0BB-DE4B-95CE-6DB70DBA9567}" type="datetimeFigureOut">
               <a:rPr lang="en-US" dirty="0"/>
               <a:pPr/>
-              <a:t>3/12/2020</a:t>
+              <a:t>3/13/2020</a:t>
             </a:fld>
             <a:endParaRPr lang="en-US" dirty="0"/>
           </a:p>
@@ -4871,7 +4871,7 @@
             <a:fld id="{B61BEF0D-F0BB-DE4B-95CE-6DB70DBA9567}" type="datetimeFigureOut">
               <a:rPr lang="en-US" dirty="0"/>
               <a:pPr/>
-              <a:t>3/12/2020</a:t>
+              <a:t>3/13/2020</a:t>
             </a:fld>
             <a:endParaRPr lang="en-US" dirty="0"/>
           </a:p>
@@ -5182,7 +5182,7 @@
             <a:fld id="{B61BEF0D-F0BB-DE4B-95CE-6DB70DBA9567}" type="datetimeFigureOut">
               <a:rPr lang="en-US" dirty="0"/>
               <a:pPr/>
-              <a:t>3/12/2020</a:t>
+              <a:t>3/13/2020</a:t>
             </a:fld>
             <a:endParaRPr lang="en-US" dirty="0"/>
           </a:p>
@@ -5572,7 +5572,7 @@
             <a:fld id="{B61BEF0D-F0BB-DE4B-95CE-6DB70DBA9567}" type="datetimeFigureOut">
               <a:rPr lang="en-US" dirty="0"/>
               <a:pPr/>
-              <a:t>3/12/2020</a:t>
+              <a:t>3/13/2020</a:t>
             </a:fld>
             <a:endParaRPr lang="en-US" dirty="0"/>
           </a:p>
@@ -5738,7 +5738,7 @@
           <a:p>
             <a:fld id="{55C6B4A9-1611-4792-9094-5F34BCA07E0B}" type="datetimeFigureOut">
               <a:rPr lang="en-US" dirty="0"/>
-              <a:t>3/12/2020</a:t>
+              <a:t>3/13/2020</a:t>
             </a:fld>
             <a:endParaRPr lang="en-US" dirty="0"/>
           </a:p>
@@ -5914,7 +5914,7 @@
             <a:fld id="{B61BEF0D-F0BB-DE4B-95CE-6DB70DBA9567}" type="datetimeFigureOut">
               <a:rPr lang="en-US" dirty="0"/>
               <a:pPr/>
-              <a:t>3/12/2020</a:t>
+              <a:t>3/13/2020</a:t>
             </a:fld>
             <a:endParaRPr lang="en-US" dirty="0"/>
           </a:p>
@@ -6087,7 +6087,7 @@
             <a:fld id="{B61BEF0D-F0BB-DE4B-95CE-6DB70DBA9567}" type="datetimeFigureOut">
               <a:rPr lang="en-US" dirty="0"/>
               <a:pPr/>
-              <a:t>3/12/2020</a:t>
+              <a:t>3/13/2020</a:t>
             </a:fld>
             <a:endParaRPr lang="en-US" dirty="0"/>
           </a:p>
@@ -6331,7 +6331,7 @@
             <a:fld id="{B61BEF0D-F0BB-DE4B-95CE-6DB70DBA9567}" type="datetimeFigureOut">
               <a:rPr lang="en-US" dirty="0"/>
               <a:pPr/>
-              <a:t>3/12/2020</a:t>
+              <a:t>3/13/2020</a:t>
             </a:fld>
             <a:endParaRPr lang="en-US" dirty="0"/>
           </a:p>
@@ -6559,7 +6559,7 @@
           <a:p>
             <a:fld id="{EB712588-04B1-427B-82EE-E8DB90309F08}" type="datetimeFigureOut">
               <a:rPr lang="en-US" dirty="0"/>
-              <a:t>3/12/2020</a:t>
+              <a:t>3/13/2020</a:t>
             </a:fld>
             <a:endParaRPr lang="en-US" dirty="0"/>
           </a:p>
@@ -6929,7 +6929,7 @@
             <a:fld id="{B61BEF0D-F0BB-DE4B-95CE-6DB70DBA9567}" type="datetimeFigureOut">
               <a:rPr lang="en-US" dirty="0"/>
               <a:pPr/>
-              <a:t>3/12/2020</a:t>
+              <a:t>3/13/2020</a:t>
             </a:fld>
             <a:endParaRPr lang="en-US" dirty="0"/>
           </a:p>
@@ -7049,7 +7049,7 @@
             <a:fld id="{B61BEF0D-F0BB-DE4B-95CE-6DB70DBA9567}" type="datetimeFigureOut">
               <a:rPr lang="en-US" dirty="0"/>
               <a:pPr/>
-              <a:t>3/12/2020</a:t>
+              <a:t>3/13/2020</a:t>
             </a:fld>
             <a:endParaRPr lang="en-US" dirty="0"/>
           </a:p>
@@ -7141,7 +7141,7 @@
             <a:fld id="{B61BEF0D-F0BB-DE4B-95CE-6DB70DBA9567}" type="datetimeFigureOut">
               <a:rPr lang="en-US" dirty="0"/>
               <a:pPr/>
-              <a:t>3/12/2020</a:t>
+              <a:t>3/13/2020</a:t>
             </a:fld>
             <a:endParaRPr lang="en-US" dirty="0"/>
           </a:p>
@@ -7392,7 +7392,7 @@
           <a:p>
             <a:fld id="{42A54C80-263E-416B-A8E0-580EDEADCBDC}" type="datetimeFigureOut">
               <a:rPr lang="en-US" dirty="0"/>
-              <a:t>3/12/2020</a:t>
+              <a:t>3/13/2020</a:t>
             </a:fld>
             <a:endParaRPr lang="en-US" dirty="0"/>
           </a:p>
@@ -7651,7 +7651,7 @@
             <a:fld id="{B61BEF0D-F0BB-DE4B-95CE-6DB70DBA9567}" type="datetimeFigureOut">
               <a:rPr lang="en-US" dirty="0"/>
               <a:pPr/>
-              <a:t>3/12/2020</a:t>
+              <a:t>3/13/2020</a:t>
             </a:fld>
             <a:endParaRPr lang="en-US" dirty="0"/>
           </a:p>
@@ -8391,7 +8391,7 @@
             <a:fld id="{B61BEF0D-F0BB-DE4B-95CE-6DB70DBA9567}" type="datetimeFigureOut">
               <a:rPr lang="en-US" dirty="0"/>
               <a:pPr/>
-              <a:t>3/12/2020</a:t>
+              <a:t>3/13/2020</a:t>
             </a:fld>
             <a:endParaRPr lang="en-US" dirty="0"/>
           </a:p>
@@ -14462,36 +14462,6 @@
           </a:p>
         </p:txBody>
       </p:sp>
-      <p:pic>
-        <p:nvPicPr>
-          <p:cNvPr id="2" name="Image 1">
-            <a:extLst>
-              <a:ext uri="{FF2B5EF4-FFF2-40B4-BE49-F238E27FC236}">
-                <a16:creationId xmlns:a16="http://schemas.microsoft.com/office/drawing/2014/main" id="{EB85B4BA-1247-4132-A680-7202937A7093}"/>
-              </a:ext>
-            </a:extLst>
-          </p:cNvPr>
-          <p:cNvPicPr>
-            <a:picLocks noChangeAspect="1"/>
-          </p:cNvPicPr>
-          <p:nvPr/>
-        </p:nvPicPr>
-        <p:blipFill>
-          <a:blip r:embed="rId3"/>
-          <a:stretch>
-            <a:fillRect/>
-          </a:stretch>
-        </p:blipFill>
-        <p:spPr>
-          <a:xfrm>
-            <a:off x="2412013" y="-119099"/>
-            <a:ext cx="7367973" cy="6977099"/>
-          </a:xfrm>
-          <a:prstGeom prst="rect">
-            <a:avLst/>
-          </a:prstGeom>
-        </p:spPr>
-      </p:pic>
       <p:sp>
         <p:nvSpPr>
           <p:cNvPr id="5" name="Organigramme : Terminateur 4">
@@ -16403,6 +16373,36 @@
           </a:p>
         </p:txBody>
       </p:sp>
+      <p:pic>
+        <p:nvPicPr>
+          <p:cNvPr id="4" name="Image 3">
+            <a:extLst>
+              <a:ext uri="{FF2B5EF4-FFF2-40B4-BE49-F238E27FC236}">
+                <a16:creationId xmlns:a16="http://schemas.microsoft.com/office/drawing/2014/main" id="{3E0C8B8C-937D-4587-9FD1-E0CDFF6CB2E0}"/>
+              </a:ext>
+            </a:extLst>
+          </p:cNvPr>
+          <p:cNvPicPr>
+            <a:picLocks noChangeAspect="1"/>
+          </p:cNvPicPr>
+          <p:nvPr/>
+        </p:nvPicPr>
+        <p:blipFill>
+          <a:blip r:embed="rId3"/>
+          <a:stretch>
+            <a:fillRect/>
+          </a:stretch>
+        </p:blipFill>
+        <p:spPr>
+          <a:xfrm>
+            <a:off x="2595131" y="191332"/>
+            <a:ext cx="7435500" cy="6557131"/>
+          </a:xfrm>
+          <a:prstGeom prst="rect">
+            <a:avLst/>
+          </a:prstGeom>
+        </p:spPr>
+      </p:pic>
     </p:spTree>
     <p:extLst>
       <p:ext uri="{BB962C8B-B14F-4D97-AF65-F5344CB8AC3E}">
@@ -16504,8 +16504,8 @@
         </p:nvSpPr>
         <p:spPr>
           <a:xfrm>
-            <a:off x="3560382" y="125069"/>
-            <a:ext cx="3242435" cy="646331"/>
+            <a:off x="3187520" y="507693"/>
+            <a:ext cx="3763696" cy="738664"/>
           </a:xfrm>
           <a:prstGeom prst="rect">
             <a:avLst/>
@@ -16550,13 +16550,13 @@
           <a:p>
             <a:pPr algn="ctr"/>
             <a:r>
-              <a:rPr lang="fr-FR" sz="2000" b="1" dirty="0">
+              <a:rPr lang="fr-FR" sz="2400" b="1" dirty="0">
                 <a:latin typeface="Eras Medium ITC" panose="020B0602030504020804" pitchFamily="34" charset="0"/>
               </a:rPr>
               <a:t>Diagramme de séquence : </a:t>
             </a:r>
             <a:r>
-              <a:rPr lang="fr-FR" sz="1600" b="1" dirty="0">
+              <a:rPr lang="fr-FR" b="1" dirty="0">
                 <a:solidFill>
                   <a:srgbClr val="A41258"/>
                 </a:solidFill>
@@ -16564,7 +16564,7 @@
               </a:rPr>
               <a:t>Envoi d’un message</a:t>
             </a:r>
-            <a:endParaRPr lang="fr-FR" b="1" dirty="0">
+            <a:endParaRPr lang="fr-FR" sz="2000" b="1" dirty="0">
               <a:solidFill>
                 <a:srgbClr val="A41258"/>
               </a:solidFill>
@@ -16573,35 +16573,6 @@
           </a:p>
         </p:txBody>
       </p:sp>
-      <p:pic>
-        <p:nvPicPr>
-          <p:cNvPr id="4" name="Image 3">
-            <a:extLst>
-              <a:ext uri="{FF2B5EF4-FFF2-40B4-BE49-F238E27FC236}">
-                <a16:creationId xmlns:a16="http://schemas.microsoft.com/office/drawing/2014/main" id="{23D5BB14-85E0-47B6-9674-A8E0DB36C8AC}"/>
-              </a:ext>
-            </a:extLst>
-          </p:cNvPr>
-          <p:cNvPicPr>
-            <a:picLocks noChangeAspect="1"/>
-          </p:cNvPicPr>
-          <p:nvPr/>
-        </p:nvPicPr>
-        <p:blipFill rotWithShape="1">
-          <a:blip r:embed="rId3"/>
-          <a:srcRect t="4014"/>
-          <a:stretch/>
-        </p:blipFill>
-        <p:spPr>
-          <a:xfrm>
-            <a:off x="143436" y="753035"/>
-            <a:ext cx="9576636" cy="6112494"/>
-          </a:xfrm>
-          <a:prstGeom prst="rect">
-            <a:avLst/>
-          </a:prstGeom>
-        </p:spPr>
-      </p:pic>
       <p:sp>
         <p:nvSpPr>
           <p:cNvPr id="6" name="Organigramme : Terminateur 5">
@@ -18513,6 +18484,36 @@
           </a:p>
         </p:txBody>
       </p:sp>
+      <p:pic>
+        <p:nvPicPr>
+          <p:cNvPr id="3" name="Image 2">
+            <a:extLst>
+              <a:ext uri="{FF2B5EF4-FFF2-40B4-BE49-F238E27FC236}">
+                <a16:creationId xmlns:a16="http://schemas.microsoft.com/office/drawing/2014/main" id="{C6D4CBA2-AA8E-4C8D-8100-A2755CC4A333}"/>
+              </a:ext>
+            </a:extLst>
+          </p:cNvPr>
+          <p:cNvPicPr>
+            <a:picLocks noChangeAspect="1"/>
+          </p:cNvPicPr>
+          <p:nvPr/>
+        </p:nvPicPr>
+        <p:blipFill>
+          <a:blip r:embed="rId3"/>
+          <a:stretch>
+            <a:fillRect/>
+          </a:stretch>
+        </p:blipFill>
+        <p:spPr>
+          <a:xfrm>
+            <a:off x="134700" y="1564121"/>
+            <a:ext cx="9546660" cy="5293879"/>
+          </a:xfrm>
+          <a:prstGeom prst="rect">
+            <a:avLst/>
+          </a:prstGeom>
+        </p:spPr>
+      </p:pic>
     </p:spTree>
     <p:extLst>
       <p:ext uri="{BB962C8B-B14F-4D97-AF65-F5344CB8AC3E}">
@@ -18555,36 +18556,6 @@
           <a:chExt cx="0" cy="0"/>
         </a:xfrm>
       </p:grpSpPr>
-      <p:pic>
-        <p:nvPicPr>
-          <p:cNvPr id="2" name="Image 1">
-            <a:extLst>
-              <a:ext uri="{FF2B5EF4-FFF2-40B4-BE49-F238E27FC236}">
-                <a16:creationId xmlns:a16="http://schemas.microsoft.com/office/drawing/2014/main" id="{C59FFCD1-E399-4C08-B4EB-D9717532E202}"/>
-              </a:ext>
-            </a:extLst>
-          </p:cNvPr>
-          <p:cNvPicPr>
-            <a:picLocks noChangeAspect="1"/>
-          </p:cNvPicPr>
-          <p:nvPr/>
-        </p:nvPicPr>
-        <p:blipFill>
-          <a:blip r:embed="rId2"/>
-          <a:stretch>
-            <a:fillRect/>
-          </a:stretch>
-        </p:blipFill>
-        <p:spPr>
-          <a:xfrm>
-            <a:off x="154247" y="0"/>
-            <a:ext cx="9631378" cy="5943600"/>
-          </a:xfrm>
-          <a:prstGeom prst="rect">
-            <a:avLst/>
-          </a:prstGeom>
-        </p:spPr>
-      </p:pic>
       <p:sp>
         <p:nvSpPr>
           <p:cNvPr id="3" name="Organigramme : Terminateur 2">
@@ -20496,6 +20467,36 @@
           </a:p>
         </p:txBody>
       </p:sp>
+      <p:pic>
+        <p:nvPicPr>
+          <p:cNvPr id="44" name="Image 43">
+            <a:extLst>
+              <a:ext uri="{FF2B5EF4-FFF2-40B4-BE49-F238E27FC236}">
+                <a16:creationId xmlns:a16="http://schemas.microsoft.com/office/drawing/2014/main" id="{19AEDB8A-0EE5-4697-AB9B-1B09E0667940}"/>
+              </a:ext>
+            </a:extLst>
+          </p:cNvPr>
+          <p:cNvPicPr>
+            <a:picLocks noChangeAspect="1"/>
+          </p:cNvPicPr>
+          <p:nvPr/>
+        </p:nvPicPr>
+        <p:blipFill>
+          <a:blip r:embed="rId2"/>
+          <a:stretch>
+            <a:fillRect/>
+          </a:stretch>
+        </p:blipFill>
+        <p:spPr>
+          <a:xfrm>
+            <a:off x="274450" y="-10254"/>
+            <a:ext cx="9408989" cy="5806803"/>
+          </a:xfrm>
+          <a:prstGeom prst="rect">
+            <a:avLst/>
+          </a:prstGeom>
+        </p:spPr>
+      </p:pic>
     </p:spTree>
     <p:extLst>
       <p:ext uri="{BB962C8B-B14F-4D97-AF65-F5344CB8AC3E}">
@@ -20657,36 +20658,6 @@
           </a:p>
         </p:txBody>
       </p:sp>
-      <p:pic>
-        <p:nvPicPr>
-          <p:cNvPr id="2" name="Image 1">
-            <a:extLst>
-              <a:ext uri="{FF2B5EF4-FFF2-40B4-BE49-F238E27FC236}">
-                <a16:creationId xmlns:a16="http://schemas.microsoft.com/office/drawing/2014/main" id="{C333449A-FDA8-4476-8BB6-3C164B35991D}"/>
-              </a:ext>
-            </a:extLst>
-          </p:cNvPr>
-          <p:cNvPicPr>
-            <a:picLocks noChangeAspect="1"/>
-          </p:cNvPicPr>
-          <p:nvPr/>
-        </p:nvPicPr>
-        <p:blipFill>
-          <a:blip r:embed="rId3"/>
-          <a:stretch>
-            <a:fillRect/>
-          </a:stretch>
-        </p:blipFill>
-        <p:spPr>
-          <a:xfrm>
-            <a:off x="1353116" y="113656"/>
-            <a:ext cx="8536272" cy="6714565"/>
-          </a:xfrm>
-          <a:prstGeom prst="rect">
-            <a:avLst/>
-          </a:prstGeom>
-        </p:spPr>
-      </p:pic>
       <p:sp>
         <p:nvSpPr>
           <p:cNvPr id="81" name="Organigramme : Terminateur 80">
@@ -22598,6 +22569,36 @@
           </a:p>
         </p:txBody>
       </p:sp>
+      <p:pic>
+        <p:nvPicPr>
+          <p:cNvPr id="3" name="Image 2">
+            <a:extLst>
+              <a:ext uri="{FF2B5EF4-FFF2-40B4-BE49-F238E27FC236}">
+                <a16:creationId xmlns:a16="http://schemas.microsoft.com/office/drawing/2014/main" id="{2C4C0008-5DAA-423C-8197-46FA89A1C36A}"/>
+              </a:ext>
+            </a:extLst>
+          </p:cNvPr>
+          <p:cNvPicPr>
+            <a:picLocks noChangeAspect="1"/>
+          </p:cNvPicPr>
+          <p:nvPr/>
+        </p:nvPicPr>
+        <p:blipFill>
+          <a:blip r:embed="rId3"/>
+          <a:stretch>
+            <a:fillRect/>
+          </a:stretch>
+        </p:blipFill>
+        <p:spPr>
+          <a:xfrm>
+            <a:off x="1419200" y="25020"/>
+            <a:ext cx="8525560" cy="6670506"/>
+          </a:xfrm>
+          <a:prstGeom prst="rect">
+            <a:avLst/>
+          </a:prstGeom>
+        </p:spPr>
+      </p:pic>
     </p:spTree>
     <p:extLst>
       <p:ext uri="{BB962C8B-B14F-4D97-AF65-F5344CB8AC3E}">

</xml_diff>

<commit_message>
Modification du diagramme de classes et mise à jour du diaporama de revue 2. Hierarchisation de mon répertoire GitHub.
</commit_message>
<xml_diff>
--- a/Nathan/Compte-rendus/REVUE-R2-GUIGAND-SFL6.pptx
+++ b/Nathan/Compte-rendus/REVUE-R2-GUIGAND-SFL6.pptx
@@ -22761,36 +22761,6 @@
           </a:p>
         </p:txBody>
       </p:sp>
-      <p:pic>
-        <p:nvPicPr>
-          <p:cNvPr id="6" name="Image 5">
-            <a:extLst>
-              <a:ext uri="{FF2B5EF4-FFF2-40B4-BE49-F238E27FC236}">
-                <a16:creationId xmlns:a16="http://schemas.microsoft.com/office/drawing/2014/main" id="{3D4BD27D-BFB7-4F2A-A9D5-1419F9CD53FC}"/>
-              </a:ext>
-            </a:extLst>
-          </p:cNvPr>
-          <p:cNvPicPr>
-            <a:picLocks noChangeAspect="1"/>
-          </p:cNvPicPr>
-          <p:nvPr/>
-        </p:nvPicPr>
-        <p:blipFill>
-          <a:blip r:embed="rId3"/>
-          <a:stretch>
-            <a:fillRect/>
-          </a:stretch>
-        </p:blipFill>
-        <p:spPr>
-          <a:xfrm>
-            <a:off x="162908" y="955823"/>
-            <a:ext cx="9965023" cy="5679636"/>
-          </a:xfrm>
-          <a:prstGeom prst="rect">
-            <a:avLst/>
-          </a:prstGeom>
-        </p:spPr>
-      </p:pic>
       <p:sp>
         <p:nvSpPr>
           <p:cNvPr id="7" name="Organigramme : Terminateur 6">
@@ -24702,6 +24672,36 @@
           </a:p>
         </p:txBody>
       </p:sp>
+      <p:pic>
+        <p:nvPicPr>
+          <p:cNvPr id="2" name="Image 1">
+            <a:extLst>
+              <a:ext uri="{FF2B5EF4-FFF2-40B4-BE49-F238E27FC236}">
+                <a16:creationId xmlns:a16="http://schemas.microsoft.com/office/drawing/2014/main" id="{9E7A1399-FC36-49EF-9865-C13949D38631}"/>
+              </a:ext>
+            </a:extLst>
+          </p:cNvPr>
+          <p:cNvPicPr>
+            <a:picLocks noChangeAspect="1"/>
+          </p:cNvPicPr>
+          <p:nvPr/>
+        </p:nvPicPr>
+        <p:blipFill>
+          <a:blip r:embed="rId3"/>
+          <a:stretch>
+            <a:fillRect/>
+          </a:stretch>
+        </p:blipFill>
+        <p:spPr>
+          <a:xfrm>
+            <a:off x="113970" y="776989"/>
+            <a:ext cx="9768113" cy="5946171"/>
+          </a:xfrm>
+          <a:prstGeom prst="rect">
+            <a:avLst/>
+          </a:prstGeom>
+        </p:spPr>
+      </p:pic>
     </p:spTree>
     <p:extLst>
       <p:ext uri="{BB962C8B-B14F-4D97-AF65-F5344CB8AC3E}">

</xml_diff>

<commit_message>
Mise à jour du diaporama de revue 2.
</commit_message>
<xml_diff>
--- a/Nathan/Compte-rendus/REVUE-R2-GUIGAND-SFL6.pptx
+++ b/Nathan/Compte-rendus/REVUE-R2-GUIGAND-SFL6.pptx
@@ -42605,7 +42605,7 @@
         <p:spPr>
           <a:xfrm>
             <a:off x="1701832" y="5148140"/>
-            <a:ext cx="6457096" cy="1612174"/>
+            <a:ext cx="6457096" cy="1338713"/>
           </a:xfrm>
           <a:prstGeom prst="rect">
             <a:avLst/>
@@ -42678,28 +42678,6 @@
                 </a:solidFill>
               </a:rPr>
               <a:t>Intercommunication locale</a:t>
-            </a:r>
-          </a:p>
-          <a:p>
-            <a:pPr marL="742950" lvl="1" indent="-285750">
-              <a:buFontTx/>
-              <a:buChar char="-"/>
-            </a:pPr>
-            <a:r>
-              <a:rPr lang="fr-FR" dirty="0">
-                <a:solidFill>
-                  <a:schemeClr val="tx1"/>
-                </a:solidFill>
-              </a:rPr>
-              <a:t>Installation clé WIFI sur Raspberry </a:t>
-            </a:r>
-            <a:r>
-              <a:rPr lang="fr-FR" i="1" dirty="0">
-                <a:solidFill>
-                  <a:schemeClr val="tx1"/>
-                </a:solidFill>
-              </a:rPr>
-              <a:t>-&gt; TP Link WN725N</a:t>
             </a:r>
           </a:p>
           <a:p>

</xml_diff>